<commit_message>
Animator Controller Tutorial Renewal
- Implemented so that a trigger is
  fired depending on the existence
  of a class

- Place video player in world space

- Each PPT data update
</commit_message>
<xml_diff>
--- a/Assets/Animation Retargeting/PPT Data/Animation Retargeting Example.pptx
+++ b/Assets/Animation Retargeting/PPT Data/Animation Retargeting Example.pptx
@@ -2,7 +2,7 @@
 <file path=ppt/presentation.xml><?xml version="1.0" encoding="utf-8"?>
 <p:presentation xmlns:a="http://schemas.openxmlformats.org/drawingml/2006/main" xmlns:r="http://schemas.openxmlformats.org/officeDocument/2006/relationships" xmlns:p="http://schemas.openxmlformats.org/presentationml/2006/main" xmlns:p14="http://schemas.microsoft.com/office/powerpoint/2010/main" saveSubsetFonts="1" firstSlideNum="0">
   <p:sldMasterIdLst>
-    <p:sldMasterId id="2147487028" r:id="rId12"/>
+    <p:sldMasterId id="2147487030" r:id="rId12"/>
   </p:sldMasterIdLst>
   <p:notesMasterIdLst>
     <p:notesMasterId r:id="rId14"/>
@@ -22,9 +22,9 @@
     <p:sldId id="352" r:id="rId38"/>
     <p:sldId id="347" r:id="rId40"/>
     <p:sldId id="348" r:id="rId42"/>
-    <p:sldId id="349" r:id="rId43"/>
-    <p:sldId id="350" r:id="rId44"/>
-    <p:sldId id="353" r:id="rId45"/>
+    <p:sldId id="349" r:id="rId44"/>
+    <p:sldId id="350" r:id="rId45"/>
+    <p:sldId id="353" r:id="rId47"/>
   </p:sldIdLst>
   <p:sldSz cx="12192000" cy="6858000"/>
   <p:notesSz cx="6858000" cy="9144000"/>
@@ -12122,7 +12122,7 @@
       </p:sp>
       <p:pic>
         <p:nvPicPr>
-          <p:cNvPr id="117" name="Picture " descr="C:/Users/Admin1/AppData/Roaming/PolarisOffice/ETemp/3788_21466264/fImage53803246500.png"/>
+          <p:cNvPr id="117" name="Picture "/>
           <p:cNvPicPr>
             <a:picLocks noChangeAspect="1"/>
           </p:cNvPicPr>
@@ -12268,7 +12268,7 @@
         <p:spPr>
           <a:xfrm>
             <a:off x="1249045" y="5296535"/>
-            <a:ext cx="4121150" cy="923925"/>
+            <a:ext cx="4121785" cy="923925"/>
           </a:xfrm>
           <a:prstGeom prst="rect"/>
           <a:noFill/>
@@ -12295,17 +12295,7 @@
                 <a:latin typeface="맑은 고딕" charset="0"/>
                 <a:ea typeface="맑은 고딕" charset="0"/>
               </a:rPr>
-              <a:t>3</a:t>
-            </a:r>
-            <a:r>
-              <a:rPr lang="ko-KR" sz="1800" b="1">
-                <a:solidFill>
-                  <a:srgbClr val="0611F2"/>
-                </a:solidFill>
-                <a:latin typeface="맑은 고딕" charset="0"/>
-                <a:ea typeface="맑은 고딕" charset="0"/>
-              </a:rPr>
-              <a:t>9</a:t>
+              <a:t>39</a:t>
             </a:r>
             <a:r>
               <a:rPr sz="1800" b="1">
@@ -12343,6 +12333,20 @@
                 <a:latin typeface="맑은 고딕" charset="0"/>
                 <a:ea typeface="맑은 고딕" charset="0"/>
               </a:rPr>
+              <a:t> On Click( ) 함수에 등록하고 </a:t>
+            </a:r>
+            <a:r>
+              <a:rPr lang="ko-KR" sz="1800">
+                <a:latin typeface="맑은 고딕" charset="0"/>
+                <a:ea typeface="맑은 고딕" charset="0"/>
+              </a:rPr>
+              <a:t>인수에</a:t>
+            </a:r>
+            <a:r>
+              <a:rPr lang="ko-KR" sz="1800">
+                <a:latin typeface="맑은 고딕" charset="0"/>
+                <a:ea typeface="맑은 고딕" charset="0"/>
+              </a:rPr>
               <a:t> </a:t>
             </a:r>
             <a:r>
@@ -12350,56 +12354,21 @@
                 <a:latin typeface="맑은 고딕" charset="0"/>
                 <a:ea typeface="맑은 고딕" charset="0"/>
               </a:rPr>
-              <a:t>On</a:t>
-            </a:r>
-            <a:r>
-              <a:rPr lang="ko-KR" sz="1800">
-                <a:latin typeface="맑은 고딕" charset="0"/>
-                <a:ea typeface="맑은 고딕" charset="0"/>
-              </a:rPr>
-              <a:t> </a:t>
-            </a:r>
-            <a:r>
-              <a:rPr lang="ko-KR" sz="1800">
-                <a:latin typeface="맑은 고딕" charset="0"/>
-                <a:ea typeface="맑은 고딕" charset="0"/>
-              </a:rPr>
-              <a:t>Click(</a:t>
-            </a:r>
-            <a:r>
-              <a:rPr lang="ko-KR" sz="1800">
-                <a:latin typeface="맑은 고딕" charset="0"/>
-                <a:ea typeface="맑은 고딕" charset="0"/>
-              </a:rPr>
-              <a:t> ) 함수에 등록하고 </a:t>
-            </a:r>
-            <a:r>
-              <a:rPr lang="ko-KR" sz="1800">
-                <a:latin typeface="맑은 고딕" charset="0"/>
-                <a:ea typeface="맑은 고딕" charset="0"/>
-              </a:rPr>
-              <a:t>인수에</a:t>
-            </a:r>
-            <a:r>
-              <a:rPr lang="ko-KR" sz="1800">
-                <a:latin typeface="맑은 고딕" charset="0"/>
-                <a:ea typeface="맑은 고딕" charset="0"/>
-              </a:rPr>
-              <a:t> 8 </a:t>
-            </a:r>
-            <a:r>
-              <a:rPr lang="ko-KR" sz="1800">
-                <a:latin typeface="맑은 고딕" charset="0"/>
-                <a:ea typeface="맑은 고딕" charset="0"/>
-              </a:rPr>
-              <a:t>이라는</a:t>
-            </a:r>
-            <a:r>
-              <a:rPr lang="ko-KR" sz="1800">
-                <a:latin typeface="맑은 고딕" charset="0"/>
-                <a:ea typeface="맑은 고딕" charset="0"/>
-              </a:rPr>
-              <a:t> 값을 설정합니다.</a:t>
+              <a:t>8</a:t>
+            </a:r>
+            <a:r>
+              <a:rPr lang="ko-KR" sz="1800">
+                <a:latin typeface="맑은 고딕" charset="0"/>
+                <a:ea typeface="맑은 고딕" charset="0"/>
+              </a:rPr>
+              <a:t> 이라는 값을 </a:t>
+            </a:r>
+            <a:r>
+              <a:rPr lang="ko-KR" sz="1800">
+                <a:latin typeface="맑은 고딕" charset="0"/>
+                <a:ea typeface="맑은 고딕" charset="0"/>
+              </a:rPr>
+              <a:t>설정합니다.</a:t>
             </a:r>
             <a:endParaRPr lang="ko-KR" altLang="en-US" sz="1800">
               <a:latin typeface="맑은 고딕" charset="0"/>
@@ -12410,7 +12379,7 @@
       </p:sp>
       <p:pic>
         <p:nvPicPr>
-          <p:cNvPr id="123" name="그림 19" descr="C:/Users/Admin1/AppData/Roaming/PolarisOffice/ETemp/3788_21466264/fImage66913385724.png"/>
+          <p:cNvPr id="123" name="그림 19"/>
           <p:cNvPicPr>
             <a:picLocks noChangeAspect="1"/>
           </p:cNvPicPr>
@@ -12554,7 +12523,7 @@
       </p:sp>
       <p:pic>
         <p:nvPicPr>
-          <p:cNvPr id="132" name="그림 39" descr="C:/Users/Admin1/AppData/Roaming/PolarisOffice/ETemp/3788_21466264/fImage132303325724.png"/>
+          <p:cNvPr id="132" name="그림 39"/>
           <p:cNvPicPr>
             <a:picLocks noChangeAspect="1"/>
           </p:cNvPicPr>
@@ -12617,7 +12586,7 @@
       </p:cxnSp>
       <p:pic>
         <p:nvPicPr>
-          <p:cNvPr id="133" name="그림 1" descr="C:/Users/Admin1/AppData/Roaming/PolarisOffice/ETemp/3788_21466264/fImage1314824441.png"/>
+          <p:cNvPr id="133" name="그림 1"/>
           <p:cNvPicPr>
             <a:picLocks noChangeAspect="1"/>
           </p:cNvPicPr>
@@ -12648,7 +12617,7 @@
       </p:pic>
       <p:pic>
         <p:nvPicPr>
-          <p:cNvPr id="134" name="그림 4" descr="C:/Users/Admin1/AppData/Roaming/PolarisOffice/ETemp/3788_21466264/fImage131542458467.png"/>
+          <p:cNvPr id="134" name="그림 4"/>
           <p:cNvPicPr>
             <a:picLocks noChangeAspect="1"/>
           </p:cNvPicPr>
@@ -12679,7 +12648,7 @@
       </p:pic>
       <p:pic>
         <p:nvPicPr>
-          <p:cNvPr id="135" name="그림 8" descr="C:/Users/Admin1/AppData/Roaming/PolarisOffice/ETemp/3788_21466264/fImage140752476334.png"/>
+          <p:cNvPr id="135" name="그림 8"/>
           <p:cNvPicPr>
             <a:picLocks noChangeAspect="1"/>
           </p:cNvPicPr>
@@ -12742,7 +12711,7 @@
       </p:cxnSp>
       <p:pic>
         <p:nvPicPr>
-          <p:cNvPr id="136" name="그림 11" descr="C:/Users/Admin1/AppData/Roaming/PolarisOffice/ETemp/3788_21466264/fImage147152486500.png"/>
+          <p:cNvPr id="136" name="그림 11"/>
           <p:cNvPicPr>
             <a:picLocks noChangeAspect="1"/>
           </p:cNvPicPr>

</xml_diff>

<commit_message>
Overall Unity 3D Renewal Planning
- Animation Retargeting PPT Data
  Update
</commit_message>
<xml_diff>
--- a/Assets/Animation Retargeting/PPT Data/Animation Retargeting Example.pptx
+++ b/Assets/Animation Retargeting/PPT Data/Animation Retargeting Example.pptx
@@ -2,7 +2,7 @@
 <file path=ppt/presentation.xml><?xml version="1.0" encoding="utf-8"?>
 <p:presentation xmlns:a="http://schemas.openxmlformats.org/drawingml/2006/main" xmlns:r="http://schemas.openxmlformats.org/officeDocument/2006/relationships" xmlns:p="http://schemas.openxmlformats.org/presentationml/2006/main" xmlns:p14="http://schemas.microsoft.com/office/powerpoint/2010/main" saveSubsetFonts="1" firstSlideNum="0">
   <p:sldMasterIdLst>
-    <p:sldMasterId id="2147486438" r:id="rId12"/>
+    <p:sldMasterId id="2147486465" r:id="rId12"/>
   </p:sldMasterIdLst>
   <p:notesMasterIdLst>
     <p:notesMasterId r:id="rId14"/>
@@ -10,17 +10,23 @@
   <p:sldIdLst>
     <p:sldId id="296" r:id="rId16"/>
     <p:sldId id="318" r:id="rId18"/>
-    <p:sldId id="316" r:id="rId19"/>
-    <p:sldId id="297" r:id="rId21"/>
-    <p:sldId id="319" r:id="rId23"/>
-    <p:sldId id="321" r:id="rId25"/>
-    <p:sldId id="322" r:id="rId27"/>
-    <p:sldId id="323" r:id="rId29"/>
-    <p:sldId id="324" r:id="rId31"/>
-    <p:sldId id="325" r:id="rId33"/>
+    <p:sldId id="316" r:id="rId20"/>
+    <p:sldId id="297" r:id="rId22"/>
+    <p:sldId id="319" r:id="rId24"/>
+    <p:sldId id="321" r:id="rId26"/>
+    <p:sldId id="322" r:id="rId28"/>
+    <p:sldId id="323" r:id="rId30"/>
+    <p:sldId id="324" r:id="rId32"/>
+    <p:sldId id="325" r:id="rId34"/>
     <p:sldId id="326" r:id="rId35"/>
     <p:sldId id="327" r:id="rId37"/>
-    <p:sldId id="328" r:id="rId38"/>
+    <p:sldId id="328" r:id="rId39"/>
+    <p:sldId id="329" r:id="rId41"/>
+    <p:sldId id="330" r:id="rId42"/>
+    <p:sldId id="331" r:id="rId43"/>
+    <p:sldId id="332" r:id="rId44"/>
+    <p:sldId id="333" r:id="rId45"/>
+    <p:sldId id="334" r:id="rId46"/>
   </p:sldIdLst>
   <p:sldSz cx="12192000" cy="6858000"/>
   <p:notesSz cx="6858000" cy="9144000"/>
@@ -1189,6 +1195,858 @@
 </p:notes>
 </file>
 
+<file path=ppt/notesSlides/notesSlide14.xml><?xml version="1.0" encoding="utf-8"?>
+<p:notes xmlns:a="http://schemas.openxmlformats.org/drawingml/2006/main" xmlns:r="http://schemas.openxmlformats.org/officeDocument/2006/relationships" xmlns:p="http://schemas.openxmlformats.org/presentationml/2006/main">
+  <p:cSld>
+    <p:spTree>
+      <p:nvGrpSpPr>
+        <p:cNvPr id="1" name=""/>
+        <p:cNvGrpSpPr/>
+        <p:nvPr/>
+      </p:nvGrpSpPr>
+      <p:grpSpPr>
+        <a:xfrm>
+          <a:off x="0" y="0"/>
+          <a:ext cx="0" cy="0"/>
+          <a:chOff x="0" y="0"/>
+          <a:chExt cx="0" cy="0"/>
+        </a:xfrm>
+      </p:grpSpPr>
+      <p:sp>
+        <p:nvSpPr>
+          <p:cNvPr id="2" name="슬라이드 이미지 개체 틀 3"/>
+          <p:cNvSpPr>
+            <a:spLocks noChangeAspect="1"/>
+          </p:cNvSpPr>
+          <p:nvPr>
+            <p:ph type="sldImg" idx="2"/>
+          </p:nvPr>
+        </p:nvSpPr>
+        <p:spPr>
+          <a:xfrm rot="0">
+            <a:off x="685800" y="1143000"/>
+            <a:ext cx="5495290" cy="3094990"/>
+          </a:xfrm>
+          <a:prstGeom prst="rect"/>
+          <a:noFill/>
+          <a:ln w="12700" cap="flat" cmpd="sng">
+            <a:solidFill>
+              <a:srgbClr val="000000">
+                <a:alpha val="100000"/>
+              </a:srgbClr>
+            </a:solidFill>
+            <a:prstDash val="solid"/>
+          </a:ln>
+        </p:spPr>
+        <p:txBody>
+          <a:bodyPr wrap="square" lIns="91440" tIns="45720" rIns="91440" bIns="45720" numCol="1" vert="horz" anchor="ctr">
+            <a:noAutofit/>
+          </a:bodyPr>
+          <a:lstStyle/>
+          <a:p>
+            <a:pPr marL="0" indent="0" latinLnBrk="0">
+              <a:buFontTx/>
+              <a:buNone/>
+            </a:pPr>
+          </a:p>
+        </p:txBody>
+      </p:sp>
+      <p:sp>
+        <p:nvSpPr>
+          <p:cNvPr id="3" name="슬라이드 노트 개체 틀 4"/>
+          <p:cNvSpPr txBox="1">
+            <a:spLocks/>
+          </p:cNvSpPr>
+          <p:nvPr>
+            <p:ph type="body" idx="3"/>
+          </p:nvPr>
+        </p:nvSpPr>
+        <p:spPr>
+          <a:xfrm rot="0">
+            <a:off x="685800" y="4400550"/>
+            <a:ext cx="5495290" cy="3609340"/>
+          </a:xfrm>
+          <a:prstGeom prst="rect"/>
+        </p:spPr>
+        <p:txBody>
+          <a:bodyPr wrap="square" lIns="91440" tIns="45720" rIns="91440" bIns="45720" numCol="1" vert="horz" anchor="t">
+            <a:noAutofit/>
+          </a:bodyPr>
+          <a:lstStyle/>
+          <a:p>
+            <a:pPr marL="0" indent="0" latinLnBrk="0">
+              <a:buFontTx/>
+              <a:buNone/>
+            </a:pPr>
+          </a:p>
+        </p:txBody>
+      </p:sp>
+      <p:sp>
+        <p:nvSpPr>
+          <p:cNvPr id="4" name="슬라이드 번호 개체 틀 6"/>
+          <p:cNvSpPr txBox="1">
+            <a:spLocks/>
+          </p:cNvSpPr>
+          <p:nvPr>
+            <p:ph type="sldNum" idx="5"/>
+          </p:nvPr>
+        </p:nvSpPr>
+        <p:spPr>
+          <a:xfrm rot="0">
+            <a:off x="3884930" y="8685530"/>
+            <a:ext cx="2980690" cy="467360"/>
+          </a:xfrm>
+          <a:prstGeom prst="rect"/>
+        </p:spPr>
+        <p:txBody>
+          <a:bodyPr wrap="square" lIns="91440" tIns="45720" rIns="91440" bIns="45720" numCol="1" vert="horz" anchor="b">
+            <a:noAutofit/>
+          </a:bodyPr>
+          <a:lstStyle>
+            <a:lvl1pPr marL="0" indent="0" algn="r" latinLnBrk="0">
+              <a:buFontTx/>
+              <a:buNone/>
+              <a:defRPr lang="en-GB" altLang="en-US" sz="1200"/>
+            </a:lvl1pPr>
+          </a:lstStyle>
+          <a:p>
+            <a:pPr marL="0" indent="0" latinLnBrk="0">
+              <a:buFontTx/>
+              <a:buNone/>
+            </a:pPr>
+            <a:fld id="{B9320F77-B9A0-41C5-862A-B4B631284C64}" type="slidenum">
+              <a:rPr lang="ko-KR" altLang="en-US"/>
+              <a:t>‹#›</a:t>
+            </a:fld>
+          </a:p>
+        </p:txBody>
+      </p:sp>
+    </p:spTree>
+  </p:cSld>
+  <p:clrMapOvr>
+    <a:masterClrMapping/>
+  </p:clrMapOvr>
+  <mc:AlternateContent xmlns:mc="http://schemas.openxmlformats.org/markup-compatibility/2006">
+    <mc:Choice xmlns:p14="http://schemas.microsoft.com/office/powerpoint/2010/main" Requires="p14">
+      <p:transition spd="slow" p14:dur="0"/>
+    </mc:Choice>
+    <mc:Fallback>
+      <p:transition spd="slow"/>
+    </mc:Fallback>
+  </mc:AlternateContent>
+</p:notes>
+</file>
+
+<file path=ppt/notesSlides/notesSlide15.xml><?xml version="1.0" encoding="utf-8"?>
+<p:notes xmlns:a="http://schemas.openxmlformats.org/drawingml/2006/main" xmlns:r="http://schemas.openxmlformats.org/officeDocument/2006/relationships" xmlns:p="http://schemas.openxmlformats.org/presentationml/2006/main">
+  <p:cSld>
+    <p:spTree>
+      <p:nvGrpSpPr>
+        <p:cNvPr id="1" name=""/>
+        <p:cNvGrpSpPr/>
+        <p:nvPr/>
+      </p:nvGrpSpPr>
+      <p:grpSpPr>
+        <a:xfrm>
+          <a:off x="0" y="0"/>
+          <a:ext cx="0" cy="0"/>
+          <a:chOff x="0" y="0"/>
+          <a:chExt cx="0" cy="0"/>
+        </a:xfrm>
+      </p:grpSpPr>
+      <p:sp>
+        <p:nvSpPr>
+          <p:cNvPr id="2" name="슬라이드 이미지 개체 틀 3"/>
+          <p:cNvSpPr>
+            <a:spLocks noChangeAspect="1"/>
+          </p:cNvSpPr>
+          <p:nvPr>
+            <p:ph type="sldImg" idx="2"/>
+          </p:nvPr>
+        </p:nvSpPr>
+        <p:spPr>
+          <a:xfrm rot="0">
+            <a:off x="685800" y="1143000"/>
+            <a:ext cx="5495290" cy="3094990"/>
+          </a:xfrm>
+          <a:prstGeom prst="rect"/>
+          <a:noFill/>
+          <a:ln w="12700" cap="flat" cmpd="sng">
+            <a:solidFill>
+              <a:srgbClr val="000000">
+                <a:alpha val="100000"/>
+              </a:srgbClr>
+            </a:solidFill>
+            <a:prstDash val="solid"/>
+          </a:ln>
+        </p:spPr>
+        <p:txBody>
+          <a:bodyPr wrap="square" lIns="91440" tIns="45720" rIns="91440" bIns="45720" numCol="1" vert="horz" anchor="ctr">
+            <a:noAutofit/>
+          </a:bodyPr>
+          <a:lstStyle/>
+          <a:p>
+            <a:pPr marL="0" indent="0" latinLnBrk="0">
+              <a:buFontTx/>
+              <a:buNone/>
+            </a:pPr>
+          </a:p>
+        </p:txBody>
+      </p:sp>
+      <p:sp>
+        <p:nvSpPr>
+          <p:cNvPr id="3" name="슬라이드 노트 개체 틀 4"/>
+          <p:cNvSpPr txBox="1">
+            <a:spLocks/>
+          </p:cNvSpPr>
+          <p:nvPr>
+            <p:ph type="body" idx="3"/>
+          </p:nvPr>
+        </p:nvSpPr>
+        <p:spPr>
+          <a:xfrm rot="0">
+            <a:off x="685800" y="4400550"/>
+            <a:ext cx="5495290" cy="3609340"/>
+          </a:xfrm>
+          <a:prstGeom prst="rect"/>
+        </p:spPr>
+        <p:txBody>
+          <a:bodyPr wrap="square" lIns="91440" tIns="45720" rIns="91440" bIns="45720" numCol="1" vert="horz" anchor="t">
+            <a:noAutofit/>
+          </a:bodyPr>
+          <a:lstStyle/>
+          <a:p>
+            <a:pPr marL="0" indent="0" latinLnBrk="0">
+              <a:buFontTx/>
+              <a:buNone/>
+            </a:pPr>
+          </a:p>
+        </p:txBody>
+      </p:sp>
+      <p:sp>
+        <p:nvSpPr>
+          <p:cNvPr id="4" name="슬라이드 번호 개체 틀 6"/>
+          <p:cNvSpPr txBox="1">
+            <a:spLocks/>
+          </p:cNvSpPr>
+          <p:nvPr>
+            <p:ph type="sldNum" idx="5"/>
+          </p:nvPr>
+        </p:nvSpPr>
+        <p:spPr>
+          <a:xfrm rot="0">
+            <a:off x="3884930" y="8685530"/>
+            <a:ext cx="2980690" cy="467360"/>
+          </a:xfrm>
+          <a:prstGeom prst="rect"/>
+        </p:spPr>
+        <p:txBody>
+          <a:bodyPr wrap="square" lIns="91440" tIns="45720" rIns="91440" bIns="45720" numCol="1" vert="horz" anchor="b">
+            <a:noAutofit/>
+          </a:bodyPr>
+          <a:lstStyle>
+            <a:lvl1pPr marL="0" indent="0" algn="r" latinLnBrk="0">
+              <a:buFontTx/>
+              <a:buNone/>
+              <a:defRPr lang="en-GB" altLang="en-US" sz="1200"/>
+            </a:lvl1pPr>
+          </a:lstStyle>
+          <a:p>
+            <a:pPr marL="0" indent="0" latinLnBrk="0">
+              <a:buFontTx/>
+              <a:buNone/>
+            </a:pPr>
+            <a:fld id="{B9320F77-B9A0-41C5-862A-B4B631284C64}" type="slidenum">
+              <a:rPr lang="ko-KR" altLang="en-US"/>
+              <a:t>‹#›</a:t>
+            </a:fld>
+          </a:p>
+        </p:txBody>
+      </p:sp>
+    </p:spTree>
+  </p:cSld>
+  <p:clrMapOvr>
+    <a:masterClrMapping/>
+  </p:clrMapOvr>
+  <mc:AlternateContent xmlns:mc="http://schemas.openxmlformats.org/markup-compatibility/2006">
+    <mc:Choice xmlns:p14="http://schemas.microsoft.com/office/powerpoint/2010/main" Requires="p14">
+      <p:transition spd="slow" p14:dur="0"/>
+    </mc:Choice>
+    <mc:Fallback>
+      <p:transition spd="slow"/>
+    </mc:Fallback>
+  </mc:AlternateContent>
+</p:notes>
+</file>
+
+<file path=ppt/notesSlides/notesSlide16.xml><?xml version="1.0" encoding="utf-8"?>
+<p:notes xmlns:a="http://schemas.openxmlformats.org/drawingml/2006/main" xmlns:r="http://schemas.openxmlformats.org/officeDocument/2006/relationships" xmlns:p="http://schemas.openxmlformats.org/presentationml/2006/main">
+  <p:cSld>
+    <p:spTree>
+      <p:nvGrpSpPr>
+        <p:cNvPr id="1" name=""/>
+        <p:cNvGrpSpPr/>
+        <p:nvPr/>
+      </p:nvGrpSpPr>
+      <p:grpSpPr>
+        <a:xfrm>
+          <a:off x="0" y="0"/>
+          <a:ext cx="0" cy="0"/>
+          <a:chOff x="0" y="0"/>
+          <a:chExt cx="0" cy="0"/>
+        </a:xfrm>
+      </p:grpSpPr>
+      <p:sp>
+        <p:nvSpPr>
+          <p:cNvPr id="2" name="슬라이드 이미지 개체 틀 3"/>
+          <p:cNvSpPr>
+            <a:spLocks noChangeAspect="1"/>
+          </p:cNvSpPr>
+          <p:nvPr>
+            <p:ph type="sldImg" idx="2"/>
+          </p:nvPr>
+        </p:nvSpPr>
+        <p:spPr>
+          <a:xfrm rot="0">
+            <a:off x="685800" y="1143000"/>
+            <a:ext cx="5495290" cy="3094990"/>
+          </a:xfrm>
+          <a:prstGeom prst="rect"/>
+          <a:noFill/>
+          <a:ln w="12700" cap="flat" cmpd="sng">
+            <a:solidFill>
+              <a:srgbClr val="000000">
+                <a:alpha val="100000"/>
+              </a:srgbClr>
+            </a:solidFill>
+            <a:prstDash val="solid"/>
+          </a:ln>
+        </p:spPr>
+        <p:txBody>
+          <a:bodyPr wrap="square" lIns="91440" tIns="45720" rIns="91440" bIns="45720" numCol="1" vert="horz" anchor="ctr">
+            <a:noAutofit/>
+          </a:bodyPr>
+          <a:lstStyle/>
+          <a:p>
+            <a:pPr marL="0" indent="0" latinLnBrk="0">
+              <a:buFontTx/>
+              <a:buNone/>
+            </a:pPr>
+          </a:p>
+        </p:txBody>
+      </p:sp>
+      <p:sp>
+        <p:nvSpPr>
+          <p:cNvPr id="3" name="슬라이드 노트 개체 틀 4"/>
+          <p:cNvSpPr txBox="1">
+            <a:spLocks/>
+          </p:cNvSpPr>
+          <p:nvPr>
+            <p:ph type="body" idx="3"/>
+          </p:nvPr>
+        </p:nvSpPr>
+        <p:spPr>
+          <a:xfrm rot="0">
+            <a:off x="685800" y="4400550"/>
+            <a:ext cx="5495290" cy="3609340"/>
+          </a:xfrm>
+          <a:prstGeom prst="rect"/>
+        </p:spPr>
+        <p:txBody>
+          <a:bodyPr wrap="square" lIns="91440" tIns="45720" rIns="91440" bIns="45720" numCol="1" vert="horz" anchor="t">
+            <a:noAutofit/>
+          </a:bodyPr>
+          <a:lstStyle/>
+          <a:p>
+            <a:pPr marL="0" indent="0" latinLnBrk="0">
+              <a:buFontTx/>
+              <a:buNone/>
+            </a:pPr>
+          </a:p>
+        </p:txBody>
+      </p:sp>
+      <p:sp>
+        <p:nvSpPr>
+          <p:cNvPr id="4" name="슬라이드 번호 개체 틀 6"/>
+          <p:cNvSpPr txBox="1">
+            <a:spLocks/>
+          </p:cNvSpPr>
+          <p:nvPr>
+            <p:ph type="sldNum" idx="5"/>
+          </p:nvPr>
+        </p:nvSpPr>
+        <p:spPr>
+          <a:xfrm rot="0">
+            <a:off x="3884930" y="8685530"/>
+            <a:ext cx="2980690" cy="467360"/>
+          </a:xfrm>
+          <a:prstGeom prst="rect"/>
+        </p:spPr>
+        <p:txBody>
+          <a:bodyPr wrap="square" lIns="91440" tIns="45720" rIns="91440" bIns="45720" numCol="1" vert="horz" anchor="b">
+            <a:noAutofit/>
+          </a:bodyPr>
+          <a:lstStyle>
+            <a:lvl1pPr marL="0" indent="0" algn="r" latinLnBrk="0">
+              <a:buFontTx/>
+              <a:buNone/>
+              <a:defRPr lang="en-GB" altLang="en-US" sz="1200"/>
+            </a:lvl1pPr>
+          </a:lstStyle>
+          <a:p>
+            <a:pPr marL="0" indent="0" latinLnBrk="0">
+              <a:buFontTx/>
+              <a:buNone/>
+            </a:pPr>
+            <a:fld id="{B9320F77-B9A0-41C5-862A-B4B631284C64}" type="slidenum">
+              <a:rPr lang="ko-KR" altLang="en-US"/>
+              <a:t>‹#›</a:t>
+            </a:fld>
+          </a:p>
+        </p:txBody>
+      </p:sp>
+    </p:spTree>
+  </p:cSld>
+  <p:clrMapOvr>
+    <a:masterClrMapping/>
+  </p:clrMapOvr>
+  <mc:AlternateContent xmlns:mc="http://schemas.openxmlformats.org/markup-compatibility/2006">
+    <mc:Choice xmlns:p14="http://schemas.microsoft.com/office/powerpoint/2010/main" Requires="p14">
+      <p:transition spd="slow" p14:dur="0"/>
+    </mc:Choice>
+    <mc:Fallback>
+      <p:transition spd="slow"/>
+    </mc:Fallback>
+  </mc:AlternateContent>
+</p:notes>
+</file>
+
+<file path=ppt/notesSlides/notesSlide17.xml><?xml version="1.0" encoding="utf-8"?>
+<p:notes xmlns:a="http://schemas.openxmlformats.org/drawingml/2006/main" xmlns:r="http://schemas.openxmlformats.org/officeDocument/2006/relationships" xmlns:p="http://schemas.openxmlformats.org/presentationml/2006/main">
+  <p:cSld>
+    <p:spTree>
+      <p:nvGrpSpPr>
+        <p:cNvPr id="1" name=""/>
+        <p:cNvGrpSpPr/>
+        <p:nvPr/>
+      </p:nvGrpSpPr>
+      <p:grpSpPr>
+        <a:xfrm>
+          <a:off x="0" y="0"/>
+          <a:ext cx="0" cy="0"/>
+          <a:chOff x="0" y="0"/>
+          <a:chExt cx="0" cy="0"/>
+        </a:xfrm>
+      </p:grpSpPr>
+      <p:sp>
+        <p:nvSpPr>
+          <p:cNvPr id="2" name="슬라이드 이미지 개체 틀 3"/>
+          <p:cNvSpPr>
+            <a:spLocks noChangeAspect="1"/>
+          </p:cNvSpPr>
+          <p:nvPr>
+            <p:ph type="sldImg" idx="2"/>
+          </p:nvPr>
+        </p:nvSpPr>
+        <p:spPr>
+          <a:xfrm rot="0">
+            <a:off x="685800" y="1143000"/>
+            <a:ext cx="5495290" cy="3094990"/>
+          </a:xfrm>
+          <a:prstGeom prst="rect"/>
+          <a:noFill/>
+          <a:ln w="12700" cap="flat" cmpd="sng">
+            <a:solidFill>
+              <a:srgbClr val="000000">
+                <a:alpha val="100000"/>
+              </a:srgbClr>
+            </a:solidFill>
+            <a:prstDash val="solid"/>
+          </a:ln>
+        </p:spPr>
+        <p:txBody>
+          <a:bodyPr wrap="square" lIns="91440" tIns="45720" rIns="91440" bIns="45720" numCol="1" vert="horz" anchor="ctr">
+            <a:noAutofit/>
+          </a:bodyPr>
+          <a:lstStyle/>
+          <a:p>
+            <a:pPr marL="0" indent="0" latinLnBrk="0">
+              <a:buFontTx/>
+              <a:buNone/>
+            </a:pPr>
+          </a:p>
+        </p:txBody>
+      </p:sp>
+      <p:sp>
+        <p:nvSpPr>
+          <p:cNvPr id="3" name="슬라이드 노트 개체 틀 4"/>
+          <p:cNvSpPr txBox="1">
+            <a:spLocks/>
+          </p:cNvSpPr>
+          <p:nvPr>
+            <p:ph type="body" idx="3"/>
+          </p:nvPr>
+        </p:nvSpPr>
+        <p:spPr>
+          <a:xfrm rot="0">
+            <a:off x="685800" y="4400550"/>
+            <a:ext cx="5495290" cy="3609340"/>
+          </a:xfrm>
+          <a:prstGeom prst="rect"/>
+        </p:spPr>
+        <p:txBody>
+          <a:bodyPr wrap="square" lIns="91440" tIns="45720" rIns="91440" bIns="45720" numCol="1" vert="horz" anchor="t">
+            <a:noAutofit/>
+          </a:bodyPr>
+          <a:lstStyle/>
+          <a:p>
+            <a:pPr marL="0" indent="0" latinLnBrk="0">
+              <a:buFontTx/>
+              <a:buNone/>
+            </a:pPr>
+          </a:p>
+        </p:txBody>
+      </p:sp>
+      <p:sp>
+        <p:nvSpPr>
+          <p:cNvPr id="4" name="슬라이드 번호 개체 틀 6"/>
+          <p:cNvSpPr txBox="1">
+            <a:spLocks/>
+          </p:cNvSpPr>
+          <p:nvPr>
+            <p:ph type="sldNum" idx="5"/>
+          </p:nvPr>
+        </p:nvSpPr>
+        <p:spPr>
+          <a:xfrm rot="0">
+            <a:off x="3884930" y="8685530"/>
+            <a:ext cx="2980690" cy="467360"/>
+          </a:xfrm>
+          <a:prstGeom prst="rect"/>
+        </p:spPr>
+        <p:txBody>
+          <a:bodyPr wrap="square" lIns="91440" tIns="45720" rIns="91440" bIns="45720" numCol="1" vert="horz" anchor="b">
+            <a:noAutofit/>
+          </a:bodyPr>
+          <a:lstStyle>
+            <a:lvl1pPr marL="0" indent="0" algn="r" latinLnBrk="0">
+              <a:buFontTx/>
+              <a:buNone/>
+              <a:defRPr lang="en-GB" altLang="en-US" sz="1200"/>
+            </a:lvl1pPr>
+          </a:lstStyle>
+          <a:p>
+            <a:pPr marL="0" indent="0" latinLnBrk="0">
+              <a:buFontTx/>
+              <a:buNone/>
+            </a:pPr>
+            <a:fld id="{B9320F77-B9A0-41C5-862A-B4B631284C64}" type="slidenum">
+              <a:rPr lang="ko-KR" altLang="en-US"/>
+              <a:t>‹#›</a:t>
+            </a:fld>
+          </a:p>
+        </p:txBody>
+      </p:sp>
+    </p:spTree>
+  </p:cSld>
+  <p:clrMapOvr>
+    <a:masterClrMapping/>
+  </p:clrMapOvr>
+  <mc:AlternateContent xmlns:mc="http://schemas.openxmlformats.org/markup-compatibility/2006">
+    <mc:Choice xmlns:p14="http://schemas.microsoft.com/office/powerpoint/2010/main" Requires="p14">
+      <p:transition spd="slow" p14:dur="0"/>
+    </mc:Choice>
+    <mc:Fallback>
+      <p:transition spd="slow"/>
+    </mc:Fallback>
+  </mc:AlternateContent>
+</p:notes>
+</file>
+
+<file path=ppt/notesSlides/notesSlide18.xml><?xml version="1.0" encoding="utf-8"?>
+<p:notes xmlns:a="http://schemas.openxmlformats.org/drawingml/2006/main" xmlns:r="http://schemas.openxmlformats.org/officeDocument/2006/relationships" xmlns:p="http://schemas.openxmlformats.org/presentationml/2006/main">
+  <p:cSld>
+    <p:spTree>
+      <p:nvGrpSpPr>
+        <p:cNvPr id="1" name=""/>
+        <p:cNvGrpSpPr/>
+        <p:nvPr/>
+      </p:nvGrpSpPr>
+      <p:grpSpPr>
+        <a:xfrm>
+          <a:off x="0" y="0"/>
+          <a:ext cx="0" cy="0"/>
+          <a:chOff x="0" y="0"/>
+          <a:chExt cx="0" cy="0"/>
+        </a:xfrm>
+      </p:grpSpPr>
+      <p:sp>
+        <p:nvSpPr>
+          <p:cNvPr id="2" name="슬라이드 이미지 개체 틀 3"/>
+          <p:cNvSpPr>
+            <a:spLocks noChangeAspect="1"/>
+          </p:cNvSpPr>
+          <p:nvPr>
+            <p:ph type="sldImg" idx="2"/>
+          </p:nvPr>
+        </p:nvSpPr>
+        <p:spPr>
+          <a:xfrm rot="0">
+            <a:off x="685800" y="1143000"/>
+            <a:ext cx="5495290" cy="3094990"/>
+          </a:xfrm>
+          <a:prstGeom prst="rect"/>
+          <a:noFill/>
+          <a:ln w="12700" cap="flat" cmpd="sng">
+            <a:solidFill>
+              <a:srgbClr val="000000">
+                <a:alpha val="100000"/>
+              </a:srgbClr>
+            </a:solidFill>
+            <a:prstDash val="solid"/>
+          </a:ln>
+        </p:spPr>
+        <p:txBody>
+          <a:bodyPr wrap="square" lIns="91440" tIns="45720" rIns="91440" bIns="45720" numCol="1" vert="horz" anchor="ctr">
+            <a:noAutofit/>
+          </a:bodyPr>
+          <a:lstStyle/>
+          <a:p>
+            <a:pPr marL="0" indent="0" latinLnBrk="0">
+              <a:buFontTx/>
+              <a:buNone/>
+            </a:pPr>
+          </a:p>
+        </p:txBody>
+      </p:sp>
+      <p:sp>
+        <p:nvSpPr>
+          <p:cNvPr id="3" name="슬라이드 노트 개체 틀 4"/>
+          <p:cNvSpPr txBox="1">
+            <a:spLocks/>
+          </p:cNvSpPr>
+          <p:nvPr>
+            <p:ph type="body" idx="3"/>
+          </p:nvPr>
+        </p:nvSpPr>
+        <p:spPr>
+          <a:xfrm rot="0">
+            <a:off x="685800" y="4400550"/>
+            <a:ext cx="5495290" cy="3609340"/>
+          </a:xfrm>
+          <a:prstGeom prst="rect"/>
+        </p:spPr>
+        <p:txBody>
+          <a:bodyPr wrap="square" lIns="91440" tIns="45720" rIns="91440" bIns="45720" numCol="1" vert="horz" anchor="t">
+            <a:noAutofit/>
+          </a:bodyPr>
+          <a:lstStyle/>
+          <a:p>
+            <a:pPr marL="0" indent="0" latinLnBrk="0">
+              <a:buFontTx/>
+              <a:buNone/>
+            </a:pPr>
+          </a:p>
+        </p:txBody>
+      </p:sp>
+      <p:sp>
+        <p:nvSpPr>
+          <p:cNvPr id="4" name="슬라이드 번호 개체 틀 6"/>
+          <p:cNvSpPr txBox="1">
+            <a:spLocks/>
+          </p:cNvSpPr>
+          <p:nvPr>
+            <p:ph type="sldNum" idx="5"/>
+          </p:nvPr>
+        </p:nvSpPr>
+        <p:spPr>
+          <a:xfrm rot="0">
+            <a:off x="3884930" y="8685530"/>
+            <a:ext cx="2980690" cy="467360"/>
+          </a:xfrm>
+          <a:prstGeom prst="rect"/>
+        </p:spPr>
+        <p:txBody>
+          <a:bodyPr wrap="square" lIns="91440" tIns="45720" rIns="91440" bIns="45720" numCol="1" vert="horz" anchor="b">
+            <a:noAutofit/>
+          </a:bodyPr>
+          <a:lstStyle>
+            <a:lvl1pPr marL="0" indent="0" algn="r" latinLnBrk="0">
+              <a:buFontTx/>
+              <a:buNone/>
+              <a:defRPr lang="en-GB" altLang="en-US" sz="1200"/>
+            </a:lvl1pPr>
+          </a:lstStyle>
+          <a:p>
+            <a:pPr marL="0" indent="0" latinLnBrk="0">
+              <a:buFontTx/>
+              <a:buNone/>
+            </a:pPr>
+            <a:fld id="{B9320F77-B9A0-41C5-862A-B4B631284C64}" type="slidenum">
+              <a:rPr lang="ko-KR" altLang="en-US"/>
+              <a:t>‹#›</a:t>
+            </a:fld>
+          </a:p>
+        </p:txBody>
+      </p:sp>
+    </p:spTree>
+  </p:cSld>
+  <p:clrMapOvr>
+    <a:masterClrMapping/>
+  </p:clrMapOvr>
+  <mc:AlternateContent xmlns:mc="http://schemas.openxmlformats.org/markup-compatibility/2006">
+    <mc:Choice xmlns:p14="http://schemas.microsoft.com/office/powerpoint/2010/main" Requires="p14">
+      <p:transition spd="slow" p14:dur="0"/>
+    </mc:Choice>
+    <mc:Fallback>
+      <p:transition spd="slow"/>
+    </mc:Fallback>
+  </mc:AlternateContent>
+</p:notes>
+</file>
+
+<file path=ppt/notesSlides/notesSlide19.xml><?xml version="1.0" encoding="utf-8"?>
+<p:notes xmlns:a="http://schemas.openxmlformats.org/drawingml/2006/main" xmlns:r="http://schemas.openxmlformats.org/officeDocument/2006/relationships" xmlns:p="http://schemas.openxmlformats.org/presentationml/2006/main">
+  <p:cSld>
+    <p:spTree>
+      <p:nvGrpSpPr>
+        <p:cNvPr id="1" name=""/>
+        <p:cNvGrpSpPr/>
+        <p:nvPr/>
+      </p:nvGrpSpPr>
+      <p:grpSpPr>
+        <a:xfrm>
+          <a:off x="0" y="0"/>
+          <a:ext cx="0" cy="0"/>
+          <a:chOff x="0" y="0"/>
+          <a:chExt cx="0" cy="0"/>
+        </a:xfrm>
+      </p:grpSpPr>
+      <p:sp>
+        <p:nvSpPr>
+          <p:cNvPr id="2" name="슬라이드 이미지 개체 틀 3"/>
+          <p:cNvSpPr>
+            <a:spLocks noChangeAspect="1"/>
+          </p:cNvSpPr>
+          <p:nvPr>
+            <p:ph type="sldImg" idx="2"/>
+          </p:nvPr>
+        </p:nvSpPr>
+        <p:spPr>
+          <a:xfrm rot="0">
+            <a:off x="685800" y="1143000"/>
+            <a:ext cx="5495290" cy="3094990"/>
+          </a:xfrm>
+          <a:prstGeom prst="rect"/>
+          <a:noFill/>
+          <a:ln w="12700" cap="flat" cmpd="sng">
+            <a:solidFill>
+              <a:srgbClr val="000000">
+                <a:alpha val="100000"/>
+              </a:srgbClr>
+            </a:solidFill>
+            <a:prstDash val="solid"/>
+          </a:ln>
+        </p:spPr>
+        <p:txBody>
+          <a:bodyPr wrap="square" lIns="91440" tIns="45720" rIns="91440" bIns="45720" numCol="1" vert="horz" anchor="ctr">
+            <a:noAutofit/>
+          </a:bodyPr>
+          <a:lstStyle/>
+          <a:p>
+            <a:pPr marL="0" indent="0" latinLnBrk="0">
+              <a:buFontTx/>
+              <a:buNone/>
+            </a:pPr>
+          </a:p>
+        </p:txBody>
+      </p:sp>
+      <p:sp>
+        <p:nvSpPr>
+          <p:cNvPr id="3" name="슬라이드 노트 개체 틀 4"/>
+          <p:cNvSpPr txBox="1">
+            <a:spLocks/>
+          </p:cNvSpPr>
+          <p:nvPr>
+            <p:ph type="body" idx="3"/>
+          </p:nvPr>
+        </p:nvSpPr>
+        <p:spPr>
+          <a:xfrm rot="0">
+            <a:off x="685800" y="4400550"/>
+            <a:ext cx="5495290" cy="3609340"/>
+          </a:xfrm>
+          <a:prstGeom prst="rect"/>
+        </p:spPr>
+        <p:txBody>
+          <a:bodyPr wrap="square" lIns="91440" tIns="45720" rIns="91440" bIns="45720" numCol="1" vert="horz" anchor="t">
+            <a:noAutofit/>
+          </a:bodyPr>
+          <a:lstStyle/>
+          <a:p>
+            <a:pPr marL="0" indent="0" latinLnBrk="0">
+              <a:buFontTx/>
+              <a:buNone/>
+            </a:pPr>
+          </a:p>
+        </p:txBody>
+      </p:sp>
+      <p:sp>
+        <p:nvSpPr>
+          <p:cNvPr id="4" name="슬라이드 번호 개체 틀 6"/>
+          <p:cNvSpPr txBox="1">
+            <a:spLocks/>
+          </p:cNvSpPr>
+          <p:nvPr>
+            <p:ph type="sldNum" idx="5"/>
+          </p:nvPr>
+        </p:nvSpPr>
+        <p:spPr>
+          <a:xfrm rot="0">
+            <a:off x="3884930" y="8685530"/>
+            <a:ext cx="2980690" cy="467360"/>
+          </a:xfrm>
+          <a:prstGeom prst="rect"/>
+        </p:spPr>
+        <p:txBody>
+          <a:bodyPr wrap="square" lIns="91440" tIns="45720" rIns="91440" bIns="45720" numCol="1" vert="horz" anchor="b">
+            <a:noAutofit/>
+          </a:bodyPr>
+          <a:lstStyle>
+            <a:lvl1pPr marL="0" indent="0" algn="r" latinLnBrk="0">
+              <a:buFontTx/>
+              <a:buNone/>
+              <a:defRPr lang="en-GB" altLang="en-US" sz="1200"/>
+            </a:lvl1pPr>
+          </a:lstStyle>
+          <a:p>
+            <a:pPr marL="0" indent="0" latinLnBrk="0">
+              <a:buFontTx/>
+              <a:buNone/>
+            </a:pPr>
+            <a:fld id="{B9320F77-B9A0-41C5-862A-B4B631284C64}" type="slidenum">
+              <a:rPr lang="ko-KR" altLang="en-US"/>
+              <a:t>‹#›</a:t>
+            </a:fld>
+          </a:p>
+        </p:txBody>
+      </p:sp>
+    </p:spTree>
+  </p:cSld>
+  <p:clrMapOvr>
+    <a:masterClrMapping/>
+  </p:clrMapOvr>
+  <mc:AlternateContent xmlns:mc="http://schemas.openxmlformats.org/markup-compatibility/2006">
+    <mc:Choice xmlns:p14="http://schemas.microsoft.com/office/powerpoint/2010/main" Requires="p14">
+      <p:transition spd="slow" p14:dur="0"/>
+    </mc:Choice>
+    <mc:Fallback>
+      <p:transition spd="slow"/>
+    </mc:Fallback>
+  </mc:AlternateContent>
+</p:notes>
+</file>
+
 <file path=ppt/notesSlides/notesSlide2.xml><?xml version="1.0" encoding="utf-8"?>
 <p:notes xmlns:a="http://schemas.openxmlformats.org/drawingml/2006/main" xmlns:r="http://schemas.openxmlformats.org/officeDocument/2006/relationships" xmlns:p="http://schemas.openxmlformats.org/presentationml/2006/main">
   <p:cSld>
@@ -8107,8 +8965,8 @@
         </p:nvSpPr>
         <p:spPr>
           <a:xfrm rot="0">
-            <a:off x="6830695" y="2922905"/>
-            <a:ext cx="4126865" cy="954405"/>
+            <a:off x="6830695" y="2957195"/>
+            <a:ext cx="4127500" cy="955040"/>
           </a:xfrm>
           <a:prstGeom prst="rect"/>
           <a:noFill/>
@@ -8135,7 +8993,7 @@
                 <a:latin typeface="맑은 고딕" charset="0"/>
                 <a:ea typeface="맑은 고딕" charset="0"/>
               </a:rPr>
-              <a:t>2</a:t>
+              <a:t>26.</a:t>
             </a:r>
             <a:r>
               <a:rPr lang="ko-KR" sz="2000" b="1">
@@ -8145,26 +9003,6 @@
                 <a:latin typeface="맑은 고딕" charset="0"/>
                 <a:ea typeface="맑은 고딕" charset="0"/>
               </a:rPr>
-              <a:t>6</a:t>
-            </a:r>
-            <a:r>
-              <a:rPr lang="ko-KR" sz="2000" b="1">
-                <a:solidFill>
-                  <a:srgbClr val="0611F2"/>
-                </a:solidFill>
-                <a:latin typeface="맑은 고딕" charset="0"/>
-                <a:ea typeface="맑은 고딕" charset="0"/>
-              </a:rPr>
-              <a:t>.</a:t>
-            </a:r>
-            <a:r>
-              <a:rPr lang="ko-KR" sz="2000" b="1">
-                <a:solidFill>
-                  <a:srgbClr val="0611F2"/>
-                </a:solidFill>
-                <a:latin typeface="맑은 고딕" charset="0"/>
-                <a:ea typeface="맑은 고딕" charset="0"/>
-              </a:rPr>
               <a:t> </a:t>
             </a:r>
             <a:r>
@@ -8186,42 +9024,21 @@
                 <a:latin typeface="맑은 고딕" charset="0"/>
                 <a:ea typeface="맑은 고딕" charset="0"/>
               </a:rPr>
-              <a:t> </a:t>
-            </a:r>
-            <a:r>
-              <a:rPr lang="ko-KR" sz="1800">
-                <a:latin typeface="맑은 고딕" charset="0"/>
-                <a:ea typeface="맑은 고딕" charset="0"/>
-              </a:rPr>
-              <a:t>앵커를 지정하고 크기와 </a:t>
-            </a:r>
-            <a:r>
-              <a:rPr lang="ko-KR" sz="1800">
-                <a:latin typeface="맑은 고딕" charset="0"/>
-                <a:ea typeface="맑은 고딕" charset="0"/>
-              </a:rPr>
-              <a:t>위</a:t>
-            </a:r>
-            <a:r>
-              <a:rPr lang="ko-KR" sz="1800">
-                <a:latin typeface="맑은 고딕" charset="0"/>
-                <a:ea typeface="맑은 고딕" charset="0"/>
-              </a:rPr>
-              <a:t>치</a:t>
-            </a:r>
-            <a:r>
-              <a:rPr lang="ko-KR" sz="1800">
-                <a:latin typeface="맑은 고딕" charset="0"/>
-                <a:ea typeface="맑은 고딕" charset="0"/>
-              </a:rPr>
-              <a:t> </a:t>
-            </a:r>
-            <a:r>
-              <a:rPr lang="ko-KR" sz="1800">
-                <a:latin typeface="맑은 고딕" charset="0"/>
-                <a:ea typeface="맑은 고딕" charset="0"/>
-              </a:rPr>
-              <a:t>값을 설정합니다.</a:t>
+              <a:t> 앵커를 지정하고 크기와 </a:t>
+            </a:r>
+            <a:r>
+              <a:rPr lang="ko-KR" sz="1800">
+                <a:latin typeface="맑은 고딕" charset="0"/>
+                <a:ea typeface="맑은 고딕" charset="0"/>
+              </a:rPr>
+              <a:t>위치</a:t>
+            </a:r>
+            <a:r>
+              <a:rPr lang="ko-KR" sz="1800">
+                <a:latin typeface="맑은 고딕" charset="0"/>
+                <a:ea typeface="맑은 고딕" charset="0"/>
+              </a:rPr>
+              <a:t> 값을 설정합니다.</a:t>
             </a:r>
             <a:endParaRPr lang="ko-KR" altLang="en-US" sz="1800">
               <a:latin typeface="맑은 고딕" charset="0"/>
@@ -8232,17 +9049,17 @@
       </p:sp>
       <p:pic>
         <p:nvPicPr>
-          <p:cNvPr id="1218" name="그림 7" descr="C:/Users/Admin1/AppData/Roaming/PolarisOffice/ETemp/30512_13752872/fImage1197515441.png"/>
+          <p:cNvPr id="1218" name="그림 7" descr="C:/Users/Admin1/AppData/Roaming/PolarisOffice/ETemp/4316_14940424/fImage1197515441.png"/>
           <p:cNvPicPr>
             <a:picLocks noChangeAspect="1"/>
           </p:cNvPicPr>
           <p:nvPr/>
         </p:nvPicPr>
         <p:blipFill rotWithShape="1">
-          <a:blip r:embed="rId10" cstate="print">
+          <a:blip r:embed="rId10" cstate="hqprint">
             <a:extLst>
               <a:ext uri="{28A0092B-C50C-407E-A947-70E740481C1C}">
-                <a14:useLocalDpi xmlns:a14="http://schemas.microsoft.com/office/drawing/2010/main" val="0"/>
+                <a14:useLocalDpi xmlns:a14="http://schemas.microsoft.com/office/drawing/2010/main"/>
               </a:ext>
             </a:extLst>
           </a:blip>
@@ -8252,8 +9069,8 @@
         </p:blipFill>
         <p:spPr>
           <a:xfrm rot="0">
-            <a:off x="6828155" y="3996690"/>
-            <a:ext cx="4129405" cy="1421765"/>
+            <a:off x="6828155" y="3979545"/>
+            <a:ext cx="4130040" cy="1473835"/>
           </a:xfrm>
           <a:prstGeom prst="roundRect"/>
           <a:solidFill>
@@ -8362,17 +9179,17 @@
       </p:sp>
       <p:pic>
         <p:nvPicPr>
-          <p:cNvPr id="1220" name="그림 11" descr="C:/Users/Admin1/AppData/Roaming/PolarisOffice/ETemp/30512_13752872/fImage123522408467.png"/>
+          <p:cNvPr id="1220" name="그림 11" descr="C:/Users/Admin1/AppData/Roaming/PolarisOffice/ETemp/4316_14940424/fImage123522408467.png"/>
           <p:cNvPicPr>
             <a:picLocks noChangeAspect="1"/>
           </p:cNvPicPr>
           <p:nvPr/>
         </p:nvPicPr>
         <p:blipFill rotWithShape="1">
-          <a:blip r:embed="rId11" cstate="print">
+          <a:blip r:embed="rId11" cstate="hqprint">
             <a:extLst>
               <a:ext uri="{28A0092B-C50C-407E-A947-70E740481C1C}">
-                <a14:useLocalDpi xmlns:a14="http://schemas.microsoft.com/office/drawing/2010/main" val="0"/>
+                <a14:useLocalDpi xmlns:a14="http://schemas.microsoft.com/office/drawing/2010/main"/>
               </a:ext>
             </a:extLst>
           </a:blip>
@@ -8383,7 +9200,7 @@
         <p:spPr>
           <a:xfrm rot="0">
             <a:off x="6830695" y="1455420"/>
-            <a:ext cx="4126865" cy="1396365"/>
+            <a:ext cx="4127500" cy="1447800"/>
           </a:xfrm>
           <a:prstGeom prst="roundRect"/>
           <a:solidFill>
@@ -10578,6 +11395,3752 @@
           </a:p>
         </p:txBody>
       </p:sp>
+    </p:spTree>
+  </p:cSld>
+  <p:clrMapOvr>
+    <a:masterClrMapping/>
+  </p:clrMapOvr>
+  <mc:AlternateContent xmlns:mc="http://schemas.openxmlformats.org/markup-compatibility/2006">
+    <mc:Choice xmlns:p14="http://schemas.microsoft.com/office/powerpoint/2010/main" Requires="p14">
+      <p:transition spd="slow" p14:dur="2000"/>
+    </mc:Choice>
+    <mc:Fallback>
+      <p:transition spd="slow"/>
+    </mc:Fallback>
+  </mc:AlternateContent>
+  <p:timing>
+    <p:tnLst>
+      <p:par>
+        <p:cTn id="1" dur="indefinite" restart="never" nodeType="tmRoot"/>
+      </p:par>
+    </p:tnLst>
+  </p:timing>
+</p:sld>
+</file>
+
+<file path=ppt/slides/slide14.xml><?xml version="1.0" encoding="utf-8"?>
+<p:sld xmlns:a="http://schemas.openxmlformats.org/drawingml/2006/main" xmlns:r="http://schemas.openxmlformats.org/officeDocument/2006/relationships" xmlns:p="http://schemas.openxmlformats.org/presentationml/2006/main">
+  <p:cSld>
+    <p:spTree>
+      <p:nvGrpSpPr>
+        <p:cNvPr id="1" name=""/>
+        <p:cNvGrpSpPr/>
+        <p:nvPr/>
+      </p:nvGrpSpPr>
+      <p:grpSpPr>
+        <a:xfrm>
+          <a:off x="0" y="0"/>
+          <a:ext cx="0" cy="0"/>
+          <a:chOff x="0" y="0"/>
+          <a:chExt cx="0" cy="0"/>
+        </a:xfrm>
+      </p:grpSpPr>
+      <p:sp>
+        <p:nvSpPr>
+          <p:cNvPr id="1154" name="Rect 0"/>
+          <p:cNvSpPr txBox="1">
+            <a:spLocks/>
+          </p:cNvSpPr>
+          <p:nvPr/>
+        </p:nvSpPr>
+        <p:spPr>
+          <a:xfrm rot="0">
+            <a:off x="4280535" y="405130"/>
+            <a:ext cx="3630930" cy="478155"/>
+          </a:xfrm>
+          <a:prstGeom prst="rect"/>
+          <a:noFill/>
+          <a:ln w="0">
+            <a:noFill/>
+            <a:prstDash/>
+          </a:ln>
+        </p:spPr>
+        <p:txBody>
+          <a:bodyPr wrap="square" lIns="89535" tIns="46355" rIns="89535" bIns="46355" numCol="1" vert="horz" anchor="t">
+            <a:spAutoFit/>
+          </a:bodyPr>
+          <a:lstStyle/>
+          <a:p>
+            <a:pPr marL="0" indent="0" algn="ctr" latinLnBrk="0">
+              <a:buFontTx/>
+              <a:buNone/>
+            </a:pPr>
+            <a:r>
+              <a:rPr lang="ko-KR" altLang="en-US" sz="2500" b="1">
+                <a:solidFill>
+                  <a:schemeClr val="tx1"/>
+                </a:solidFill>
+                <a:latin typeface="나눔바른고딕" charset="0"/>
+                <a:ea typeface="나눔바른고딕" charset="0"/>
+              </a:rPr>
+              <a:t>열네</a:t>
+            </a:r>
+            <a:r>
+              <a:rPr lang="ko-KR" altLang="en-US" sz="2500" b="1">
+                <a:solidFill>
+                  <a:schemeClr val="tx1"/>
+                </a:solidFill>
+                <a:latin typeface="나눔바른고딕" charset="0"/>
+                <a:ea typeface="나눔바른고딕" charset="0"/>
+              </a:rPr>
+              <a:t> 번째 튜토리얼</a:t>
+            </a:r>
+            <a:endParaRPr lang="ko-KR" altLang="en-US" sz="2500" b="1">
+              <a:solidFill>
+                <a:schemeClr val="tx1"/>
+              </a:solidFill>
+              <a:latin typeface="나눔바른고딕" charset="0"/>
+              <a:ea typeface="나눔바른고딕" charset="0"/>
+            </a:endParaRPr>
+          </a:p>
+        </p:txBody>
+      </p:sp>
+      <p:sp>
+        <p:nvSpPr>
+          <p:cNvPr id="1207" name="Rect 0"/>
+          <p:cNvSpPr txBox="1">
+            <a:spLocks/>
+          </p:cNvSpPr>
+          <p:nvPr/>
+        </p:nvSpPr>
+        <p:spPr>
+          <a:xfrm rot="0">
+            <a:off x="1240790" y="5240020"/>
+            <a:ext cx="4135120" cy="936625"/>
+          </a:xfrm>
+          <a:prstGeom prst="rect"/>
+          <a:noFill/>
+        </p:spPr>
+        <p:txBody>
+          <a:bodyPr wrap="square" lIns="0" tIns="0" rIns="0" bIns="0" numCol="1" vert="horz" anchor="t">
+            <a:noAutofit/>
+          </a:bodyPr>
+          <a:lstStyle/>
+          <a:p>
+            <a:pPr marL="0" indent="0" rtl="0" algn="l" defTabSz="914400" eaLnBrk="1" latinLnBrk="0" hangingPunct="1">
+              <a:buFontTx/>
+              <a:buNone/>
+            </a:pPr>
+            <a:r>
+              <a:rPr sz="2000" b="1">
+                <a:solidFill>
+                  <a:srgbClr val="0611F2"/>
+                </a:solidFill>
+                <a:latin typeface="맑은 고딕" charset="0"/>
+                <a:ea typeface="맑은 고딕" charset="0"/>
+              </a:rPr>
+              <a:t>3</a:t>
+            </a:r>
+            <a:r>
+              <a:rPr sz="2000" b="1">
+                <a:solidFill>
+                  <a:srgbClr val="0611F2"/>
+                </a:solidFill>
+                <a:latin typeface="맑은 고딕" charset="0"/>
+                <a:ea typeface="맑은 고딕" charset="0"/>
+              </a:rPr>
+              <a:t>5</a:t>
+            </a:r>
+            <a:r>
+              <a:rPr sz="2000" b="1">
+                <a:solidFill>
+                  <a:srgbClr val="0611F2"/>
+                </a:solidFill>
+                <a:latin typeface="맑은 고딕" charset="0"/>
+                <a:ea typeface="맑은 고딕" charset="0"/>
+              </a:rPr>
+              <a:t>.</a:t>
+            </a:r>
+            <a:r>
+              <a:rPr sz="2000" b="1">
+                <a:solidFill>
+                  <a:srgbClr val="0611F2"/>
+                </a:solidFill>
+                <a:latin typeface="맑은 고딕" charset="0"/>
+                <a:ea typeface="맑은 고딕" charset="0"/>
+              </a:rPr>
+              <a:t> </a:t>
+            </a:r>
+            <a:r>
+              <a:rPr sz="1800">
+                <a:latin typeface="맑은 고딕" charset="0"/>
+                <a:ea typeface="맑은 고딕" charset="0"/>
+              </a:rPr>
+              <a:t>그리고 </a:t>
+            </a:r>
+            <a:r>
+              <a:rPr sz="1800">
+                <a:latin typeface="맑은 고딕" charset="0"/>
+                <a:ea typeface="맑은 고딕" charset="0"/>
+              </a:rPr>
+              <a:t>C# Script를 생성한 다음 </a:t>
+            </a:r>
+            <a:r>
+              <a:rPr sz="1800">
+                <a:latin typeface="맑은 고딕" charset="0"/>
+                <a:ea typeface="맑은 고딕" charset="0"/>
+              </a:rPr>
+              <a:t>PhysicsManager</a:t>
+            </a:r>
+            <a:r>
+              <a:rPr sz="1800">
+                <a:latin typeface="맑은 고딕" charset="0"/>
+                <a:ea typeface="맑은 고딕" charset="0"/>
+              </a:rPr>
+              <a:t> 라는 이름으로 </a:t>
+            </a:r>
+            <a:r>
+              <a:rPr sz="1800">
+                <a:latin typeface="맑은 고딕" charset="0"/>
+                <a:ea typeface="맑은 고딕" charset="0"/>
+              </a:rPr>
+              <a:t>정의합니다.</a:t>
+            </a:r>
+            <a:r>
+              <a:rPr sz="1800">
+                <a:latin typeface="맑은 고딕" charset="0"/>
+                <a:ea typeface="맑은 고딕" charset="0"/>
+              </a:rPr>
+              <a:t> </a:t>
+            </a:r>
+            <a:endParaRPr lang="ko-KR" altLang="en-US" sz="1800">
+              <a:latin typeface="맑은 고딕" charset="0"/>
+              <a:ea typeface="맑은 고딕" charset="0"/>
+            </a:endParaRPr>
+          </a:p>
+        </p:txBody>
+      </p:sp>
+      <p:pic>
+        <p:nvPicPr>
+          <p:cNvPr id="1219" name="그림 2" descr="C:/Users/Admin1/AppData/Roaming/PolarisOffice/ETemp/4316_14940424/fImage828928641.png"/>
+          <p:cNvPicPr>
+            <a:picLocks noChangeAspect="1"/>
+          </p:cNvPicPr>
+          <p:nvPr/>
+        </p:nvPicPr>
+        <p:blipFill rotWithShape="1">
+          <a:blip r:embed="rId2" cstate="hqprint">
+            <a:extLst>
+              <a:ext uri="{28A0092B-C50C-407E-A947-70E740481C1C}">
+                <a14:useLocalDpi xmlns:a14="http://schemas.microsoft.com/office/drawing/2010/main"/>
+              </a:ext>
+            </a:extLst>
+          </a:blip>
+          <a:stretch>
+            <a:fillRect/>
+          </a:stretch>
+        </p:blipFill>
+        <p:spPr>
+          <a:xfrm rot="0">
+            <a:off x="1240790" y="1446530"/>
+            <a:ext cx="2868930" cy="3542665"/>
+          </a:xfrm>
+          <a:prstGeom prst="roundRect"/>
+          <a:solidFill>
+            <a:srgbClr val="EDEDED"/>
+          </a:solidFill>
+        </p:spPr>
+      </p:pic>
+      <p:pic>
+        <p:nvPicPr>
+          <p:cNvPr id="1220" name="그림 3" descr="C:/Users/Admin1/AppData/Roaming/PolarisOffice/ETemp/4316_14940424/fImage25972878467.png"/>
+          <p:cNvPicPr>
+            <a:picLocks noChangeAspect="1"/>
+          </p:cNvPicPr>
+          <p:nvPr/>
+        </p:nvPicPr>
+        <p:blipFill rotWithShape="1">
+          <a:blip r:embed="rId3" cstate="print">
+            <a:extLst>
+              <a:ext uri="{28A0092B-C50C-407E-A947-70E740481C1C}">
+                <a14:useLocalDpi xmlns:a14="http://schemas.microsoft.com/office/drawing/2010/main" val="0"/>
+              </a:ext>
+            </a:extLst>
+          </a:blip>
+          <a:stretch>
+            <a:fillRect/>
+          </a:stretch>
+        </p:blipFill>
+        <p:spPr>
+          <a:xfrm rot="0">
+            <a:off x="4358640" y="2626995"/>
+            <a:ext cx="1017270" cy="1189355"/>
+          </a:xfrm>
+          <a:prstGeom prst="roundRect"/>
+          <a:solidFill>
+            <a:srgbClr val="EDEDED"/>
+          </a:solidFill>
+        </p:spPr>
+      </p:pic>
+      <p:pic>
+        <p:nvPicPr>
+          <p:cNvPr id="1221" name="그림 7" descr="C:/Users/Admin1/AppData/Roaming/PolarisOffice/ETemp/4316_14940424/fImage2242172906334.png"/>
+          <p:cNvPicPr>
+            <a:picLocks noChangeAspect="1"/>
+          </p:cNvPicPr>
+          <p:nvPr/>
+        </p:nvPicPr>
+        <p:blipFill rotWithShape="1">
+          <a:blip r:embed="rId4" cstate="hqprint">
+            <a:extLst>
+              <a:ext uri="{28A0092B-C50C-407E-A947-70E740481C1C}">
+                <a14:useLocalDpi xmlns:a14="http://schemas.microsoft.com/office/drawing/2010/main"/>
+              </a:ext>
+            </a:extLst>
+          </a:blip>
+          <a:stretch>
+            <a:fillRect/>
+          </a:stretch>
+        </p:blipFill>
+        <p:spPr>
+          <a:xfrm rot="0">
+            <a:off x="3616325" y="2945765"/>
+            <a:ext cx="1156970" cy="552450"/>
+          </a:xfrm>
+          <a:prstGeom prst="rect"/>
+          <a:noFill/>
+        </p:spPr>
+      </p:pic>
+      <p:pic>
+        <p:nvPicPr>
+          <p:cNvPr id="1222" name="그림 16" descr="C:/Users/Admin1/AppData/Roaming/PolarisOffice/ETemp/4316_14940424/fImage104043106500.png"/>
+          <p:cNvPicPr>
+            <a:picLocks noChangeAspect="1"/>
+          </p:cNvPicPr>
+          <p:nvPr/>
+        </p:nvPicPr>
+        <p:blipFill rotWithShape="1">
+          <a:blip r:embed="rId5" cstate="print">
+            <a:extLst>
+              <a:ext uri="{28A0092B-C50C-407E-A947-70E740481C1C}">
+                <a14:useLocalDpi xmlns:a14="http://schemas.microsoft.com/office/drawing/2010/main" val="0"/>
+              </a:ext>
+            </a:extLst>
+          </a:blip>
+          <a:stretch>
+            <a:fillRect/>
+          </a:stretch>
+        </p:blipFill>
+        <p:spPr>
+          <a:xfrm rot="0">
+            <a:off x="6822440" y="1455420"/>
+            <a:ext cx="1567815" cy="1258570"/>
+          </a:xfrm>
+          <a:prstGeom prst="roundRect"/>
+          <a:solidFill>
+            <a:srgbClr val="EDEDED"/>
+          </a:solidFill>
+        </p:spPr>
+      </p:pic>
+      <p:pic>
+        <p:nvPicPr>
+          <p:cNvPr id="1223" name="그림 19" descr="C:/Users/Admin1/AppData/Roaming/PolarisOffice/ETemp/4316_14940424/fImage131203119169.png"/>
+          <p:cNvPicPr>
+            <a:picLocks noChangeAspect="1"/>
+          </p:cNvPicPr>
+          <p:nvPr/>
+        </p:nvPicPr>
+        <p:blipFill rotWithShape="1">
+          <a:blip r:embed="rId6" cstate="print">
+            <a:extLst>
+              <a:ext uri="{28A0092B-C50C-407E-A947-70E740481C1C}">
+                <a14:useLocalDpi xmlns:a14="http://schemas.microsoft.com/office/drawing/2010/main" val="0"/>
+              </a:ext>
+            </a:extLst>
+          </a:blip>
+          <a:stretch>
+            <a:fillRect/>
+          </a:stretch>
+        </p:blipFill>
+        <p:spPr>
+          <a:xfrm rot="0">
+            <a:off x="8536305" y="1447165"/>
+            <a:ext cx="2429510" cy="1257935"/>
+          </a:xfrm>
+          <a:prstGeom prst="roundRect"/>
+          <a:solidFill>
+            <a:srgbClr val="EDEDED"/>
+          </a:solidFill>
+        </p:spPr>
+      </p:pic>
+      <p:sp>
+        <p:nvSpPr>
+          <p:cNvPr id="1224" name="텍스트 상자 22"/>
+          <p:cNvSpPr txBox="1">
+            <a:spLocks/>
+          </p:cNvSpPr>
+          <p:nvPr/>
+        </p:nvSpPr>
+        <p:spPr>
+          <a:xfrm rot="0">
+            <a:off x="6824980" y="2814320"/>
+            <a:ext cx="4135120" cy="936625"/>
+          </a:xfrm>
+          <a:prstGeom prst="rect"/>
+          <a:noFill/>
+        </p:spPr>
+        <p:txBody>
+          <a:bodyPr wrap="square" lIns="0" tIns="0" rIns="0" bIns="0" numCol="1" vert="horz" anchor="t">
+            <a:noAutofit/>
+          </a:bodyPr>
+          <a:lstStyle/>
+          <a:p>
+            <a:pPr marL="0" indent="0" rtl="0" algn="l" defTabSz="914400" eaLnBrk="1" latinLnBrk="0" hangingPunct="1">
+              <a:buFontTx/>
+              <a:buNone/>
+            </a:pPr>
+            <a:r>
+              <a:rPr sz="2000" b="1">
+                <a:solidFill>
+                  <a:srgbClr val="0611F2"/>
+                </a:solidFill>
+                <a:latin typeface="맑은 고딕" charset="0"/>
+                <a:ea typeface="맑은 고딕" charset="0"/>
+              </a:rPr>
+              <a:t>3</a:t>
+            </a:r>
+            <a:r>
+              <a:rPr lang="ko-KR" sz="2000" b="1">
+                <a:solidFill>
+                  <a:srgbClr val="0611F2"/>
+                </a:solidFill>
+                <a:latin typeface="맑은 고딕" charset="0"/>
+                <a:ea typeface="맑은 고딕" charset="0"/>
+              </a:rPr>
+              <a:t>6</a:t>
+            </a:r>
+            <a:r>
+              <a:rPr sz="2000" b="1">
+                <a:solidFill>
+                  <a:srgbClr val="0611F2"/>
+                </a:solidFill>
+                <a:latin typeface="맑은 고딕" charset="0"/>
+                <a:ea typeface="맑은 고딕" charset="0"/>
+              </a:rPr>
+              <a:t>.</a:t>
+            </a:r>
+            <a:r>
+              <a:rPr sz="2000" b="1">
+                <a:solidFill>
+                  <a:srgbClr val="0611F2"/>
+                </a:solidFill>
+                <a:latin typeface="맑은 고딕" charset="0"/>
+                <a:ea typeface="맑은 고딕" charset="0"/>
+              </a:rPr>
+              <a:t> </a:t>
+            </a:r>
+            <a:r>
+              <a:rPr sz="1800">
+                <a:latin typeface="맑은 고딕" charset="0"/>
+                <a:ea typeface="맑은 고딕" charset="0"/>
+              </a:rPr>
+              <a:t>그런 다음 </a:t>
+            </a:r>
+            <a:r>
+              <a:rPr sz="1800">
+                <a:latin typeface="맑은 고딕" charset="0"/>
+                <a:ea typeface="맑은 고딕" charset="0"/>
+              </a:rPr>
+              <a:t>Canvas의 Render </a:t>
+            </a:r>
+            <a:r>
+              <a:rPr sz="1800">
+                <a:latin typeface="맑은 고딕" charset="0"/>
+                <a:ea typeface="맑은 고딕" charset="0"/>
+              </a:rPr>
+              <a:t>Camera</a:t>
+            </a:r>
+            <a:r>
+              <a:rPr sz="1800">
+                <a:latin typeface="맑은 고딕" charset="0"/>
+                <a:ea typeface="맑은 고딕" charset="0"/>
+              </a:rPr>
+              <a:t>에</a:t>
+            </a:r>
+            <a:r>
+              <a:rPr sz="1800">
+                <a:latin typeface="맑은 고딕" charset="0"/>
+                <a:ea typeface="맑은 고딕" charset="0"/>
+              </a:rPr>
+              <a:t> </a:t>
+            </a:r>
+            <a:r>
+              <a:rPr sz="1800">
+                <a:latin typeface="맑은 고딕" charset="0"/>
+                <a:ea typeface="맑은 고딕" charset="0"/>
+              </a:rPr>
+              <a:t>Main Camera 오브젝트를 </a:t>
+            </a:r>
+            <a:r>
+              <a:rPr sz="1800">
+                <a:latin typeface="맑은 고딕" charset="0"/>
+                <a:ea typeface="맑은 고딕" charset="0"/>
+              </a:rPr>
+              <a:t>넣어줍니</a:t>
+            </a:r>
+            <a:r>
+              <a:rPr lang="ko-KR" sz="1800">
+                <a:latin typeface="맑은 고딕" charset="0"/>
+                <a:ea typeface="맑은 고딕" charset="0"/>
+              </a:rPr>
+              <a:t>다.</a:t>
+            </a:r>
+            <a:endParaRPr lang="ko-KR" altLang="en-US" sz="1800">
+              <a:latin typeface="맑은 고딕" charset="0"/>
+              <a:ea typeface="맑은 고딕" charset="0"/>
+            </a:endParaRPr>
+          </a:p>
+        </p:txBody>
+      </p:sp>
+      <p:cxnSp>
+        <p:nvCxnSpPr>
+          <p:cNvPr id="1225" name="도형 23"/>
+          <p:cNvCxnSpPr/>
+          <p:nvPr/>
+        </p:nvCxnSpPr>
+        <p:spPr>
+          <a:xfrm rot="0">
+            <a:off x="7683500" y="1654175"/>
+            <a:ext cx="3170555" cy="310515"/>
+          </a:xfrm>
+          <a:prstGeom prst="straightConnector1"/>
+          <a:ln w="6350" cap="flat" cmpd="sng">
+            <a:prstDash/>
+            <a:headEnd type="none" w="med" len="med"/>
+            <a:tailEnd type="triangle" w="med" len="med"/>
+          </a:ln>
+        </p:spPr>
+        <p:style>
+          <a:lnRef idx="1">
+            <a:schemeClr val="accent1"/>
+          </a:lnRef>
+          <a:fillRef idx="0">
+            <a:schemeClr val="accent1"/>
+          </a:fillRef>
+          <a:effectRef idx="0">
+            <a:schemeClr val="accent1"/>
+          </a:effectRef>
+          <a:fontRef idx="minor">
+            <a:schemeClr val="tx1"/>
+          </a:fontRef>
+        </p:style>
+      </p:cxnSp>
+      <p:pic>
+        <p:nvPicPr>
+          <p:cNvPr id="1226" name="그림 24" descr="C:/Users/Admin1/AppData/Roaming/PolarisOffice/ETemp/4316_14940424/fImage45613145724.png"/>
+          <p:cNvPicPr>
+            <a:picLocks noChangeAspect="1"/>
+          </p:cNvPicPr>
+          <p:nvPr/>
+        </p:nvPicPr>
+        <p:blipFill rotWithShape="1">
+          <a:blip r:embed="rId7" cstate="print">
+            <a:extLst>
+              <a:ext uri="{28A0092B-C50C-407E-A947-70E740481C1C}">
+                <a14:useLocalDpi xmlns:a14="http://schemas.microsoft.com/office/drawing/2010/main" val="0"/>
+              </a:ext>
+            </a:extLst>
+          </a:blip>
+          <a:stretch>
+            <a:fillRect/>
+          </a:stretch>
+        </p:blipFill>
+        <p:spPr>
+          <a:xfrm rot="0">
+            <a:off x="6819265" y="3841750"/>
+            <a:ext cx="4138295" cy="1508125"/>
+          </a:xfrm>
+          <a:prstGeom prst="roundRect"/>
+          <a:solidFill>
+            <a:srgbClr val="EDEDED"/>
+          </a:solidFill>
+        </p:spPr>
+      </p:pic>
+      <p:sp>
+        <p:nvSpPr>
+          <p:cNvPr id="1227" name="텍스트 상자 27"/>
+          <p:cNvSpPr txBox="1">
+            <a:spLocks/>
+          </p:cNvSpPr>
+          <p:nvPr/>
+        </p:nvSpPr>
+        <p:spPr>
+          <a:xfrm rot="0">
+            <a:off x="6827520" y="5521960"/>
+            <a:ext cx="4147185" cy="654685"/>
+          </a:xfrm>
+          <a:prstGeom prst="rect"/>
+          <a:noFill/>
+        </p:spPr>
+        <p:txBody>
+          <a:bodyPr wrap="square" lIns="0" tIns="0" rIns="0" bIns="0" numCol="1" vert="horz" anchor="t">
+            <a:noAutofit/>
+          </a:bodyPr>
+          <a:lstStyle/>
+          <a:p>
+            <a:pPr marL="0" indent="0" rtl="0" algn="l" defTabSz="914400" eaLnBrk="1" latinLnBrk="0" hangingPunct="1">
+              <a:buFontTx/>
+              <a:buNone/>
+            </a:pPr>
+            <a:r>
+              <a:rPr sz="2000" b="1">
+                <a:solidFill>
+                  <a:srgbClr val="0611F2"/>
+                </a:solidFill>
+                <a:latin typeface="맑은 고딕" charset="0"/>
+                <a:ea typeface="맑은 고딕" charset="0"/>
+              </a:rPr>
+              <a:t>3</a:t>
+            </a:r>
+            <a:r>
+              <a:rPr lang="ko-KR" sz="2000" b="1">
+                <a:solidFill>
+                  <a:srgbClr val="0611F2"/>
+                </a:solidFill>
+                <a:latin typeface="맑은 고딕" charset="0"/>
+                <a:ea typeface="맑은 고딕" charset="0"/>
+              </a:rPr>
+              <a:t>7</a:t>
+            </a:r>
+            <a:r>
+              <a:rPr sz="2000" b="1">
+                <a:solidFill>
+                  <a:srgbClr val="0611F2"/>
+                </a:solidFill>
+                <a:latin typeface="맑은 고딕" charset="0"/>
+                <a:ea typeface="맑은 고딕" charset="0"/>
+              </a:rPr>
+              <a:t>.</a:t>
+            </a:r>
+            <a:r>
+              <a:rPr sz="2000" b="1">
+                <a:solidFill>
+                  <a:srgbClr val="0611F2"/>
+                </a:solidFill>
+                <a:latin typeface="맑은 고딕" charset="0"/>
+                <a:ea typeface="맑은 고딕" charset="0"/>
+              </a:rPr>
+              <a:t> </a:t>
+            </a:r>
+            <a:r>
+              <a:rPr sz="1800">
+                <a:latin typeface="맑은 고딕" charset="0"/>
+                <a:ea typeface="맑은 고딕" charset="0"/>
+              </a:rPr>
+              <a:t>그다음으로 </a:t>
+            </a:r>
+            <a:r>
+              <a:rPr sz="1800">
+                <a:latin typeface="맑은 고딕" charset="0"/>
+                <a:ea typeface="맑은 고딕" charset="0"/>
+              </a:rPr>
+              <a:t>Skeleton 오브젝트에 </a:t>
+            </a:r>
+            <a:r>
+              <a:rPr sz="1800">
+                <a:latin typeface="맑은 고딕" charset="0"/>
+                <a:ea typeface="맑은 고딕" charset="0"/>
+              </a:rPr>
+              <a:t>Skeleton</a:t>
+            </a:r>
+            <a:r>
+              <a:rPr sz="1800">
+                <a:latin typeface="맑은 고딕" charset="0"/>
+                <a:ea typeface="맑은 고딕" charset="0"/>
+              </a:rPr>
+              <a:t> 스크립트를 </a:t>
+            </a:r>
+            <a:r>
+              <a:rPr sz="1800">
+                <a:latin typeface="맑은 고딕" charset="0"/>
+                <a:ea typeface="맑은 고딕" charset="0"/>
+              </a:rPr>
+              <a:t>추가합니</a:t>
+            </a:r>
+            <a:r>
+              <a:rPr sz="1800">
+                <a:latin typeface="맑은 고딕" charset="0"/>
+                <a:ea typeface="맑은 고딕" charset="0"/>
+              </a:rPr>
+              <a:t>다.</a:t>
+            </a:r>
+            <a:endParaRPr lang="ko-KR" altLang="en-US" sz="1800">
+              <a:latin typeface="맑은 고딕" charset="0"/>
+              <a:ea typeface="맑은 고딕" charset="0"/>
+            </a:endParaRPr>
+          </a:p>
+        </p:txBody>
+      </p:sp>
+    </p:spTree>
+  </p:cSld>
+  <p:clrMapOvr>
+    <a:masterClrMapping/>
+  </p:clrMapOvr>
+  <mc:AlternateContent xmlns:mc="http://schemas.openxmlformats.org/markup-compatibility/2006">
+    <mc:Choice xmlns:p14="http://schemas.microsoft.com/office/powerpoint/2010/main" Requires="p14">
+      <p:transition spd="slow" p14:dur="2000"/>
+    </mc:Choice>
+    <mc:Fallback>
+      <p:transition spd="slow"/>
+    </mc:Fallback>
+  </mc:AlternateContent>
+  <p:timing>
+    <p:tnLst>
+      <p:par>
+        <p:cTn id="1" dur="indefinite" restart="never" nodeType="tmRoot"/>
+      </p:par>
+    </p:tnLst>
+  </p:timing>
+</p:sld>
+</file>
+
+<file path=ppt/slides/slide15.xml><?xml version="1.0" encoding="utf-8"?>
+<p:sld xmlns:a="http://schemas.openxmlformats.org/drawingml/2006/main" xmlns:r="http://schemas.openxmlformats.org/officeDocument/2006/relationships" xmlns:p="http://schemas.openxmlformats.org/presentationml/2006/main">
+  <p:cSld>
+    <p:spTree>
+      <p:nvGrpSpPr>
+        <p:cNvPr id="1" name=""/>
+        <p:cNvGrpSpPr/>
+        <p:nvPr/>
+      </p:nvGrpSpPr>
+      <p:grpSpPr>
+        <a:xfrm>
+          <a:off x="0" y="0"/>
+          <a:ext cx="0" cy="0"/>
+          <a:chOff x="0" y="0"/>
+          <a:chExt cx="0" cy="0"/>
+        </a:xfrm>
+      </p:grpSpPr>
+      <p:sp>
+        <p:nvSpPr>
+          <p:cNvPr id="1154" name="Rect 0"/>
+          <p:cNvSpPr txBox="1">
+            <a:spLocks/>
+          </p:cNvSpPr>
+          <p:nvPr/>
+        </p:nvSpPr>
+        <p:spPr>
+          <a:xfrm rot="0">
+            <a:off x="4280535" y="405130"/>
+            <a:ext cx="3630930" cy="478155"/>
+          </a:xfrm>
+          <a:prstGeom prst="rect"/>
+          <a:noFill/>
+          <a:ln w="0">
+            <a:noFill/>
+            <a:prstDash/>
+          </a:ln>
+        </p:spPr>
+        <p:txBody>
+          <a:bodyPr wrap="square" lIns="89535" tIns="46355" rIns="89535" bIns="46355" numCol="1" vert="horz" anchor="t">
+            <a:spAutoFit/>
+          </a:bodyPr>
+          <a:lstStyle/>
+          <a:p>
+            <a:pPr marL="0" indent="0" algn="ctr" latinLnBrk="0">
+              <a:buFontTx/>
+              <a:buNone/>
+            </a:pPr>
+            <a:r>
+              <a:rPr lang="ko-KR" altLang="en-US" sz="2500" b="1">
+                <a:solidFill>
+                  <a:schemeClr val="tx1"/>
+                </a:solidFill>
+                <a:latin typeface="나눔바른고딕" charset="0"/>
+                <a:ea typeface="나눔바른고딕" charset="0"/>
+              </a:rPr>
+              <a:t>열다섯</a:t>
+            </a:r>
+            <a:r>
+              <a:rPr lang="ko-KR" altLang="en-US" sz="2500" b="1">
+                <a:solidFill>
+                  <a:schemeClr val="tx1"/>
+                </a:solidFill>
+                <a:latin typeface="나눔바른고딕" charset="0"/>
+                <a:ea typeface="나눔바른고딕" charset="0"/>
+              </a:rPr>
+              <a:t> 번째 튜토리얼</a:t>
+            </a:r>
+            <a:endParaRPr lang="ko-KR" altLang="en-US" sz="2500" b="1">
+              <a:solidFill>
+                <a:schemeClr val="tx1"/>
+              </a:solidFill>
+              <a:latin typeface="나눔바른고딕" charset="0"/>
+              <a:ea typeface="나눔바른고딕" charset="0"/>
+            </a:endParaRPr>
+          </a:p>
+        </p:txBody>
+      </p:sp>
+      <p:sp>
+        <p:nvSpPr>
+          <p:cNvPr id="1207" name="Rect 0"/>
+          <p:cNvSpPr txBox="1">
+            <a:spLocks/>
+          </p:cNvSpPr>
+          <p:nvPr/>
+        </p:nvSpPr>
+        <p:spPr>
+          <a:xfrm rot="0">
+            <a:off x="1240790" y="5240020"/>
+            <a:ext cx="4135120" cy="936625"/>
+          </a:xfrm>
+          <a:prstGeom prst="rect"/>
+          <a:noFill/>
+        </p:spPr>
+        <p:txBody>
+          <a:bodyPr wrap="square" lIns="0" tIns="0" rIns="0" bIns="0" numCol="1" vert="horz" anchor="t">
+            <a:noAutofit/>
+          </a:bodyPr>
+          <a:lstStyle/>
+          <a:p>
+            <a:pPr marL="0" indent="0" rtl="0" algn="l" defTabSz="914400" eaLnBrk="1" latinLnBrk="0" hangingPunct="1">
+              <a:buFontTx/>
+              <a:buNone/>
+            </a:pPr>
+            <a:r>
+              <a:rPr sz="2000" b="1">
+                <a:solidFill>
+                  <a:srgbClr val="0611F2"/>
+                </a:solidFill>
+                <a:latin typeface="맑은 고딕" charset="0"/>
+                <a:ea typeface="맑은 고딕" charset="0"/>
+              </a:rPr>
+              <a:t>3</a:t>
+            </a:r>
+            <a:r>
+              <a:rPr lang="ko-KR" sz="2000" b="1">
+                <a:solidFill>
+                  <a:srgbClr val="0611F2"/>
+                </a:solidFill>
+                <a:latin typeface="맑은 고딕" charset="0"/>
+                <a:ea typeface="맑은 고딕" charset="0"/>
+              </a:rPr>
+              <a:t>8</a:t>
+            </a:r>
+            <a:r>
+              <a:rPr sz="2000" b="1">
+                <a:solidFill>
+                  <a:srgbClr val="0611F2"/>
+                </a:solidFill>
+                <a:latin typeface="맑은 고딕" charset="0"/>
+                <a:ea typeface="맑은 고딕" charset="0"/>
+              </a:rPr>
+              <a:t>.</a:t>
+            </a:r>
+            <a:r>
+              <a:rPr sz="2000" b="1">
+                <a:solidFill>
+                  <a:srgbClr val="0611F2"/>
+                </a:solidFill>
+                <a:latin typeface="맑은 고딕" charset="0"/>
+                <a:ea typeface="맑은 고딕" charset="0"/>
+              </a:rPr>
+              <a:t> </a:t>
+            </a:r>
+            <a:r>
+              <a:rPr sz="1800">
+                <a:latin typeface="맑은 고딕" charset="0"/>
+                <a:ea typeface="맑은 고딕" charset="0"/>
+              </a:rPr>
+              <a:t>그러고 나서 </a:t>
+            </a:r>
+            <a:r>
+              <a:rPr sz="1800">
+                <a:latin typeface="맑은 고딕" charset="0"/>
+                <a:ea typeface="맑은 고딕" charset="0"/>
+              </a:rPr>
+              <a:t>C# Script를 생성한 </a:t>
+            </a:r>
+            <a:r>
+              <a:rPr sz="1800">
+                <a:latin typeface="맑은 고딕" charset="0"/>
+                <a:ea typeface="맑은 고딕" charset="0"/>
+              </a:rPr>
+              <a:t>다음</a:t>
+            </a:r>
+            <a:r>
+              <a:rPr sz="1800">
+                <a:latin typeface="맑은 고딕" charset="0"/>
+                <a:ea typeface="맑은 고딕" charset="0"/>
+              </a:rPr>
+              <a:t> </a:t>
+            </a:r>
+            <a:r>
+              <a:rPr sz="1800">
+                <a:latin typeface="맑은 고딕" charset="0"/>
+                <a:ea typeface="맑은 고딕" charset="0"/>
+              </a:rPr>
+              <a:t>Character</a:t>
+            </a:r>
+            <a:r>
+              <a:rPr sz="1800">
+                <a:latin typeface="맑은 고딕" charset="0"/>
+                <a:ea typeface="맑은 고딕" charset="0"/>
+              </a:rPr>
+              <a:t> 라는 이름으로 </a:t>
+            </a:r>
+            <a:r>
+              <a:rPr sz="1800">
+                <a:latin typeface="맑은 고딕" charset="0"/>
+                <a:ea typeface="맑은 고딕" charset="0"/>
+              </a:rPr>
+              <a:t>정의합니다.</a:t>
+            </a:r>
+            <a:r>
+              <a:rPr sz="1800">
+                <a:latin typeface="맑은 고딕" charset="0"/>
+                <a:ea typeface="맑은 고딕" charset="0"/>
+              </a:rPr>
+              <a:t> </a:t>
+            </a:r>
+            <a:endParaRPr lang="ko-KR" altLang="en-US" sz="1800">
+              <a:latin typeface="맑은 고딕" charset="0"/>
+              <a:ea typeface="맑은 고딕" charset="0"/>
+            </a:endParaRPr>
+          </a:p>
+        </p:txBody>
+      </p:sp>
+      <p:pic>
+        <p:nvPicPr>
+          <p:cNvPr id="1219" name="Picture " descr="C:/Users/Admin1/AppData/Roaming/PolarisOffice/ETemp/4316_14940424/fImage82893001478.png"/>
+          <p:cNvPicPr>
+            <a:picLocks noChangeAspect="1"/>
+          </p:cNvPicPr>
+          <p:nvPr/>
+        </p:nvPicPr>
+        <p:blipFill rotWithShape="1">
+          <a:blip r:embed="rId2" cstate="hqprint">
+            <a:extLst>
+              <a:ext uri="{28A0092B-C50C-407E-A947-70E740481C1C}">
+                <a14:useLocalDpi xmlns:a14="http://schemas.microsoft.com/office/drawing/2010/main"/>
+              </a:ext>
+            </a:extLst>
+          </a:blip>
+          <a:stretch>
+            <a:fillRect/>
+          </a:stretch>
+        </p:blipFill>
+        <p:spPr>
+          <a:xfrm rot="0">
+            <a:off x="1240790" y="1455420"/>
+            <a:ext cx="2868930" cy="3533775"/>
+          </a:xfrm>
+          <a:prstGeom prst="roundRect"/>
+          <a:solidFill>
+            <a:srgbClr val="EDEDED"/>
+          </a:solidFill>
+        </p:spPr>
+      </p:pic>
+      <p:pic>
+        <p:nvPicPr>
+          <p:cNvPr id="1226" name="Picture " descr="C:/Users/Admin1/AppData/Roaming/PolarisOffice/ETemp/4316_14940424/fImage26673059358.png"/>
+          <p:cNvPicPr>
+            <a:picLocks noChangeAspect="1"/>
+          </p:cNvPicPr>
+          <p:nvPr/>
+        </p:nvPicPr>
+        <p:blipFill rotWithShape="1">
+          <a:blip r:embed="rId3" cstate="print">
+            <a:extLst>
+              <a:ext uri="{28A0092B-C50C-407E-A947-70E740481C1C}">
+                <a14:useLocalDpi xmlns:a14="http://schemas.microsoft.com/office/drawing/2010/main" val="0"/>
+              </a:ext>
+            </a:extLst>
+          </a:blip>
+          <a:stretch>
+            <a:fillRect/>
+          </a:stretch>
+        </p:blipFill>
+        <p:spPr>
+          <a:xfrm rot="0">
+            <a:off x="4359275" y="2628900"/>
+            <a:ext cx="1017270" cy="1196340"/>
+          </a:xfrm>
+          <a:prstGeom prst="roundRect"/>
+          <a:solidFill>
+            <a:srgbClr val="EDEDED"/>
+          </a:solidFill>
+        </p:spPr>
+      </p:pic>
+      <p:pic>
+        <p:nvPicPr>
+          <p:cNvPr id="1221" name="Picture " descr="C:/Users/Admin1/AppData/Roaming/PolarisOffice/ETemp/4316_14940424/fImage2242173026962.png"/>
+          <p:cNvPicPr>
+            <a:picLocks noChangeAspect="1"/>
+          </p:cNvPicPr>
+          <p:nvPr/>
+        </p:nvPicPr>
+        <p:blipFill rotWithShape="1">
+          <a:blip r:embed="rId4" cstate="hqprint">
+            <a:extLst>
+              <a:ext uri="{28A0092B-C50C-407E-A947-70E740481C1C}">
+                <a14:useLocalDpi xmlns:a14="http://schemas.microsoft.com/office/drawing/2010/main"/>
+              </a:ext>
+            </a:extLst>
+          </a:blip>
+          <a:stretch>
+            <a:fillRect/>
+          </a:stretch>
+        </p:blipFill>
+        <p:spPr>
+          <a:xfrm rot="0">
+            <a:off x="3616325" y="2945765"/>
+            <a:ext cx="1156970" cy="552450"/>
+          </a:xfrm>
+          <a:prstGeom prst="rect"/>
+          <a:noFill/>
+        </p:spPr>
+      </p:pic>
+      <p:pic>
+        <p:nvPicPr>
+          <p:cNvPr id="1227" name="그림 28" descr="C:/Users/Admin1/AppData/Roaming/PolarisOffice/ETemp/4316_14940424/fImage302443164464.png"/>
+          <p:cNvPicPr>
+            <a:picLocks noChangeAspect="1"/>
+          </p:cNvPicPr>
+          <p:nvPr/>
+        </p:nvPicPr>
+        <p:blipFill rotWithShape="1">
+          <a:blip r:embed="rId5" cstate="print">
+            <a:extLst>
+              <a:ext uri="{28A0092B-C50C-407E-A947-70E740481C1C}">
+                <a14:useLocalDpi xmlns:a14="http://schemas.microsoft.com/office/drawing/2010/main" val="0"/>
+              </a:ext>
+            </a:extLst>
+          </a:blip>
+          <a:stretch>
+            <a:fillRect/>
+          </a:stretch>
+        </p:blipFill>
+        <p:spPr>
+          <a:xfrm rot="0">
+            <a:off x="6830695" y="4134485"/>
+            <a:ext cx="4135120" cy="1206500"/>
+          </a:xfrm>
+          <a:prstGeom prst="roundRect"/>
+          <a:solidFill>
+            <a:srgbClr val="EDEDED"/>
+          </a:solidFill>
+        </p:spPr>
+      </p:pic>
+      <p:sp>
+        <p:nvSpPr>
+          <p:cNvPr id="1228" name="텍스트 상자 31"/>
+          <p:cNvSpPr txBox="1">
+            <a:spLocks/>
+          </p:cNvSpPr>
+          <p:nvPr/>
+        </p:nvSpPr>
+        <p:spPr>
+          <a:xfrm rot="0">
+            <a:off x="6833870" y="5501640"/>
+            <a:ext cx="4135120" cy="675005"/>
+          </a:xfrm>
+          <a:prstGeom prst="rect"/>
+          <a:noFill/>
+        </p:spPr>
+        <p:txBody>
+          <a:bodyPr wrap="square" lIns="0" tIns="0" rIns="0" bIns="0" numCol="1" vert="horz" anchor="t">
+            <a:noAutofit/>
+          </a:bodyPr>
+          <a:lstStyle/>
+          <a:p>
+            <a:pPr marL="0" indent="0" rtl="0" algn="l" defTabSz="914400" eaLnBrk="1" latinLnBrk="0" hangingPunct="1">
+              <a:buFontTx/>
+              <a:buNone/>
+            </a:pPr>
+            <a:r>
+              <a:rPr sz="2000" b="1">
+                <a:solidFill>
+                  <a:srgbClr val="0611F2"/>
+                </a:solidFill>
+                <a:latin typeface="맑은 고딕" charset="0"/>
+                <a:ea typeface="맑은 고딕" charset="0"/>
+              </a:rPr>
+              <a:t>4</a:t>
+            </a:r>
+            <a:r>
+              <a:rPr sz="2000" b="1">
+                <a:solidFill>
+                  <a:srgbClr val="0611F2"/>
+                </a:solidFill>
+                <a:latin typeface="맑은 고딕" charset="0"/>
+                <a:ea typeface="맑은 고딕" charset="0"/>
+              </a:rPr>
+              <a:t>0</a:t>
+            </a:r>
+            <a:r>
+              <a:rPr sz="2000" b="1">
+                <a:solidFill>
+                  <a:srgbClr val="0611F2"/>
+                </a:solidFill>
+                <a:latin typeface="맑은 고딕" charset="0"/>
+                <a:ea typeface="맑은 고딕" charset="0"/>
+              </a:rPr>
+              <a:t>.</a:t>
+            </a:r>
+            <a:r>
+              <a:rPr sz="2000" b="1">
+                <a:solidFill>
+                  <a:srgbClr val="0611F2"/>
+                </a:solidFill>
+                <a:latin typeface="맑은 고딕" charset="0"/>
+                <a:ea typeface="맑은 고딕" charset="0"/>
+              </a:rPr>
+              <a:t> </a:t>
+            </a:r>
+            <a:r>
+              <a:rPr sz="1800">
+                <a:latin typeface="맑은 고딕" charset="0"/>
+                <a:ea typeface="맑은 고딕" charset="0"/>
+              </a:rPr>
+              <a:t>그리고 </a:t>
+            </a:r>
+            <a:r>
+              <a:rPr sz="1800">
+                <a:latin typeface="맑은 고딕" charset="0"/>
+                <a:ea typeface="맑은 고딕" charset="0"/>
+              </a:rPr>
+              <a:t>Skeleton 스크립트에서 </a:t>
+            </a:r>
+            <a:r>
+              <a:rPr sz="1800">
+                <a:latin typeface="맑은 고딕" charset="0"/>
+                <a:ea typeface="맑은 고딕" charset="0"/>
+              </a:rPr>
+              <a:t>Image</a:t>
+            </a:r>
+            <a:r>
+              <a:rPr sz="1800">
+                <a:latin typeface="맑은 고딕" charset="0"/>
+                <a:ea typeface="맑은 고딕" charset="0"/>
+              </a:rPr>
+              <a:t> </a:t>
+            </a:r>
+            <a:r>
+              <a:rPr sz="1800">
+                <a:latin typeface="맑은 고딕" charset="0"/>
+                <a:ea typeface="맑은 고딕" charset="0"/>
+              </a:rPr>
+              <a:t>변수</a:t>
+            </a:r>
+            <a:r>
+              <a:rPr sz="1800">
+                <a:latin typeface="맑은 고딕" charset="0"/>
+                <a:ea typeface="맑은 고딕" charset="0"/>
+              </a:rPr>
+              <a:t>를 </a:t>
+            </a:r>
+            <a:r>
+              <a:rPr sz="1800">
+                <a:latin typeface="맑은 고딕" charset="0"/>
+                <a:ea typeface="맑은 고딕" charset="0"/>
+              </a:rPr>
+              <a:t>선언합니다.</a:t>
+            </a:r>
+            <a:endParaRPr lang="ko-KR" altLang="en-US" sz="1800">
+              <a:latin typeface="맑은 고딕" charset="0"/>
+              <a:ea typeface="맑은 고딕" charset="0"/>
+            </a:endParaRPr>
+          </a:p>
+        </p:txBody>
+      </p:sp>
+      <p:pic>
+        <p:nvPicPr>
+          <p:cNvPr id="1229" name="그림 36" descr="C:/Users/Admin1/AppData/Roaming/PolarisOffice/ETemp/4316_14940424/fImage46883325705.png"/>
+          <p:cNvPicPr>
+            <a:picLocks noChangeAspect="1"/>
+          </p:cNvPicPr>
+          <p:nvPr/>
+        </p:nvPicPr>
+        <p:blipFill rotWithShape="1">
+          <a:blip r:embed="rId6" cstate="print">
+            <a:extLst>
+              <a:ext uri="{28A0092B-C50C-407E-A947-70E740481C1C}">
+                <a14:useLocalDpi xmlns:a14="http://schemas.microsoft.com/office/drawing/2010/main" val="0"/>
+              </a:ext>
+            </a:extLst>
+          </a:blip>
+          <a:stretch>
+            <a:fillRect/>
+          </a:stretch>
+        </p:blipFill>
+        <p:spPr>
+          <a:xfrm rot="0">
+            <a:off x="6819265" y="1455420"/>
+            <a:ext cx="4138295" cy="1758315"/>
+          </a:xfrm>
+          <a:prstGeom prst="roundRect"/>
+          <a:solidFill>
+            <a:srgbClr val="EDEDED"/>
+          </a:solidFill>
+        </p:spPr>
+      </p:pic>
+      <p:sp>
+        <p:nvSpPr>
+          <p:cNvPr id="1230" name="텍스트 상자 39"/>
+          <p:cNvSpPr txBox="1">
+            <a:spLocks/>
+          </p:cNvSpPr>
+          <p:nvPr/>
+        </p:nvSpPr>
+        <p:spPr>
+          <a:xfrm rot="0">
+            <a:off x="6827520" y="3350895"/>
+            <a:ext cx="4130040" cy="654685"/>
+          </a:xfrm>
+          <a:prstGeom prst="rect"/>
+          <a:noFill/>
+        </p:spPr>
+        <p:txBody>
+          <a:bodyPr wrap="square" lIns="0" tIns="0" rIns="0" bIns="0" numCol="1" vert="horz" anchor="t">
+            <a:noAutofit/>
+          </a:bodyPr>
+          <a:lstStyle/>
+          <a:p>
+            <a:pPr marL="0" indent="0" rtl="0" algn="l" defTabSz="914400" eaLnBrk="1" latinLnBrk="0" hangingPunct="1">
+              <a:buFontTx/>
+              <a:buNone/>
+            </a:pPr>
+            <a:r>
+              <a:rPr sz="2000" b="1">
+                <a:solidFill>
+                  <a:srgbClr val="0611F2"/>
+                </a:solidFill>
+                <a:latin typeface="맑은 고딕" charset="0"/>
+                <a:ea typeface="맑은 고딕" charset="0"/>
+              </a:rPr>
+              <a:t>3</a:t>
+            </a:r>
+            <a:r>
+              <a:rPr sz="2000" b="1">
+                <a:solidFill>
+                  <a:srgbClr val="0611F2"/>
+                </a:solidFill>
+                <a:latin typeface="맑은 고딕" charset="0"/>
+                <a:ea typeface="맑은 고딕" charset="0"/>
+              </a:rPr>
+              <a:t>9</a:t>
+            </a:r>
+            <a:r>
+              <a:rPr sz="2000" b="1">
+                <a:solidFill>
+                  <a:srgbClr val="0611F2"/>
+                </a:solidFill>
+                <a:latin typeface="맑은 고딕" charset="0"/>
+                <a:ea typeface="맑은 고딕" charset="0"/>
+              </a:rPr>
+              <a:t>.</a:t>
+            </a:r>
+            <a:r>
+              <a:rPr sz="2000" b="1">
+                <a:solidFill>
+                  <a:srgbClr val="0611F2"/>
+                </a:solidFill>
+                <a:latin typeface="맑은 고딕" charset="0"/>
+                <a:ea typeface="맑은 고딕" charset="0"/>
+              </a:rPr>
+              <a:t> </a:t>
+            </a:r>
+            <a:r>
+              <a:rPr sz="1800">
+                <a:latin typeface="맑은 고딕" charset="0"/>
+                <a:ea typeface="맑은 고딕" charset="0"/>
+              </a:rPr>
+              <a:t>이제 </a:t>
+            </a:r>
+            <a:r>
+              <a:rPr sz="1800">
+                <a:latin typeface="맑은 고딕" charset="0"/>
+                <a:ea typeface="맑은 고딕" charset="0"/>
+              </a:rPr>
+              <a:t>Ely By K.Atienza 오브젝트에 </a:t>
+            </a:r>
+            <a:r>
+              <a:rPr sz="1800">
+                <a:latin typeface="맑은 고딕" charset="0"/>
+                <a:ea typeface="맑은 고딕" charset="0"/>
+              </a:rPr>
+              <a:t>Character</a:t>
+            </a:r>
+            <a:r>
+              <a:rPr sz="1800">
+                <a:latin typeface="맑은 고딕" charset="0"/>
+                <a:ea typeface="맑은 고딕" charset="0"/>
+              </a:rPr>
+              <a:t> </a:t>
+            </a:r>
+            <a:r>
+              <a:rPr sz="1800">
+                <a:latin typeface="맑은 고딕" charset="0"/>
+                <a:ea typeface="맑은 고딕" charset="0"/>
+              </a:rPr>
+              <a:t>스크립트를</a:t>
+            </a:r>
+            <a:r>
+              <a:rPr sz="1800">
+                <a:latin typeface="맑은 고딕" charset="0"/>
+                <a:ea typeface="맑은 고딕" charset="0"/>
+              </a:rPr>
+              <a:t> </a:t>
+            </a:r>
+            <a:r>
+              <a:rPr sz="1800">
+                <a:latin typeface="맑은 고딕" charset="0"/>
+                <a:ea typeface="맑은 고딕" charset="0"/>
+              </a:rPr>
+              <a:t>추가합니</a:t>
+            </a:r>
+            <a:r>
+              <a:rPr sz="1800">
+                <a:latin typeface="맑은 고딕" charset="0"/>
+                <a:ea typeface="맑은 고딕" charset="0"/>
+              </a:rPr>
+              <a:t>다.</a:t>
+            </a:r>
+            <a:endParaRPr lang="ko-KR" altLang="en-US" sz="1800">
+              <a:latin typeface="맑은 고딕" charset="0"/>
+              <a:ea typeface="맑은 고딕" charset="0"/>
+            </a:endParaRPr>
+          </a:p>
+        </p:txBody>
+      </p:sp>
+    </p:spTree>
+  </p:cSld>
+  <p:clrMapOvr>
+    <a:masterClrMapping/>
+  </p:clrMapOvr>
+  <mc:AlternateContent xmlns:mc="http://schemas.openxmlformats.org/markup-compatibility/2006">
+    <mc:Choice xmlns:p14="http://schemas.microsoft.com/office/powerpoint/2010/main" Requires="p14">
+      <p:transition spd="slow" p14:dur="2000"/>
+    </mc:Choice>
+    <mc:Fallback>
+      <p:transition spd="slow"/>
+    </mc:Fallback>
+  </mc:AlternateContent>
+  <p:timing>
+    <p:tnLst>
+      <p:par>
+        <p:cTn id="1" dur="indefinite" restart="never" nodeType="tmRoot"/>
+      </p:par>
+    </p:tnLst>
+  </p:timing>
+</p:sld>
+</file>
+
+<file path=ppt/slides/slide16.xml><?xml version="1.0" encoding="utf-8"?>
+<p:sld xmlns:a="http://schemas.openxmlformats.org/drawingml/2006/main" xmlns:r="http://schemas.openxmlformats.org/officeDocument/2006/relationships" xmlns:p="http://schemas.openxmlformats.org/presentationml/2006/main">
+  <p:cSld>
+    <p:spTree>
+      <p:nvGrpSpPr>
+        <p:cNvPr id="1" name=""/>
+        <p:cNvGrpSpPr/>
+        <p:nvPr/>
+      </p:nvGrpSpPr>
+      <p:grpSpPr>
+        <a:xfrm>
+          <a:off x="0" y="0"/>
+          <a:ext cx="0" cy="0"/>
+          <a:chOff x="0" y="0"/>
+          <a:chExt cx="0" cy="0"/>
+        </a:xfrm>
+      </p:grpSpPr>
+      <p:sp>
+        <p:nvSpPr>
+          <p:cNvPr id="1154" name="Rect 0"/>
+          <p:cNvSpPr txBox="1">
+            <a:spLocks/>
+          </p:cNvSpPr>
+          <p:nvPr/>
+        </p:nvSpPr>
+        <p:spPr>
+          <a:xfrm rot="0">
+            <a:off x="4280535" y="405130"/>
+            <a:ext cx="3630930" cy="478155"/>
+          </a:xfrm>
+          <a:prstGeom prst="rect"/>
+          <a:noFill/>
+          <a:ln w="0">
+            <a:noFill/>
+            <a:prstDash/>
+          </a:ln>
+        </p:spPr>
+        <p:txBody>
+          <a:bodyPr wrap="square" lIns="89535" tIns="46355" rIns="89535" bIns="46355" numCol="1" vert="horz" anchor="t">
+            <a:spAutoFit/>
+          </a:bodyPr>
+          <a:lstStyle/>
+          <a:p>
+            <a:pPr marL="0" indent="0" algn="ctr" latinLnBrk="0">
+              <a:buFontTx/>
+              <a:buNone/>
+            </a:pPr>
+            <a:r>
+              <a:rPr lang="ko-KR" altLang="en-US" sz="2500" b="1">
+                <a:solidFill>
+                  <a:schemeClr val="tx1"/>
+                </a:solidFill>
+                <a:latin typeface="나눔바른고딕" charset="0"/>
+                <a:ea typeface="나눔바른고딕" charset="0"/>
+              </a:rPr>
+              <a:t>열여섯</a:t>
+            </a:r>
+            <a:r>
+              <a:rPr lang="ko-KR" altLang="en-US" sz="2500" b="1">
+                <a:solidFill>
+                  <a:schemeClr val="tx1"/>
+                </a:solidFill>
+                <a:latin typeface="나눔바른고딕" charset="0"/>
+                <a:ea typeface="나눔바른고딕" charset="0"/>
+              </a:rPr>
+              <a:t> 번째 튜토리얼</a:t>
+            </a:r>
+            <a:endParaRPr lang="ko-KR" altLang="en-US" sz="2500" b="1">
+              <a:solidFill>
+                <a:schemeClr val="tx1"/>
+              </a:solidFill>
+              <a:latin typeface="나눔바른고딕" charset="0"/>
+              <a:ea typeface="나눔바른고딕" charset="0"/>
+            </a:endParaRPr>
+          </a:p>
+        </p:txBody>
+      </p:sp>
+      <p:sp>
+        <p:nvSpPr>
+          <p:cNvPr id="1207" name="Rect 0"/>
+          <p:cNvSpPr txBox="1">
+            <a:spLocks/>
+          </p:cNvSpPr>
+          <p:nvPr/>
+        </p:nvSpPr>
+        <p:spPr>
+          <a:xfrm rot="0">
+            <a:off x="1240790" y="2724785"/>
+            <a:ext cx="4135120" cy="936625"/>
+          </a:xfrm>
+          <a:prstGeom prst="rect"/>
+          <a:noFill/>
+        </p:spPr>
+        <p:txBody>
+          <a:bodyPr wrap="square" lIns="0" tIns="0" rIns="0" bIns="0" numCol="1" vert="horz" anchor="t">
+            <a:noAutofit/>
+          </a:bodyPr>
+          <a:lstStyle/>
+          <a:p>
+            <a:pPr marL="0" indent="0" rtl="0" algn="l" defTabSz="914400" eaLnBrk="1" latinLnBrk="0" hangingPunct="1">
+              <a:buFontTx/>
+              <a:buNone/>
+            </a:pPr>
+            <a:r>
+              <a:rPr sz="2000" b="1">
+                <a:solidFill>
+                  <a:srgbClr val="0611F2"/>
+                </a:solidFill>
+                <a:latin typeface="맑은 고딕" charset="0"/>
+                <a:ea typeface="맑은 고딕" charset="0"/>
+              </a:rPr>
+              <a:t>4</a:t>
+            </a:r>
+            <a:r>
+              <a:rPr sz="2000" b="1">
+                <a:solidFill>
+                  <a:srgbClr val="0611F2"/>
+                </a:solidFill>
+                <a:latin typeface="맑은 고딕" charset="0"/>
+                <a:ea typeface="맑은 고딕" charset="0"/>
+              </a:rPr>
+              <a:t>1</a:t>
+            </a:r>
+            <a:r>
+              <a:rPr sz="2000" b="1">
+                <a:solidFill>
+                  <a:srgbClr val="0611F2"/>
+                </a:solidFill>
+                <a:latin typeface="맑은 고딕" charset="0"/>
+                <a:ea typeface="맑은 고딕" charset="0"/>
+              </a:rPr>
+              <a:t>.</a:t>
+            </a:r>
+            <a:r>
+              <a:rPr sz="2000" b="1">
+                <a:solidFill>
+                  <a:srgbClr val="0611F2"/>
+                </a:solidFill>
+                <a:latin typeface="맑은 고딕" charset="0"/>
+                <a:ea typeface="맑은 고딕" charset="0"/>
+              </a:rPr>
+              <a:t> </a:t>
+            </a:r>
+            <a:r>
+              <a:rPr sz="1800">
+                <a:latin typeface="맑은 고딕" charset="0"/>
+                <a:ea typeface="맑은 고딕" charset="0"/>
+              </a:rPr>
+              <a:t>그런 다음 </a:t>
+            </a:r>
+            <a:r>
+              <a:rPr sz="1800">
+                <a:latin typeface="맑은 고딕" charset="0"/>
+                <a:ea typeface="맑은 고딕" charset="0"/>
+              </a:rPr>
+              <a:t>State(float) 함수를 </a:t>
+            </a:r>
+            <a:r>
+              <a:rPr sz="1800">
+                <a:latin typeface="맑은 고딕" charset="0"/>
+                <a:ea typeface="맑은 고딕" charset="0"/>
+              </a:rPr>
+              <a:t>선언하</a:t>
+            </a:r>
+            <a:r>
+              <a:rPr sz="1800">
+                <a:latin typeface="맑은 고딕" charset="0"/>
+                <a:ea typeface="맑은 고딕" charset="0"/>
+              </a:rPr>
+              <a:t>고</a:t>
+            </a:r>
+            <a:r>
+              <a:rPr sz="1800">
+                <a:latin typeface="맑은 고딕" charset="0"/>
+                <a:ea typeface="맑은 고딕" charset="0"/>
+              </a:rPr>
+              <a:t> </a:t>
+            </a:r>
+            <a:r>
+              <a:rPr sz="1800">
+                <a:latin typeface="맑은 고딕" charset="0"/>
+                <a:ea typeface="맑은 고딕" charset="0"/>
+              </a:rPr>
+              <a:t>이미지의 fillAmout 값에 매개</a:t>
+            </a:r>
+            <a:r>
+              <a:rPr lang="ko-KR" sz="1800">
+                <a:latin typeface="맑은 고딕" charset="0"/>
+                <a:ea typeface="맑은 고딕" charset="0"/>
+              </a:rPr>
+              <a:t> </a:t>
+            </a:r>
+            <a:r>
+              <a:rPr sz="1800">
+                <a:latin typeface="맑은 고딕" charset="0"/>
+                <a:ea typeface="맑은 고딕" charset="0"/>
+              </a:rPr>
+              <a:t>변수</a:t>
+            </a:r>
+            <a:r>
+              <a:rPr lang="ko-KR" sz="1800">
+                <a:latin typeface="맑은 고딕" charset="0"/>
+                <a:ea typeface="맑은 고딕" charset="0"/>
+              </a:rPr>
+              <a:t>의</a:t>
+            </a:r>
+            <a:r>
+              <a:rPr lang="ko-KR" sz="1800">
+                <a:latin typeface="맑은 고딕" charset="0"/>
+                <a:ea typeface="맑은 고딕" charset="0"/>
+              </a:rPr>
+              <a:t> </a:t>
+            </a:r>
+            <a:r>
+              <a:rPr lang="ko-KR" sz="1800">
+                <a:latin typeface="맑은 고딕" charset="0"/>
+                <a:ea typeface="맑은 고딕" charset="0"/>
+              </a:rPr>
+              <a:t>값을 감소시켜 저장합니다.</a:t>
+            </a:r>
+            <a:endParaRPr lang="ko-KR" altLang="en-US" sz="1800">
+              <a:latin typeface="맑은 고딕" charset="0"/>
+              <a:ea typeface="맑은 고딕" charset="0"/>
+            </a:endParaRPr>
+          </a:p>
+        </p:txBody>
+      </p:sp>
+      <p:pic>
+        <p:nvPicPr>
+          <p:cNvPr id="1229" name="Picture " descr="C:/Users/Admin1/AppData/Roaming/PolarisOffice/ETemp/4316_14940424/fImage234843278145.png"/>
+          <p:cNvPicPr>
+            <a:picLocks noChangeAspect="1"/>
+          </p:cNvPicPr>
+          <p:nvPr/>
+        </p:nvPicPr>
+        <p:blipFill rotWithShape="1">
+          <a:blip r:embed="rId2" cstate="print">
+            <a:extLst>
+              <a:ext uri="{28A0092B-C50C-407E-A947-70E740481C1C}">
+                <a14:useLocalDpi xmlns:a14="http://schemas.microsoft.com/office/drawing/2010/main" val="0"/>
+              </a:ext>
+            </a:extLst>
+          </a:blip>
+          <a:stretch>
+            <a:fillRect/>
+          </a:stretch>
+        </p:blipFill>
+        <p:spPr>
+          <a:xfrm rot="0">
+            <a:off x="1240790" y="1447165"/>
+            <a:ext cx="4135120" cy="1154430"/>
+          </a:xfrm>
+          <a:prstGeom prst="roundRect"/>
+          <a:solidFill>
+            <a:srgbClr val="EDEDED"/>
+          </a:solidFill>
+        </p:spPr>
+      </p:pic>
+      <p:sp>
+        <p:nvSpPr>
+          <p:cNvPr id="1230" name="Rect 0"/>
+          <p:cNvSpPr txBox="1">
+            <a:spLocks/>
+          </p:cNvSpPr>
+          <p:nvPr/>
+        </p:nvSpPr>
+        <p:spPr>
+          <a:xfrm rot="0">
+            <a:off x="6822440" y="2704465"/>
+            <a:ext cx="4131945" cy="974090"/>
+          </a:xfrm>
+          <a:prstGeom prst="rect"/>
+          <a:noFill/>
+        </p:spPr>
+        <p:txBody>
+          <a:bodyPr wrap="square" lIns="0" tIns="0" rIns="0" bIns="0" numCol="1" vert="horz" anchor="t">
+            <a:noAutofit/>
+          </a:bodyPr>
+          <a:lstStyle/>
+          <a:p>
+            <a:pPr marL="0" indent="0" rtl="0" algn="l" defTabSz="914400" eaLnBrk="1" latinLnBrk="0" hangingPunct="1">
+              <a:buFontTx/>
+              <a:buNone/>
+            </a:pPr>
+            <a:r>
+              <a:rPr sz="2000" b="1">
+                <a:solidFill>
+                  <a:srgbClr val="0611F2"/>
+                </a:solidFill>
+                <a:latin typeface="맑은 고딕" charset="0"/>
+                <a:ea typeface="맑은 고딕" charset="0"/>
+              </a:rPr>
+              <a:t>4</a:t>
+            </a:r>
+            <a:r>
+              <a:rPr lang="ko-KR" sz="2000" b="1">
+                <a:solidFill>
+                  <a:srgbClr val="0611F2"/>
+                </a:solidFill>
+                <a:latin typeface="맑은 고딕" charset="0"/>
+                <a:ea typeface="맑은 고딕" charset="0"/>
+              </a:rPr>
+              <a:t>3</a:t>
+            </a:r>
+            <a:r>
+              <a:rPr sz="2000" b="1">
+                <a:solidFill>
+                  <a:srgbClr val="0611F2"/>
+                </a:solidFill>
+                <a:latin typeface="맑은 고딕" charset="0"/>
+                <a:ea typeface="맑은 고딕" charset="0"/>
+              </a:rPr>
+              <a:t>.</a:t>
+            </a:r>
+            <a:r>
+              <a:rPr sz="2000" b="1">
+                <a:solidFill>
+                  <a:srgbClr val="0611F2"/>
+                </a:solidFill>
+                <a:latin typeface="맑은 고딕" charset="0"/>
+                <a:ea typeface="맑은 고딕" charset="0"/>
+              </a:rPr>
+              <a:t> </a:t>
+            </a:r>
+            <a:r>
+              <a:rPr sz="1800">
+                <a:latin typeface="맑은 고딕" charset="0"/>
+                <a:ea typeface="맑은 고딕" charset="0"/>
+              </a:rPr>
+              <a:t>그러고 나서 Character </a:t>
+            </a:r>
+            <a:r>
+              <a:rPr sz="1800">
+                <a:latin typeface="맑은 고딕" charset="0"/>
+                <a:ea typeface="맑은 고딕" charset="0"/>
+              </a:rPr>
+              <a:t>스크립트에</a:t>
+            </a:r>
+            <a:r>
+              <a:rPr sz="1800">
+                <a:latin typeface="맑은 고딕" charset="0"/>
+                <a:ea typeface="맑은 고딕" charset="0"/>
+              </a:rPr>
+              <a:t>서</a:t>
+            </a:r>
+            <a:r>
+              <a:rPr sz="1800">
+                <a:latin typeface="맑은 고딕" charset="0"/>
+                <a:ea typeface="맑은 고딕" charset="0"/>
+              </a:rPr>
+              <a:t> </a:t>
+            </a:r>
+            <a:r>
+              <a:rPr sz="1800">
+                <a:latin typeface="맑은 고딕" charset="0"/>
+                <a:ea typeface="맑은 고딕" charset="0"/>
+              </a:rPr>
+              <a:t>Skeleton</a:t>
+            </a:r>
+            <a:r>
+              <a:rPr sz="1800">
+                <a:latin typeface="맑은 고딕" charset="0"/>
+                <a:ea typeface="맑은 고딕" charset="0"/>
+              </a:rPr>
+              <a:t> 변수를 </a:t>
+            </a:r>
+            <a:r>
+              <a:rPr sz="1800">
+                <a:latin typeface="맑은 고딕" charset="0"/>
+                <a:ea typeface="맑은 고딕" charset="0"/>
+              </a:rPr>
+              <a:t>선언합니다.</a:t>
+            </a:r>
+            <a:endParaRPr lang="ko-KR" altLang="en-US" sz="1800">
+              <a:latin typeface="맑은 고딕" charset="0"/>
+              <a:ea typeface="맑은 고딕" charset="0"/>
+            </a:endParaRPr>
+          </a:p>
+        </p:txBody>
+      </p:sp>
+      <p:pic>
+        <p:nvPicPr>
+          <p:cNvPr id="1231" name="그림 40" descr="C:/Users/Admin1/AppData/Roaming/PolarisOffice/ETemp/4316_14940424/fImage46883343281.png"/>
+          <p:cNvPicPr>
+            <a:picLocks noChangeAspect="1"/>
+          </p:cNvPicPr>
+          <p:nvPr/>
+        </p:nvPicPr>
+        <p:blipFill rotWithShape="1">
+          <a:blip r:embed="rId3" cstate="print">
+            <a:extLst>
+              <a:ext uri="{28A0092B-C50C-407E-A947-70E740481C1C}">
+                <a14:useLocalDpi xmlns:a14="http://schemas.microsoft.com/office/drawing/2010/main" val="0"/>
+              </a:ext>
+            </a:extLst>
+          </a:blip>
+          <a:stretch>
+            <a:fillRect/>
+          </a:stretch>
+        </p:blipFill>
+        <p:spPr>
+          <a:xfrm rot="0">
+            <a:off x="1240790" y="3773170"/>
+            <a:ext cx="4135120" cy="1602105"/>
+          </a:xfrm>
+          <a:prstGeom prst="roundRect"/>
+          <a:solidFill>
+            <a:srgbClr val="EDEDED"/>
+          </a:solidFill>
+        </p:spPr>
+      </p:pic>
+      <p:sp>
+        <p:nvSpPr>
+          <p:cNvPr id="1232" name="텍스트 상자 41"/>
+          <p:cNvSpPr txBox="1">
+            <a:spLocks/>
+          </p:cNvSpPr>
+          <p:nvPr/>
+        </p:nvSpPr>
+        <p:spPr>
+          <a:xfrm rot="0">
+            <a:off x="1245870" y="5513070"/>
+            <a:ext cx="4121150" cy="654685"/>
+          </a:xfrm>
+          <a:prstGeom prst="rect"/>
+          <a:noFill/>
+        </p:spPr>
+        <p:txBody>
+          <a:bodyPr wrap="square" lIns="0" tIns="0" rIns="0" bIns="0" numCol="1" vert="horz" anchor="t">
+            <a:noAutofit/>
+          </a:bodyPr>
+          <a:lstStyle/>
+          <a:p>
+            <a:pPr marL="0" indent="0" rtl="0" algn="l" defTabSz="914400" eaLnBrk="1" latinLnBrk="0" hangingPunct="1">
+              <a:buFontTx/>
+              <a:buNone/>
+            </a:pPr>
+            <a:r>
+              <a:rPr lang="ko-KR" sz="2000" b="1">
+                <a:solidFill>
+                  <a:srgbClr val="0611F2"/>
+                </a:solidFill>
+                <a:latin typeface="맑은 고딕" charset="0"/>
+                <a:ea typeface="맑은 고딕" charset="0"/>
+              </a:rPr>
+              <a:t>4</a:t>
+            </a:r>
+            <a:r>
+              <a:rPr lang="ko-KR" sz="2000" b="1">
+                <a:solidFill>
+                  <a:srgbClr val="0611F2"/>
+                </a:solidFill>
+                <a:latin typeface="맑은 고딕" charset="0"/>
+                <a:ea typeface="맑은 고딕" charset="0"/>
+              </a:rPr>
+              <a:t>2</a:t>
+            </a:r>
+            <a:r>
+              <a:rPr sz="2000" b="1">
+                <a:solidFill>
+                  <a:srgbClr val="0611F2"/>
+                </a:solidFill>
+                <a:latin typeface="맑은 고딕" charset="0"/>
+                <a:ea typeface="맑은 고딕" charset="0"/>
+              </a:rPr>
+              <a:t>.</a:t>
+            </a:r>
+            <a:r>
+              <a:rPr sz="2000" b="1">
+                <a:solidFill>
+                  <a:srgbClr val="0611F2"/>
+                </a:solidFill>
+                <a:latin typeface="맑은 고딕" charset="0"/>
+                <a:ea typeface="맑은 고딕" charset="0"/>
+              </a:rPr>
+              <a:t> </a:t>
+            </a:r>
+            <a:r>
+              <a:rPr sz="1800">
+                <a:latin typeface="맑은 고딕" charset="0"/>
+                <a:ea typeface="맑은 고딕" charset="0"/>
+              </a:rPr>
+              <a:t>그다음 </a:t>
+            </a:r>
+            <a:r>
+              <a:rPr sz="1800">
+                <a:latin typeface="맑은 고딕" charset="0"/>
+                <a:ea typeface="맑은 고딕" charset="0"/>
+              </a:rPr>
+              <a:t>Erika Archer 오브젝트에 </a:t>
+            </a:r>
+            <a:r>
+              <a:rPr sz="1800">
+                <a:latin typeface="맑은 고딕" charset="0"/>
+                <a:ea typeface="맑은 고딕" charset="0"/>
+              </a:rPr>
+              <a:t>Character</a:t>
+            </a:r>
+            <a:r>
+              <a:rPr sz="1800">
+                <a:latin typeface="맑은 고딕" charset="0"/>
+                <a:ea typeface="맑은 고딕" charset="0"/>
+              </a:rPr>
+              <a:t> </a:t>
+            </a:r>
+            <a:r>
+              <a:rPr sz="1800">
+                <a:latin typeface="맑은 고딕" charset="0"/>
+                <a:ea typeface="맑은 고딕" charset="0"/>
+              </a:rPr>
+              <a:t>스크립트를</a:t>
+            </a:r>
+            <a:r>
+              <a:rPr sz="1800">
+                <a:latin typeface="맑은 고딕" charset="0"/>
+                <a:ea typeface="맑은 고딕" charset="0"/>
+              </a:rPr>
+              <a:t> </a:t>
+            </a:r>
+            <a:r>
+              <a:rPr sz="1800">
+                <a:latin typeface="맑은 고딕" charset="0"/>
+                <a:ea typeface="맑은 고딕" charset="0"/>
+              </a:rPr>
+              <a:t>추가합니</a:t>
+            </a:r>
+            <a:r>
+              <a:rPr sz="1800">
+                <a:latin typeface="맑은 고딕" charset="0"/>
+                <a:ea typeface="맑은 고딕" charset="0"/>
+              </a:rPr>
+              <a:t>다.</a:t>
+            </a:r>
+            <a:endParaRPr lang="ko-KR" altLang="en-US" sz="1800">
+              <a:latin typeface="맑은 고딕" charset="0"/>
+              <a:ea typeface="맑은 고딕" charset="0"/>
+            </a:endParaRPr>
+          </a:p>
+        </p:txBody>
+      </p:sp>
+      <p:pic>
+        <p:nvPicPr>
+          <p:cNvPr id="1233" name="그림 42" descr="C:/Users/Admin1/AppData/Roaming/PolarisOffice/ETemp/4316_14940424/fImage265713366827.png"/>
+          <p:cNvPicPr>
+            <a:picLocks noChangeAspect="1"/>
+          </p:cNvPicPr>
+          <p:nvPr/>
+        </p:nvPicPr>
+        <p:blipFill rotWithShape="1">
+          <a:blip r:embed="rId4" cstate="print">
+            <a:extLst>
+              <a:ext uri="{28A0092B-C50C-407E-A947-70E740481C1C}">
+                <a14:useLocalDpi xmlns:a14="http://schemas.microsoft.com/office/drawing/2010/main" val="0"/>
+              </a:ext>
+            </a:extLst>
+          </a:blip>
+          <a:stretch>
+            <a:fillRect/>
+          </a:stretch>
+        </p:blipFill>
+        <p:spPr>
+          <a:xfrm rot="0">
+            <a:off x="6822440" y="1455420"/>
+            <a:ext cx="4135120" cy="1137920"/>
+          </a:xfrm>
+          <a:prstGeom prst="roundRect"/>
+          <a:solidFill>
+            <a:srgbClr val="EDEDED"/>
+          </a:solidFill>
+        </p:spPr>
+      </p:pic>
+      <p:pic>
+        <p:nvPicPr>
+          <p:cNvPr id="1234" name="그림 45" descr="C:/Users/Admin1/AppData/Roaming/PolarisOffice/ETemp/4316_14940424/fImage289263379961.png"/>
+          <p:cNvPicPr>
+            <a:picLocks noChangeAspect="1"/>
+          </p:cNvPicPr>
+          <p:nvPr/>
+        </p:nvPicPr>
+        <p:blipFill rotWithShape="1">
+          <a:blip r:embed="rId5" cstate="print">
+            <a:extLst>
+              <a:ext uri="{28A0092B-C50C-407E-A947-70E740481C1C}">
+                <a14:useLocalDpi xmlns:a14="http://schemas.microsoft.com/office/drawing/2010/main" val="0"/>
+              </a:ext>
+            </a:extLst>
+          </a:blip>
+          <a:stretch>
+            <a:fillRect/>
+          </a:stretch>
+        </p:blipFill>
+        <p:spPr>
+          <a:xfrm rot="0">
+            <a:off x="6831330" y="3772535"/>
+            <a:ext cx="4126230" cy="1370330"/>
+          </a:xfrm>
+          <a:prstGeom prst="roundRect"/>
+          <a:solidFill>
+            <a:srgbClr val="EDEDED"/>
+          </a:solidFill>
+        </p:spPr>
+      </p:pic>
+      <p:sp>
+        <p:nvSpPr>
+          <p:cNvPr id="1235" name="텍스트 상자 48"/>
+          <p:cNvSpPr txBox="1">
+            <a:spLocks/>
+          </p:cNvSpPr>
+          <p:nvPr/>
+        </p:nvSpPr>
+        <p:spPr>
+          <a:xfrm rot="0">
+            <a:off x="6824980" y="5265420"/>
+            <a:ext cx="4140835" cy="911225"/>
+          </a:xfrm>
+          <a:prstGeom prst="rect"/>
+          <a:noFill/>
+        </p:spPr>
+        <p:txBody>
+          <a:bodyPr wrap="square" lIns="0" tIns="0" rIns="0" bIns="0" numCol="1" vert="horz" anchor="t">
+            <a:noAutofit/>
+          </a:bodyPr>
+          <a:lstStyle/>
+          <a:p>
+            <a:pPr marL="0" indent="0" rtl="0" algn="l" defTabSz="914400" eaLnBrk="1" latinLnBrk="0" hangingPunct="1">
+              <a:buFontTx/>
+              <a:buNone/>
+            </a:pPr>
+            <a:r>
+              <a:rPr sz="2000" b="1">
+                <a:solidFill>
+                  <a:srgbClr val="0611F2"/>
+                </a:solidFill>
+                <a:latin typeface="맑은 고딕" charset="0"/>
+                <a:ea typeface="맑은 고딕" charset="0"/>
+              </a:rPr>
+              <a:t>4</a:t>
+            </a:r>
+            <a:r>
+              <a:rPr lang="ko-KR" sz="2000" b="1">
+                <a:solidFill>
+                  <a:srgbClr val="0611F2"/>
+                </a:solidFill>
+                <a:latin typeface="맑은 고딕" charset="0"/>
+                <a:ea typeface="맑은 고딕" charset="0"/>
+              </a:rPr>
+              <a:t>4</a:t>
+            </a:r>
+            <a:r>
+              <a:rPr sz="2000" b="1">
+                <a:solidFill>
+                  <a:srgbClr val="0611F2"/>
+                </a:solidFill>
+                <a:latin typeface="맑은 고딕" charset="0"/>
+                <a:ea typeface="맑은 고딕" charset="0"/>
+              </a:rPr>
+              <a:t>.</a:t>
+            </a:r>
+            <a:r>
+              <a:rPr sz="2000" b="1">
+                <a:solidFill>
+                  <a:srgbClr val="0611F2"/>
+                </a:solidFill>
+                <a:latin typeface="맑은 고딕" charset="0"/>
+                <a:ea typeface="맑은 고딕" charset="0"/>
+              </a:rPr>
+              <a:t> </a:t>
+            </a:r>
+            <a:r>
+              <a:rPr sz="1800">
+                <a:latin typeface="맑은 고딕" charset="0"/>
+                <a:ea typeface="맑은 고딕" charset="0"/>
+              </a:rPr>
+              <a:t>이제 Damage(float) 함수를 </a:t>
+            </a:r>
+            <a:r>
+              <a:rPr sz="1800">
+                <a:latin typeface="맑은 고딕" charset="0"/>
+                <a:ea typeface="맑은 고딕" charset="0"/>
+              </a:rPr>
+              <a:t>선언한 </a:t>
+            </a:r>
+            <a:r>
+              <a:rPr sz="1800">
+                <a:latin typeface="맑은 고딕" charset="0"/>
+                <a:ea typeface="맑은 고딕" charset="0"/>
+              </a:rPr>
+              <a:t>다</a:t>
+            </a:r>
+            <a:r>
+              <a:rPr sz="1800">
+                <a:latin typeface="맑은 고딕" charset="0"/>
+                <a:ea typeface="맑은 고딕" charset="0"/>
+              </a:rPr>
+              <a:t>음</a:t>
+            </a:r>
+            <a:r>
+              <a:rPr sz="1800">
+                <a:latin typeface="맑은 고딕" charset="0"/>
+                <a:ea typeface="맑은 고딕" charset="0"/>
+              </a:rPr>
+              <a:t> </a:t>
+            </a:r>
+            <a:r>
+              <a:rPr sz="1800">
+                <a:latin typeface="맑은 고딕" charset="0"/>
+                <a:ea typeface="맑은 고딕" charset="0"/>
+              </a:rPr>
+              <a:t>Skeleton 클래스에 있는 State( ) </a:t>
+            </a:r>
+            <a:r>
+              <a:rPr sz="1800">
+                <a:latin typeface="맑은 고딕" charset="0"/>
+                <a:ea typeface="맑은 고딕" charset="0"/>
+              </a:rPr>
+              <a:t>함수</a:t>
+            </a:r>
+            <a:r>
+              <a:rPr lang="ko-KR" sz="1800">
+                <a:latin typeface="맑은 고딕" charset="0"/>
+                <a:ea typeface="맑은 고딕" charset="0"/>
+              </a:rPr>
+              <a:t>의</a:t>
+            </a:r>
+            <a:r>
+              <a:rPr lang="ko-KR" sz="1800">
+                <a:latin typeface="맑은 고딕" charset="0"/>
+                <a:ea typeface="맑은 고딕" charset="0"/>
+              </a:rPr>
+              <a:t> </a:t>
+            </a:r>
+            <a:r>
+              <a:rPr lang="ko-KR" sz="1800">
+                <a:latin typeface="맑은 고딕" charset="0"/>
+                <a:ea typeface="맑은 고딕" charset="0"/>
+              </a:rPr>
+              <a:t>인수로 매개 변수를 넣어줍니다.</a:t>
+            </a:r>
+            <a:endParaRPr lang="ko-KR" altLang="en-US" sz="1800">
+              <a:latin typeface="맑은 고딕" charset="0"/>
+              <a:ea typeface="맑은 고딕" charset="0"/>
+            </a:endParaRPr>
+          </a:p>
+        </p:txBody>
+      </p:sp>
+    </p:spTree>
+  </p:cSld>
+  <p:clrMapOvr>
+    <a:masterClrMapping/>
+  </p:clrMapOvr>
+  <mc:AlternateContent xmlns:mc="http://schemas.openxmlformats.org/markup-compatibility/2006">
+    <mc:Choice xmlns:p14="http://schemas.microsoft.com/office/powerpoint/2010/main" Requires="p14">
+      <p:transition spd="slow" p14:dur="2000"/>
+    </mc:Choice>
+    <mc:Fallback>
+      <p:transition spd="slow"/>
+    </mc:Fallback>
+  </mc:AlternateContent>
+  <p:timing>
+    <p:tnLst>
+      <p:par>
+        <p:cTn id="1" dur="indefinite" restart="never" nodeType="tmRoot"/>
+      </p:par>
+    </p:tnLst>
+  </p:timing>
+</p:sld>
+</file>
+
+<file path=ppt/slides/slide17.xml><?xml version="1.0" encoding="utf-8"?>
+<p:sld xmlns:a="http://schemas.openxmlformats.org/drawingml/2006/main" xmlns:r="http://schemas.openxmlformats.org/officeDocument/2006/relationships" xmlns:p="http://schemas.openxmlformats.org/presentationml/2006/main">
+  <p:cSld>
+    <p:spTree>
+      <p:nvGrpSpPr>
+        <p:cNvPr id="1" name=""/>
+        <p:cNvGrpSpPr/>
+        <p:nvPr/>
+      </p:nvGrpSpPr>
+      <p:grpSpPr>
+        <a:xfrm>
+          <a:off x="0" y="0"/>
+          <a:ext cx="0" cy="0"/>
+          <a:chOff x="0" y="0"/>
+          <a:chExt cx="0" cy="0"/>
+        </a:xfrm>
+      </p:grpSpPr>
+      <p:sp>
+        <p:nvSpPr>
+          <p:cNvPr id="1154" name="Rect 0"/>
+          <p:cNvSpPr txBox="1">
+            <a:spLocks/>
+          </p:cNvSpPr>
+          <p:nvPr/>
+        </p:nvSpPr>
+        <p:spPr>
+          <a:xfrm rot="0">
+            <a:off x="4280535" y="405130"/>
+            <a:ext cx="3630930" cy="478155"/>
+          </a:xfrm>
+          <a:prstGeom prst="rect"/>
+          <a:noFill/>
+          <a:ln w="0">
+            <a:noFill/>
+            <a:prstDash/>
+          </a:ln>
+        </p:spPr>
+        <p:txBody>
+          <a:bodyPr wrap="square" lIns="89535" tIns="46355" rIns="89535" bIns="46355" numCol="1" vert="horz" anchor="t">
+            <a:spAutoFit/>
+          </a:bodyPr>
+          <a:lstStyle/>
+          <a:p>
+            <a:pPr marL="0" indent="0" algn="ctr" latinLnBrk="0">
+              <a:buFontTx/>
+              <a:buNone/>
+            </a:pPr>
+            <a:r>
+              <a:rPr lang="ko-KR" altLang="en-US" sz="2500" b="1">
+                <a:solidFill>
+                  <a:schemeClr val="tx1"/>
+                </a:solidFill>
+                <a:latin typeface="나눔바른고딕" charset="0"/>
+                <a:ea typeface="나눔바른고딕" charset="0"/>
+              </a:rPr>
+              <a:t>열일곱</a:t>
+            </a:r>
+            <a:r>
+              <a:rPr lang="ko-KR" altLang="en-US" sz="2500" b="1">
+                <a:solidFill>
+                  <a:schemeClr val="tx1"/>
+                </a:solidFill>
+                <a:latin typeface="나눔바른고딕" charset="0"/>
+                <a:ea typeface="나눔바른고딕" charset="0"/>
+              </a:rPr>
+              <a:t> 번째 튜토리얼</a:t>
+            </a:r>
+            <a:endParaRPr lang="ko-KR" altLang="en-US" sz="2500" b="1">
+              <a:solidFill>
+                <a:schemeClr val="tx1"/>
+              </a:solidFill>
+              <a:latin typeface="나눔바른고딕" charset="0"/>
+              <a:ea typeface="나눔바른고딕" charset="0"/>
+            </a:endParaRPr>
+          </a:p>
+        </p:txBody>
+      </p:sp>
+      <p:sp>
+        <p:nvSpPr>
+          <p:cNvPr id="1207" name="Rect 0"/>
+          <p:cNvSpPr txBox="1">
+            <a:spLocks/>
+          </p:cNvSpPr>
+          <p:nvPr/>
+        </p:nvSpPr>
+        <p:spPr>
+          <a:xfrm rot="0">
+            <a:off x="1240790" y="4163695"/>
+            <a:ext cx="4135120" cy="2012950"/>
+          </a:xfrm>
+          <a:prstGeom prst="rect"/>
+          <a:noFill/>
+        </p:spPr>
+        <p:txBody>
+          <a:bodyPr wrap="square" lIns="0" tIns="0" rIns="0" bIns="0" numCol="1" vert="horz" anchor="t">
+            <a:noAutofit/>
+          </a:bodyPr>
+          <a:lstStyle/>
+          <a:p>
+            <a:pPr marL="0" indent="0" rtl="0" algn="l" defTabSz="914400" eaLnBrk="1" latinLnBrk="0" hangingPunct="1">
+              <a:buFontTx/>
+              <a:buNone/>
+            </a:pPr>
+            <a:r>
+              <a:rPr sz="2000" b="1">
+                <a:solidFill>
+                  <a:srgbClr val="0611F2"/>
+                </a:solidFill>
+                <a:latin typeface="맑은 고딕" charset="0"/>
+                <a:ea typeface="맑은 고딕" charset="0"/>
+              </a:rPr>
+              <a:t>4</a:t>
+            </a:r>
+            <a:r>
+              <a:rPr lang="ko-KR" sz="2000" b="1">
+                <a:solidFill>
+                  <a:srgbClr val="0611F2"/>
+                </a:solidFill>
+                <a:latin typeface="맑은 고딕" charset="0"/>
+                <a:ea typeface="맑은 고딕" charset="0"/>
+              </a:rPr>
+              <a:t>5</a:t>
+            </a:r>
+            <a:r>
+              <a:rPr sz="2000" b="1">
+                <a:solidFill>
+                  <a:srgbClr val="0611F2"/>
+                </a:solidFill>
+                <a:latin typeface="맑은 고딕" charset="0"/>
+                <a:ea typeface="맑은 고딕" charset="0"/>
+              </a:rPr>
+              <a:t>.</a:t>
+            </a:r>
+            <a:r>
+              <a:rPr sz="2000" b="1">
+                <a:solidFill>
+                  <a:srgbClr val="0611F2"/>
+                </a:solidFill>
+                <a:latin typeface="맑은 고딕" charset="0"/>
+                <a:ea typeface="맑은 고딕" charset="0"/>
+              </a:rPr>
+              <a:t> </a:t>
+            </a:r>
+            <a:r>
+              <a:rPr sz="1800">
+                <a:latin typeface="맑은 고딕" charset="0"/>
+                <a:ea typeface="맑은 고딕" charset="0"/>
+              </a:rPr>
+              <a:t>그리고 Skill(string) 함수를 선언한 </a:t>
+            </a:r>
+            <a:r>
+              <a:rPr sz="1800">
+                <a:latin typeface="맑은 고딕" charset="0"/>
+                <a:ea typeface="맑은 고딕" charset="0"/>
+              </a:rPr>
+              <a:t>다</a:t>
+            </a:r>
+            <a:r>
+              <a:rPr lang="ko-KR" sz="1800">
+                <a:latin typeface="맑은 고딕" charset="0"/>
+                <a:ea typeface="맑은 고딕" charset="0"/>
+              </a:rPr>
+              <a:t>음</a:t>
+            </a:r>
+            <a:r>
+              <a:rPr lang="ko-KR" sz="1800">
+                <a:latin typeface="맑은 고딕" charset="0"/>
+                <a:ea typeface="맑은 고딕" charset="0"/>
+              </a:rPr>
+              <a:t> </a:t>
+            </a:r>
+            <a:r>
+              <a:rPr lang="ko-KR" sz="1800">
+                <a:latin typeface="맑은 고딕" charset="0"/>
+                <a:ea typeface="맑은 고딕" charset="0"/>
+              </a:rPr>
+              <a:t>int 변수를 선언하고 랜덤한 값을 </a:t>
+            </a:r>
+            <a:r>
+              <a:rPr lang="ko-KR" sz="1800">
+                <a:latin typeface="맑은 고딕" charset="0"/>
+                <a:ea typeface="맑은 고딕" charset="0"/>
+              </a:rPr>
+              <a:t>받도</a:t>
+            </a:r>
+            <a:r>
+              <a:rPr lang="ko-KR" sz="1800">
+                <a:latin typeface="맑은 고딕" charset="0"/>
+                <a:ea typeface="맑은 고딕" charset="0"/>
+              </a:rPr>
+              <a:t>록</a:t>
+            </a:r>
+            <a:r>
+              <a:rPr lang="ko-KR" sz="1800">
+                <a:latin typeface="맑은 고딕" charset="0"/>
+                <a:ea typeface="맑은 고딕" charset="0"/>
+              </a:rPr>
+              <a:t> </a:t>
+            </a:r>
+            <a:r>
+              <a:rPr lang="ko-KR" sz="1800">
+                <a:latin typeface="맑은 고딕" charset="0"/>
+                <a:ea typeface="맑은 고딕" charset="0"/>
+              </a:rPr>
+              <a:t>설정합니다.</a:t>
+            </a:r>
+            <a:endParaRPr lang="ko-KR" altLang="en-US" sz="1800">
+              <a:latin typeface="맑은 고딕" charset="0"/>
+              <a:ea typeface="맑은 고딕" charset="0"/>
+            </a:endParaRPr>
+          </a:p>
+          <a:p>
+            <a:pPr marL="0" indent="0" rtl="0" algn="l" defTabSz="914400" eaLnBrk="1" latinLnBrk="0" hangingPunct="1">
+              <a:buFontTx/>
+              <a:buNone/>
+            </a:pPr>
+            <a:endParaRPr lang="ko-KR" altLang="en-US" sz="1800">
+              <a:latin typeface="맑은 고딕" charset="0"/>
+              <a:ea typeface="맑은 고딕" charset="0"/>
+            </a:endParaRPr>
+          </a:p>
+          <a:p>
+            <a:pPr marL="0" indent="0" rtl="0" algn="l" defTabSz="914400" eaLnBrk="1" latinLnBrk="0" hangingPunct="1">
+              <a:buFontTx/>
+              <a:buNone/>
+            </a:pPr>
+            <a:r>
+              <a:rPr lang="ko-KR" sz="1800">
+                <a:latin typeface="맑은 고딕" charset="0"/>
+                <a:ea typeface="맑은 고딕" charset="0"/>
+              </a:rPr>
+              <a:t>그</a:t>
+            </a:r>
+            <a:r>
+              <a:rPr lang="ko-KR" sz="1800">
+                <a:latin typeface="맑은 고딕" charset="0"/>
+                <a:ea typeface="맑은 고딕" charset="0"/>
+              </a:rPr>
+              <a:t>런</a:t>
+            </a:r>
+            <a:r>
+              <a:rPr lang="ko-KR" sz="1800">
+                <a:latin typeface="맑은 고딕" charset="0"/>
+                <a:ea typeface="맑은 고딕" charset="0"/>
+              </a:rPr>
+              <a:t> 다음 0 이라는 값이 저장되면 </a:t>
+            </a:r>
+            <a:r>
+              <a:rPr lang="ko-KR" sz="1800">
+                <a:latin typeface="맑은 고딕" charset="0"/>
+                <a:ea typeface="맑은 고딕" charset="0"/>
+              </a:rPr>
+              <a:t>캐릭터</a:t>
+            </a:r>
+            <a:r>
+              <a:rPr lang="ko-KR" sz="1800">
+                <a:latin typeface="맑은 고딕" charset="0"/>
+                <a:ea typeface="맑은 고딕" charset="0"/>
+              </a:rPr>
+              <a:t> </a:t>
+            </a:r>
+            <a:r>
+              <a:rPr lang="ko-KR" sz="1800">
+                <a:latin typeface="맑은 고딕" charset="0"/>
+                <a:ea typeface="맑은 고딕" charset="0"/>
+              </a:rPr>
+              <a:t>오브젝트</a:t>
+            </a:r>
+            <a:r>
+              <a:rPr lang="ko-KR" sz="1800">
+                <a:latin typeface="맑은 고딕" charset="0"/>
+                <a:ea typeface="맑은 고딕" charset="0"/>
+              </a:rPr>
+              <a:t>에 있는 </a:t>
+            </a:r>
+            <a:r>
+              <a:rPr lang="ko-KR" sz="1800">
+                <a:latin typeface="맑은 고딕" charset="0"/>
+                <a:ea typeface="맑은 고딕" charset="0"/>
+              </a:rPr>
+              <a:t>애니메이션을 </a:t>
+            </a:r>
+            <a:r>
+              <a:rPr lang="ko-KR" sz="1800">
+                <a:latin typeface="맑은 고딕" charset="0"/>
+                <a:ea typeface="맑은 고딕" charset="0"/>
+              </a:rPr>
+              <a:t>실행하도록</a:t>
+            </a:r>
+            <a:r>
+              <a:rPr lang="ko-KR" sz="1800">
+                <a:latin typeface="맑은 고딕" charset="0"/>
+                <a:ea typeface="맑은 고딕" charset="0"/>
+              </a:rPr>
+              <a:t> 설정합니</a:t>
+            </a:r>
+            <a:r>
+              <a:rPr lang="ko-KR" sz="1800">
+                <a:latin typeface="맑은 고딕" charset="0"/>
+                <a:ea typeface="맑은 고딕" charset="0"/>
+              </a:rPr>
+              <a:t>다.</a:t>
+            </a:r>
+            <a:endParaRPr lang="ko-KR" altLang="en-US" sz="1800">
+              <a:latin typeface="맑은 고딕" charset="0"/>
+              <a:ea typeface="맑은 고딕" charset="0"/>
+            </a:endParaRPr>
+          </a:p>
+        </p:txBody>
+      </p:sp>
+      <p:sp>
+        <p:nvSpPr>
+          <p:cNvPr id="1235" name="Rect 0"/>
+          <p:cNvSpPr txBox="1">
+            <a:spLocks/>
+          </p:cNvSpPr>
+          <p:nvPr/>
+        </p:nvSpPr>
+        <p:spPr>
+          <a:xfrm rot="0">
+            <a:off x="6833870" y="5532755"/>
+            <a:ext cx="4115435" cy="643890"/>
+          </a:xfrm>
+          <a:prstGeom prst="rect"/>
+          <a:noFill/>
+        </p:spPr>
+        <p:txBody>
+          <a:bodyPr wrap="square" lIns="0" tIns="0" rIns="0" bIns="0" numCol="1" vert="horz" anchor="t">
+            <a:noAutofit/>
+          </a:bodyPr>
+          <a:lstStyle/>
+          <a:p>
+            <a:pPr marL="0" indent="0" rtl="0" algn="l" defTabSz="914400" eaLnBrk="1" latinLnBrk="0" hangingPunct="1">
+              <a:buFontTx/>
+              <a:buNone/>
+            </a:pPr>
+            <a:r>
+              <a:rPr sz="2000" b="1">
+                <a:solidFill>
+                  <a:srgbClr val="0611F2"/>
+                </a:solidFill>
+                <a:latin typeface="맑은 고딕" charset="0"/>
+                <a:ea typeface="맑은 고딕" charset="0"/>
+              </a:rPr>
+              <a:t>4</a:t>
+            </a:r>
+            <a:r>
+              <a:rPr lang="ko-KR" sz="2000" b="1">
+                <a:solidFill>
+                  <a:srgbClr val="0611F2"/>
+                </a:solidFill>
+                <a:latin typeface="맑은 고딕" charset="0"/>
+                <a:ea typeface="맑은 고딕" charset="0"/>
+              </a:rPr>
+              <a:t>6</a:t>
+            </a:r>
+            <a:r>
+              <a:rPr sz="2000" b="1">
+                <a:solidFill>
+                  <a:srgbClr val="0611F2"/>
+                </a:solidFill>
+                <a:latin typeface="맑은 고딕" charset="0"/>
+                <a:ea typeface="맑은 고딕" charset="0"/>
+              </a:rPr>
+              <a:t>.</a:t>
+            </a:r>
+            <a:r>
+              <a:rPr sz="2000" b="1">
+                <a:solidFill>
+                  <a:srgbClr val="0611F2"/>
+                </a:solidFill>
+                <a:latin typeface="맑은 고딕" charset="0"/>
+                <a:ea typeface="맑은 고딕" charset="0"/>
+              </a:rPr>
+              <a:t> </a:t>
+            </a:r>
+            <a:r>
+              <a:rPr sz="1800">
+                <a:latin typeface="맑은 고딕" charset="0"/>
+                <a:ea typeface="맑은 고딕" charset="0"/>
+              </a:rPr>
+              <a:t>그다음 Idle 애니메이션을 선택하고 </a:t>
+            </a:r>
+            <a:r>
+              <a:rPr lang="ko-KR" sz="1800">
+                <a:latin typeface="맑은 고딕" charset="0"/>
+                <a:ea typeface="맑은 고딕" charset="0"/>
+              </a:rPr>
+              <a:t>Ani</a:t>
+            </a:r>
+            <a:r>
+              <a:rPr lang="ko-KR" sz="1800">
+                <a:latin typeface="맑은 고딕" charset="0"/>
+                <a:ea typeface="맑은 고딕" charset="0"/>
+              </a:rPr>
+              <a:t>mation</a:t>
+            </a:r>
+            <a:r>
+              <a:rPr lang="ko-KR" sz="1800">
+                <a:latin typeface="맑은 고딕" charset="0"/>
+                <a:ea typeface="맑은 고딕" charset="0"/>
+              </a:rPr>
+              <a:t>에</a:t>
+            </a:r>
+            <a:r>
+              <a:rPr lang="ko-KR" sz="1800">
+                <a:latin typeface="맑은 고딕" charset="0"/>
+                <a:ea typeface="맑은 고딕" charset="0"/>
+              </a:rPr>
+              <a:t> </a:t>
+            </a:r>
+            <a:r>
+              <a:rPr lang="ko-KR" sz="1800">
+                <a:latin typeface="맑은 고딕" charset="0"/>
+                <a:ea typeface="맑은 고딕" charset="0"/>
+              </a:rPr>
+              <a:t>Events를 추가합니다.</a:t>
+            </a:r>
+            <a:endParaRPr lang="ko-KR" altLang="en-US" sz="1800">
+              <a:latin typeface="맑은 고딕" charset="0"/>
+              <a:ea typeface="맑은 고딕" charset="0"/>
+            </a:endParaRPr>
+          </a:p>
+        </p:txBody>
+      </p:sp>
+      <p:pic>
+        <p:nvPicPr>
+          <p:cNvPr id="1237" name="그림 52" descr="C:/Users/Admin1/AppData/Roaming/PolarisOffice/ETemp/4316_14940424/fImage10580352491.png"/>
+          <p:cNvPicPr>
+            <a:picLocks noChangeAspect="1"/>
+          </p:cNvPicPr>
+          <p:nvPr/>
+        </p:nvPicPr>
+        <p:blipFill rotWithShape="1">
+          <a:blip r:embed="rId2" cstate="print">
+            <a:extLst>
+              <a:ext uri="{28A0092B-C50C-407E-A947-70E740481C1C}">
+                <a14:useLocalDpi xmlns:a14="http://schemas.microsoft.com/office/drawing/2010/main" val="0"/>
+              </a:ext>
+            </a:extLst>
+          </a:blip>
+          <a:stretch>
+            <a:fillRect/>
+          </a:stretch>
+        </p:blipFill>
+        <p:spPr>
+          <a:xfrm rot="0">
+            <a:off x="6823075" y="1438275"/>
+            <a:ext cx="4126230" cy="3859530"/>
+          </a:xfrm>
+          <a:prstGeom prst="roundRect"/>
+          <a:solidFill>
+            <a:srgbClr val="EDEDED"/>
+          </a:solidFill>
+        </p:spPr>
+      </p:pic>
+      <p:pic>
+        <p:nvPicPr>
+          <p:cNvPr id="1238" name="그림 64" descr="C:/Users/Admin1/AppData/Roaming/PolarisOffice/ETemp/4316_14940424/fImage402753562995.png"/>
+          <p:cNvPicPr>
+            <a:picLocks noChangeAspect="1"/>
+          </p:cNvPicPr>
+          <p:nvPr/>
+        </p:nvPicPr>
+        <p:blipFill rotWithShape="1">
+          <a:blip r:embed="rId3" cstate="print">
+            <a:extLst>
+              <a:ext uri="{28A0092B-C50C-407E-A947-70E740481C1C}">
+                <a14:useLocalDpi xmlns:a14="http://schemas.microsoft.com/office/drawing/2010/main" val="0"/>
+              </a:ext>
+            </a:extLst>
+          </a:blip>
+          <a:stretch>
+            <a:fillRect/>
+          </a:stretch>
+        </p:blipFill>
+        <p:spPr>
+          <a:xfrm rot="0">
+            <a:off x="1240790" y="1437640"/>
+            <a:ext cx="4135120" cy="2516505"/>
+          </a:xfrm>
+          <a:prstGeom prst="roundRect"/>
+          <a:solidFill>
+            <a:srgbClr val="EDEDED"/>
+          </a:solidFill>
+        </p:spPr>
+      </p:pic>
+    </p:spTree>
+  </p:cSld>
+  <p:clrMapOvr>
+    <a:masterClrMapping/>
+  </p:clrMapOvr>
+  <mc:AlternateContent xmlns:mc="http://schemas.openxmlformats.org/markup-compatibility/2006">
+    <mc:Choice xmlns:p14="http://schemas.microsoft.com/office/powerpoint/2010/main" Requires="p14">
+      <p:transition spd="slow" p14:dur="2000"/>
+    </mc:Choice>
+    <mc:Fallback>
+      <p:transition spd="slow"/>
+    </mc:Fallback>
+  </mc:AlternateContent>
+  <p:timing>
+    <p:tnLst>
+      <p:par>
+        <p:cTn id="1" dur="indefinite" restart="never" nodeType="tmRoot"/>
+      </p:par>
+    </p:tnLst>
+  </p:timing>
+</p:sld>
+</file>
+
+<file path=ppt/slides/slide18.xml><?xml version="1.0" encoding="utf-8"?>
+<p:sld xmlns:a="http://schemas.openxmlformats.org/drawingml/2006/main" xmlns:r="http://schemas.openxmlformats.org/officeDocument/2006/relationships" xmlns:p="http://schemas.openxmlformats.org/presentationml/2006/main">
+  <p:cSld>
+    <p:spTree>
+      <p:nvGrpSpPr>
+        <p:cNvPr id="1" name=""/>
+        <p:cNvGrpSpPr/>
+        <p:nvPr/>
+      </p:nvGrpSpPr>
+      <p:grpSpPr>
+        <a:xfrm>
+          <a:off x="0" y="0"/>
+          <a:ext cx="0" cy="0"/>
+          <a:chOff x="0" y="0"/>
+          <a:chExt cx="0" cy="0"/>
+        </a:xfrm>
+      </p:grpSpPr>
+      <p:sp>
+        <p:nvSpPr>
+          <p:cNvPr id="1154" name="Rect 0"/>
+          <p:cNvSpPr txBox="1">
+            <a:spLocks/>
+          </p:cNvSpPr>
+          <p:nvPr/>
+        </p:nvSpPr>
+        <p:spPr>
+          <a:xfrm rot="0">
+            <a:off x="4280535" y="405130"/>
+            <a:ext cx="3630930" cy="478155"/>
+          </a:xfrm>
+          <a:prstGeom prst="rect"/>
+          <a:noFill/>
+          <a:ln w="0">
+            <a:noFill/>
+            <a:prstDash/>
+          </a:ln>
+        </p:spPr>
+        <p:txBody>
+          <a:bodyPr wrap="square" lIns="89535" tIns="46355" rIns="89535" bIns="46355" numCol="1" vert="horz" anchor="t">
+            <a:spAutoFit/>
+          </a:bodyPr>
+          <a:lstStyle/>
+          <a:p>
+            <a:pPr marL="0" indent="0" algn="ctr" latinLnBrk="0">
+              <a:buFontTx/>
+              <a:buNone/>
+            </a:pPr>
+            <a:r>
+              <a:rPr lang="ko-KR" altLang="en-US" sz="2500" b="1">
+                <a:solidFill>
+                  <a:schemeClr val="tx1"/>
+                </a:solidFill>
+                <a:latin typeface="나눔바른고딕" charset="0"/>
+                <a:ea typeface="나눔바른고딕" charset="0"/>
+              </a:rPr>
+              <a:t>열여덟</a:t>
+            </a:r>
+            <a:r>
+              <a:rPr lang="ko-KR" altLang="en-US" sz="2500" b="1">
+                <a:solidFill>
+                  <a:schemeClr val="tx1"/>
+                </a:solidFill>
+                <a:latin typeface="나눔바른고딕" charset="0"/>
+                <a:ea typeface="나눔바른고딕" charset="0"/>
+              </a:rPr>
+              <a:t> 번째 튜토리얼</a:t>
+            </a:r>
+            <a:endParaRPr lang="ko-KR" altLang="en-US" sz="2500" b="1">
+              <a:solidFill>
+                <a:schemeClr val="tx1"/>
+              </a:solidFill>
+              <a:latin typeface="나눔바른고딕" charset="0"/>
+              <a:ea typeface="나눔바른고딕" charset="0"/>
+            </a:endParaRPr>
+          </a:p>
+        </p:txBody>
+      </p:sp>
+      <p:sp>
+        <p:nvSpPr>
+          <p:cNvPr id="1207" name="Rect 0"/>
+          <p:cNvSpPr txBox="1">
+            <a:spLocks/>
+          </p:cNvSpPr>
+          <p:nvPr/>
+        </p:nvSpPr>
+        <p:spPr>
+          <a:xfrm rot="0">
+            <a:off x="1240790" y="4413250"/>
+            <a:ext cx="4143375" cy="1763395"/>
+          </a:xfrm>
+          <a:prstGeom prst="rect"/>
+          <a:noFill/>
+        </p:spPr>
+        <p:txBody>
+          <a:bodyPr wrap="square" lIns="0" tIns="0" rIns="0" bIns="0" numCol="1" vert="horz" anchor="t">
+            <a:noAutofit/>
+          </a:bodyPr>
+          <a:lstStyle/>
+          <a:p>
+            <a:pPr marL="0" indent="0" rtl="0" algn="l" defTabSz="914400" eaLnBrk="1" latinLnBrk="0" hangingPunct="1">
+              <a:buFontTx/>
+              <a:buNone/>
+            </a:pPr>
+            <a:r>
+              <a:rPr sz="2000" b="1">
+                <a:solidFill>
+                  <a:srgbClr val="0611F2"/>
+                </a:solidFill>
+                <a:latin typeface="맑은 고딕" charset="0"/>
+                <a:ea typeface="맑은 고딕" charset="0"/>
+              </a:rPr>
+              <a:t>4</a:t>
+            </a:r>
+            <a:r>
+              <a:rPr lang="ko-KR" sz="2000" b="1">
+                <a:solidFill>
+                  <a:srgbClr val="0611F2"/>
+                </a:solidFill>
+                <a:latin typeface="맑은 고딕" charset="0"/>
+                <a:ea typeface="맑은 고딕" charset="0"/>
+              </a:rPr>
+              <a:t>7</a:t>
+            </a:r>
+            <a:r>
+              <a:rPr sz="2000" b="1">
+                <a:solidFill>
+                  <a:srgbClr val="0611F2"/>
+                </a:solidFill>
+                <a:latin typeface="맑은 고딕" charset="0"/>
+                <a:ea typeface="맑은 고딕" charset="0"/>
+              </a:rPr>
+              <a:t>.</a:t>
+            </a:r>
+            <a:r>
+              <a:rPr sz="2000" b="1">
+                <a:solidFill>
+                  <a:srgbClr val="0611F2"/>
+                </a:solidFill>
+                <a:latin typeface="맑은 고딕" charset="0"/>
+                <a:ea typeface="맑은 고딕" charset="0"/>
+              </a:rPr>
+              <a:t> </a:t>
+            </a:r>
+            <a:r>
+              <a:rPr sz="1800">
+                <a:latin typeface="맑은 고딕" charset="0"/>
+                <a:ea typeface="맑은 고딕" charset="0"/>
+              </a:rPr>
+              <a:t>그러고 나서 애니메이션 이벤트를 </a:t>
+            </a:r>
+            <a:r>
+              <a:rPr sz="1800">
+                <a:latin typeface="맑은 고딕" charset="0"/>
+                <a:ea typeface="맑은 고딕" charset="0"/>
+              </a:rPr>
+              <a:t>1</a:t>
+            </a:r>
+            <a:r>
+              <a:rPr sz="1800">
+                <a:latin typeface="맑은 고딕" charset="0"/>
+                <a:ea typeface="맑은 고딕" charset="0"/>
+              </a:rPr>
+              <a:t> </a:t>
+            </a:r>
+            <a:r>
+              <a:rPr sz="1800">
+                <a:latin typeface="맑은 고딕" charset="0"/>
+                <a:ea typeface="맑은 고딕" charset="0"/>
+              </a:rPr>
+              <a:t>:</a:t>
+            </a:r>
+            <a:r>
+              <a:rPr sz="1800">
+                <a:latin typeface="맑은 고딕" charset="0"/>
+                <a:ea typeface="맑은 고딕" charset="0"/>
+              </a:rPr>
+              <a:t> 00로 옮긴 다음 </a:t>
+            </a:r>
+            <a:r>
+              <a:rPr sz="1800">
+                <a:latin typeface="맑은 고딕" charset="0"/>
+                <a:ea typeface="맑은 고딕" charset="0"/>
+              </a:rPr>
+              <a:t>Function의</a:t>
+            </a:r>
+            <a:r>
+              <a:rPr sz="1800">
+                <a:latin typeface="맑은 고딕" charset="0"/>
+                <a:ea typeface="맑은 고딕" charset="0"/>
+              </a:rPr>
+              <a:t> 이름을 </a:t>
+            </a:r>
+            <a:r>
+              <a:rPr sz="1800">
+                <a:latin typeface="맑은 고딕" charset="0"/>
+                <a:ea typeface="맑은 고딕" charset="0"/>
+              </a:rPr>
+              <a:t>Skill</a:t>
+            </a:r>
+            <a:r>
+              <a:rPr sz="1800">
+                <a:latin typeface="맑은 고딕" charset="0"/>
+                <a:ea typeface="맑은 고딕" charset="0"/>
+              </a:rPr>
+              <a:t>로</a:t>
+            </a:r>
+            <a:r>
+              <a:rPr sz="1800">
+                <a:latin typeface="맑은 고딕" charset="0"/>
+                <a:ea typeface="맑은 고딕" charset="0"/>
+              </a:rPr>
+              <a:t> </a:t>
+            </a:r>
+            <a:r>
+              <a:rPr sz="1800">
+                <a:latin typeface="맑은 고딕" charset="0"/>
+                <a:ea typeface="맑은 고딕" charset="0"/>
+              </a:rPr>
+              <a:t>설정합니다.</a:t>
+            </a:r>
+            <a:endParaRPr lang="ko-KR" altLang="en-US" sz="1800">
+              <a:latin typeface="맑은 고딕" charset="0"/>
+              <a:ea typeface="맑은 고딕" charset="0"/>
+            </a:endParaRPr>
+          </a:p>
+          <a:p>
+            <a:pPr marL="0" indent="0" rtl="0" algn="l" defTabSz="914400" eaLnBrk="1" latinLnBrk="0" hangingPunct="1">
+              <a:buFontTx/>
+              <a:buNone/>
+            </a:pPr>
+            <a:endParaRPr lang="ko-KR" altLang="en-US" sz="1800">
+              <a:latin typeface="맑은 고딕" charset="0"/>
+              <a:ea typeface="맑은 고딕" charset="0"/>
+            </a:endParaRPr>
+          </a:p>
+          <a:p>
+            <a:pPr marL="0" indent="0" rtl="0" algn="l" defTabSz="914400" eaLnBrk="1" latinLnBrk="0" hangingPunct="1">
+              <a:buFontTx/>
+              <a:buNone/>
+            </a:pPr>
+            <a:r>
+              <a:rPr lang="ko-KR" sz="1800">
+                <a:latin typeface="맑은 고딕" charset="0"/>
+                <a:ea typeface="맑은 고딕" charset="0"/>
+              </a:rPr>
+              <a:t>마지막으로</a:t>
+            </a:r>
+            <a:r>
+              <a:rPr lang="ko-KR" sz="1800">
+                <a:latin typeface="맑은 고딕" charset="0"/>
+                <a:ea typeface="맑은 고딕" charset="0"/>
+              </a:rPr>
+              <a:t> </a:t>
+            </a:r>
+            <a:r>
+              <a:rPr lang="ko-KR" sz="1800">
+                <a:latin typeface="맑은 고딕" charset="0"/>
+                <a:ea typeface="맑은 고딕" charset="0"/>
+              </a:rPr>
+              <a:t>String에 Attack</a:t>
+            </a:r>
+            <a:r>
+              <a:rPr lang="ko-KR" sz="1800">
+                <a:latin typeface="맑은 고딕" charset="0"/>
+                <a:ea typeface="맑은 고딕" charset="0"/>
+              </a:rPr>
+              <a:t> 이라는 </a:t>
+            </a:r>
+            <a:r>
+              <a:rPr lang="ko-KR" sz="1800">
+                <a:latin typeface="맑은 고딕" charset="0"/>
+                <a:ea typeface="맑은 고딕" charset="0"/>
+              </a:rPr>
+              <a:t>문자열을</a:t>
+            </a:r>
+            <a:r>
+              <a:rPr lang="ko-KR" sz="1800">
+                <a:latin typeface="맑은 고딕" charset="0"/>
+                <a:ea typeface="맑은 고딕" charset="0"/>
+              </a:rPr>
+              <a:t> </a:t>
+            </a:r>
+            <a:r>
+              <a:rPr lang="ko-KR" sz="1800">
+                <a:latin typeface="맑은 고딕" charset="0"/>
+                <a:ea typeface="맑은 고딕" charset="0"/>
+              </a:rPr>
+              <a:t>설정하고 Apply를 선택합니다.</a:t>
+            </a:r>
+            <a:r>
+              <a:rPr lang="ko-KR" sz="1800">
+                <a:latin typeface="맑은 고딕" charset="0"/>
+                <a:ea typeface="맑은 고딕" charset="0"/>
+              </a:rPr>
+              <a:t> </a:t>
+            </a:r>
+            <a:endParaRPr lang="ko-KR" altLang="en-US" sz="1800">
+              <a:latin typeface="맑은 고딕" charset="0"/>
+              <a:ea typeface="맑은 고딕" charset="0"/>
+            </a:endParaRPr>
+          </a:p>
+        </p:txBody>
+      </p:sp>
+      <p:sp>
+        <p:nvSpPr>
+          <p:cNvPr id="1235" name="Rect 0"/>
+          <p:cNvSpPr txBox="1">
+            <a:spLocks/>
+          </p:cNvSpPr>
+          <p:nvPr/>
+        </p:nvSpPr>
+        <p:spPr>
+          <a:xfrm rot="0">
+            <a:off x="6842125" y="4413250"/>
+            <a:ext cx="4124325" cy="1771650"/>
+          </a:xfrm>
+          <a:prstGeom prst="rect"/>
+          <a:noFill/>
+        </p:spPr>
+        <p:txBody>
+          <a:bodyPr wrap="square" lIns="0" tIns="0" rIns="0" bIns="0" numCol="1" vert="horz" anchor="t">
+            <a:noAutofit/>
+          </a:bodyPr>
+          <a:lstStyle/>
+          <a:p>
+            <a:pPr marL="0" indent="0" rtl="0" algn="l" defTabSz="914400" eaLnBrk="1" latinLnBrk="0" hangingPunct="1">
+              <a:buFontTx/>
+              <a:buNone/>
+            </a:pPr>
+            <a:r>
+              <a:rPr sz="2000" b="1">
+                <a:solidFill>
+                  <a:srgbClr val="0611F2"/>
+                </a:solidFill>
+                <a:latin typeface="맑은 고딕" charset="0"/>
+                <a:ea typeface="맑은 고딕" charset="0"/>
+              </a:rPr>
+              <a:t>4</a:t>
+            </a:r>
+            <a:r>
+              <a:rPr lang="ko-KR" sz="2000" b="1">
+                <a:solidFill>
+                  <a:srgbClr val="0611F2"/>
+                </a:solidFill>
+                <a:latin typeface="맑은 고딕" charset="0"/>
+                <a:ea typeface="맑은 고딕" charset="0"/>
+              </a:rPr>
+              <a:t>8</a:t>
+            </a:r>
+            <a:r>
+              <a:rPr sz="2000" b="1">
+                <a:solidFill>
+                  <a:srgbClr val="0611F2"/>
+                </a:solidFill>
+                <a:latin typeface="맑은 고딕" charset="0"/>
+                <a:ea typeface="맑은 고딕" charset="0"/>
+              </a:rPr>
+              <a:t>.</a:t>
+            </a:r>
+            <a:r>
+              <a:rPr sz="2000" b="1">
+                <a:solidFill>
+                  <a:srgbClr val="0611F2"/>
+                </a:solidFill>
+                <a:latin typeface="맑은 고딕" charset="0"/>
+                <a:ea typeface="맑은 고딕" charset="0"/>
+              </a:rPr>
+              <a:t> </a:t>
+            </a:r>
+            <a:r>
+              <a:rPr sz="1800">
+                <a:latin typeface="맑은 고딕" charset="0"/>
+                <a:ea typeface="맑은 고딕" charset="0"/>
+              </a:rPr>
+              <a:t>이제 </a:t>
+            </a:r>
+            <a:r>
+              <a:rPr lang="ko-KR" sz="1800">
+                <a:latin typeface="맑은 고딕" charset="0"/>
+                <a:ea typeface="맑은 고딕" charset="0"/>
+              </a:rPr>
+              <a:t>New Animator Controller를 </a:t>
+            </a:r>
+            <a:r>
+              <a:rPr lang="ko-KR" sz="1800">
+                <a:latin typeface="맑은 고딕" charset="0"/>
+                <a:ea typeface="맑은 고딕" charset="0"/>
+              </a:rPr>
+              <a:t>선택</a:t>
+            </a:r>
+            <a:r>
+              <a:rPr lang="ko-KR" sz="1800">
+                <a:latin typeface="맑은 고딕" charset="0"/>
+                <a:ea typeface="맑은 고딕" charset="0"/>
+              </a:rPr>
+              <a:t>한</a:t>
+            </a:r>
+            <a:r>
+              <a:rPr lang="ko-KR" sz="1800">
+                <a:latin typeface="맑은 고딕" charset="0"/>
+                <a:ea typeface="맑은 고딕" charset="0"/>
+              </a:rPr>
+              <a:t> </a:t>
+            </a:r>
+            <a:r>
+              <a:rPr lang="ko-KR" sz="1800">
+                <a:latin typeface="맑은 고딕" charset="0"/>
+                <a:ea typeface="맑은 고딕" charset="0"/>
+              </a:rPr>
+              <a:t>다음 Attack 애니메이션에서 </a:t>
+            </a:r>
+            <a:r>
+              <a:rPr lang="ko-KR" sz="1800">
+                <a:latin typeface="맑은 고딕" charset="0"/>
+                <a:ea typeface="맑은 고딕" charset="0"/>
+              </a:rPr>
+              <a:t>Make</a:t>
+            </a:r>
+            <a:r>
+              <a:rPr lang="ko-KR" sz="1800">
+                <a:latin typeface="맑은 고딕" charset="0"/>
+                <a:ea typeface="맑은 고딕" charset="0"/>
+              </a:rPr>
+              <a:t> </a:t>
+            </a:r>
+            <a:r>
+              <a:rPr lang="ko-KR" sz="1800">
+                <a:latin typeface="맑은 고딕" charset="0"/>
+                <a:ea typeface="맑은 고딕" charset="0"/>
+              </a:rPr>
+              <a:t>T</a:t>
+            </a:r>
+            <a:r>
+              <a:rPr lang="ko-KR" sz="1800">
+                <a:latin typeface="맑은 고딕" charset="0"/>
+                <a:ea typeface="맑은 고딕" charset="0"/>
+              </a:rPr>
+              <a:t>ransition</a:t>
+            </a:r>
+            <a:r>
+              <a:rPr lang="ko-KR" sz="1800">
+                <a:latin typeface="맑은 고딕" charset="0"/>
+                <a:ea typeface="맑은 고딕" charset="0"/>
+              </a:rPr>
+              <a:t>을 </a:t>
+            </a:r>
+            <a:r>
+              <a:rPr lang="ko-KR" sz="1800">
+                <a:latin typeface="맑은 고딕" charset="0"/>
+                <a:ea typeface="맑은 고딕" charset="0"/>
+              </a:rPr>
+              <a:t>생성합니다.</a:t>
+            </a:r>
+            <a:endParaRPr lang="ko-KR" altLang="en-US" sz="1800">
+              <a:latin typeface="맑은 고딕" charset="0"/>
+              <a:ea typeface="맑은 고딕" charset="0"/>
+            </a:endParaRPr>
+          </a:p>
+          <a:p>
+            <a:pPr marL="0" indent="0" rtl="0" algn="l" defTabSz="914400" eaLnBrk="1" latinLnBrk="0" hangingPunct="1">
+              <a:buFontTx/>
+              <a:buNone/>
+            </a:pPr>
+            <a:endParaRPr lang="ko-KR" altLang="en-US" sz="1800">
+              <a:latin typeface="맑은 고딕" charset="0"/>
+              <a:ea typeface="맑은 고딕" charset="0"/>
+            </a:endParaRPr>
+          </a:p>
+          <a:p>
+            <a:pPr marL="0" indent="0" rtl="0" algn="l" defTabSz="914400" eaLnBrk="1" latinLnBrk="0" hangingPunct="1">
+              <a:buFontTx/>
+              <a:buNone/>
+            </a:pPr>
+            <a:r>
+              <a:rPr sz="1800">
+                <a:latin typeface="맑은 고딕" charset="0"/>
+                <a:ea typeface="맑은 고딕" charset="0"/>
+              </a:rPr>
+              <a:t>그리</a:t>
+            </a:r>
+            <a:r>
+              <a:rPr sz="1800">
+                <a:latin typeface="맑은 고딕" charset="0"/>
+                <a:ea typeface="맑은 고딕" charset="0"/>
+              </a:rPr>
+              <a:t>고</a:t>
+            </a:r>
+            <a:r>
+              <a:rPr sz="1800">
+                <a:latin typeface="맑은 고딕" charset="0"/>
+                <a:ea typeface="맑은 고딕" charset="0"/>
+              </a:rPr>
+              <a:t> Attack 애니메이션에서 Exit로 </a:t>
+            </a:r>
+            <a:r>
+              <a:rPr sz="1800">
+                <a:latin typeface="맑은 고딕" charset="0"/>
+                <a:ea typeface="맑은 고딕" charset="0"/>
+              </a:rPr>
+              <a:t>연결합니</a:t>
+            </a:r>
+            <a:r>
+              <a:rPr lang="ko-KR" sz="1800">
+                <a:latin typeface="맑은 고딕" charset="0"/>
+                <a:ea typeface="맑은 고딕" charset="0"/>
+              </a:rPr>
+              <a:t>다.</a:t>
+            </a:r>
+            <a:endParaRPr lang="ko-KR" altLang="en-US" sz="1800">
+              <a:latin typeface="맑은 고딕" charset="0"/>
+              <a:ea typeface="맑은 고딕" charset="0"/>
+            </a:endParaRPr>
+          </a:p>
+        </p:txBody>
+      </p:sp>
+      <p:pic>
+        <p:nvPicPr>
+          <p:cNvPr id="1238" name="그림 67" descr="C:/Users/Admin1/AppData/Roaming/PolarisOffice/ETemp/4316_14940424/fImage120873651942.png"/>
+          <p:cNvPicPr>
+            <a:picLocks noChangeAspect="1"/>
+          </p:cNvPicPr>
+          <p:nvPr/>
+        </p:nvPicPr>
+        <p:blipFill rotWithShape="1">
+          <a:blip r:embed="rId2" cstate="print">
+            <a:extLst>
+              <a:ext uri="{28A0092B-C50C-407E-A947-70E740481C1C}">
+                <a14:useLocalDpi xmlns:a14="http://schemas.microsoft.com/office/drawing/2010/main" val="0"/>
+              </a:ext>
+            </a:extLst>
+          </a:blip>
+          <a:stretch>
+            <a:fillRect/>
+          </a:stretch>
+        </p:blipFill>
+        <p:spPr>
+          <a:xfrm rot="0">
+            <a:off x="1240790" y="1447165"/>
+            <a:ext cx="4152265" cy="2731135"/>
+          </a:xfrm>
+          <a:prstGeom prst="roundRect"/>
+          <a:solidFill>
+            <a:srgbClr val="EDEDED"/>
+          </a:solidFill>
+        </p:spPr>
+      </p:pic>
+      <p:pic>
+        <p:nvPicPr>
+          <p:cNvPr id="1239" name="그림 78" descr="C:/Users/Admin1/AppData/Roaming/PolarisOffice/ETemp/4316_14940424/fImage324273784827.png"/>
+          <p:cNvPicPr>
+            <a:picLocks noChangeAspect="1"/>
+          </p:cNvPicPr>
+          <p:nvPr/>
+        </p:nvPicPr>
+        <p:blipFill rotWithShape="1">
+          <a:blip r:embed="rId3" cstate="print">
+            <a:extLst>
+              <a:ext uri="{28A0092B-C50C-407E-A947-70E740481C1C}">
+                <a14:useLocalDpi xmlns:a14="http://schemas.microsoft.com/office/drawing/2010/main" val="0"/>
+              </a:ext>
+            </a:extLst>
+          </a:blip>
+          <a:stretch>
+            <a:fillRect/>
+          </a:stretch>
+        </p:blipFill>
+        <p:spPr>
+          <a:xfrm rot="0">
+            <a:off x="6830695" y="1446530"/>
+            <a:ext cx="4126865" cy="2731770"/>
+          </a:xfrm>
+          <a:prstGeom prst="roundRect"/>
+          <a:solidFill>
+            <a:srgbClr val="EDEDED"/>
+          </a:solidFill>
+        </p:spPr>
+      </p:pic>
+    </p:spTree>
+  </p:cSld>
+  <p:clrMapOvr>
+    <a:masterClrMapping/>
+  </p:clrMapOvr>
+  <mc:AlternateContent xmlns:mc="http://schemas.openxmlformats.org/markup-compatibility/2006">
+    <mc:Choice xmlns:p14="http://schemas.microsoft.com/office/powerpoint/2010/main" Requires="p14">
+      <p:transition spd="slow" p14:dur="2000"/>
+    </mc:Choice>
+    <mc:Fallback>
+      <p:transition spd="slow"/>
+    </mc:Fallback>
+  </mc:AlternateContent>
+  <p:timing>
+    <p:tnLst>
+      <p:par>
+        <p:cTn id="1" dur="indefinite" restart="never" nodeType="tmRoot"/>
+      </p:par>
+    </p:tnLst>
+  </p:timing>
+</p:sld>
+</file>
+
+<file path=ppt/slides/slide19.xml><?xml version="1.0" encoding="utf-8"?>
+<p:sld xmlns:a="http://schemas.openxmlformats.org/drawingml/2006/main" xmlns:r="http://schemas.openxmlformats.org/officeDocument/2006/relationships" xmlns:p="http://schemas.openxmlformats.org/presentationml/2006/main">
+  <p:cSld>
+    <p:spTree>
+      <p:nvGrpSpPr>
+        <p:cNvPr id="1" name=""/>
+        <p:cNvGrpSpPr/>
+        <p:nvPr/>
+      </p:nvGrpSpPr>
+      <p:grpSpPr>
+        <a:xfrm>
+          <a:off x="0" y="0"/>
+          <a:ext cx="0" cy="0"/>
+          <a:chOff x="0" y="0"/>
+          <a:chExt cx="0" cy="0"/>
+        </a:xfrm>
+      </p:grpSpPr>
+      <p:sp>
+        <p:nvSpPr>
+          <p:cNvPr id="1154" name="Rect 0"/>
+          <p:cNvSpPr txBox="1">
+            <a:spLocks/>
+          </p:cNvSpPr>
+          <p:nvPr/>
+        </p:nvSpPr>
+        <p:spPr>
+          <a:xfrm rot="0">
+            <a:off x="4280535" y="405130"/>
+            <a:ext cx="3630930" cy="478155"/>
+          </a:xfrm>
+          <a:prstGeom prst="rect"/>
+          <a:noFill/>
+          <a:ln w="0">
+            <a:noFill/>
+            <a:prstDash/>
+          </a:ln>
+        </p:spPr>
+        <p:txBody>
+          <a:bodyPr wrap="square" lIns="89535" tIns="46355" rIns="89535" bIns="46355" numCol="1" vert="horz" anchor="t">
+            <a:spAutoFit/>
+          </a:bodyPr>
+          <a:lstStyle/>
+          <a:p>
+            <a:pPr marL="0" indent="0" algn="ctr" latinLnBrk="0">
+              <a:buFontTx/>
+              <a:buNone/>
+            </a:pPr>
+            <a:r>
+              <a:rPr lang="ko-KR" altLang="en-US" sz="2500" b="1">
+                <a:solidFill>
+                  <a:schemeClr val="tx1"/>
+                </a:solidFill>
+                <a:latin typeface="나눔바른고딕" charset="0"/>
+                <a:ea typeface="나눔바른고딕" charset="0"/>
+              </a:rPr>
+              <a:t>열아홉</a:t>
+            </a:r>
+            <a:r>
+              <a:rPr lang="ko-KR" altLang="en-US" sz="2500" b="1">
+                <a:solidFill>
+                  <a:schemeClr val="tx1"/>
+                </a:solidFill>
+                <a:latin typeface="나눔바른고딕" charset="0"/>
+                <a:ea typeface="나눔바른고딕" charset="0"/>
+              </a:rPr>
+              <a:t> 번째 튜토리얼</a:t>
+            </a:r>
+            <a:endParaRPr lang="ko-KR" altLang="en-US" sz="2500" b="1">
+              <a:solidFill>
+                <a:schemeClr val="tx1"/>
+              </a:solidFill>
+              <a:latin typeface="나눔바른고딕" charset="0"/>
+              <a:ea typeface="나눔바른고딕" charset="0"/>
+            </a:endParaRPr>
+          </a:p>
+        </p:txBody>
+      </p:sp>
+      <p:sp>
+        <p:nvSpPr>
+          <p:cNvPr id="1235" name="Rect 0"/>
+          <p:cNvSpPr txBox="1">
+            <a:spLocks/>
+          </p:cNvSpPr>
+          <p:nvPr/>
+        </p:nvSpPr>
+        <p:spPr>
+          <a:xfrm rot="0">
+            <a:off x="1243330" y="5222875"/>
+            <a:ext cx="4115435" cy="944880"/>
+          </a:xfrm>
+          <a:prstGeom prst="rect"/>
+          <a:noFill/>
+        </p:spPr>
+        <p:txBody>
+          <a:bodyPr wrap="square" lIns="0" tIns="0" rIns="0" bIns="0" numCol="1" vert="horz" anchor="t">
+            <a:noAutofit/>
+          </a:bodyPr>
+          <a:lstStyle/>
+          <a:p>
+            <a:pPr marL="0" indent="0" rtl="0" algn="l" defTabSz="914400" eaLnBrk="1" latinLnBrk="0" hangingPunct="1">
+              <a:buFontTx/>
+              <a:buNone/>
+            </a:pPr>
+            <a:r>
+              <a:rPr sz="2000" b="1">
+                <a:solidFill>
+                  <a:srgbClr val="0611F2"/>
+                </a:solidFill>
+                <a:latin typeface="맑은 고딕" charset="0"/>
+                <a:ea typeface="맑은 고딕" charset="0"/>
+              </a:rPr>
+              <a:t>4</a:t>
+            </a:r>
+            <a:r>
+              <a:rPr lang="ko-KR" sz="2000" b="1">
+                <a:solidFill>
+                  <a:srgbClr val="0611F2"/>
+                </a:solidFill>
+                <a:latin typeface="맑은 고딕" charset="0"/>
+                <a:ea typeface="맑은 고딕" charset="0"/>
+              </a:rPr>
+              <a:t>9</a:t>
+            </a:r>
+            <a:r>
+              <a:rPr sz="2000" b="1">
+                <a:solidFill>
+                  <a:srgbClr val="0611F2"/>
+                </a:solidFill>
+                <a:latin typeface="맑은 고딕" charset="0"/>
+                <a:ea typeface="맑은 고딕" charset="0"/>
+              </a:rPr>
+              <a:t>.</a:t>
+            </a:r>
+            <a:r>
+              <a:rPr sz="2000" b="1">
+                <a:solidFill>
+                  <a:srgbClr val="0611F2"/>
+                </a:solidFill>
+                <a:latin typeface="맑은 고딕" charset="0"/>
+                <a:ea typeface="맑은 고딕" charset="0"/>
+              </a:rPr>
+              <a:t> </a:t>
+            </a:r>
+            <a:r>
+              <a:rPr sz="1800">
+                <a:latin typeface="맑은 고딕" charset="0"/>
+                <a:ea typeface="맑은 고딕" charset="0"/>
+              </a:rPr>
+              <a:t>그런 다음 Attack 애니메이션을 </a:t>
+            </a:r>
+            <a:r>
+              <a:rPr sz="1800">
+                <a:latin typeface="맑은 고딕" charset="0"/>
+                <a:ea typeface="맑은 고딕" charset="0"/>
+              </a:rPr>
+              <a:t>선택하고</a:t>
+            </a:r>
+            <a:r>
+              <a:rPr sz="1800">
+                <a:latin typeface="맑은 고딕" charset="0"/>
+                <a:ea typeface="맑은 고딕" charset="0"/>
+              </a:rPr>
+              <a:t> </a:t>
+            </a:r>
+            <a:r>
+              <a:rPr lang="ko-KR" sz="1800">
+                <a:latin typeface="맑은 고딕" charset="0"/>
+                <a:ea typeface="맑은 고딕" charset="0"/>
+              </a:rPr>
+              <a:t>Ani</a:t>
+            </a:r>
+            <a:r>
+              <a:rPr lang="ko-KR" sz="1800">
+                <a:latin typeface="맑은 고딕" charset="0"/>
+                <a:ea typeface="맑은 고딕" charset="0"/>
+              </a:rPr>
+              <a:t>mation</a:t>
+            </a:r>
+            <a:r>
+              <a:rPr lang="ko-KR" sz="1800">
+                <a:latin typeface="맑은 고딕" charset="0"/>
+                <a:ea typeface="맑은 고딕" charset="0"/>
+              </a:rPr>
+              <a:t>에 </a:t>
+            </a:r>
+            <a:r>
+              <a:rPr lang="ko-KR" sz="1800">
+                <a:latin typeface="맑은 고딕" charset="0"/>
+                <a:ea typeface="맑은 고딕" charset="0"/>
+              </a:rPr>
+              <a:t>Events를 </a:t>
+            </a:r>
+            <a:r>
+              <a:rPr lang="ko-KR" sz="1800">
+                <a:latin typeface="맑은 고딕" charset="0"/>
+                <a:ea typeface="맑은 고딕" charset="0"/>
+              </a:rPr>
+              <a:t>추가합니다.</a:t>
+            </a:r>
+            <a:endParaRPr lang="ko-KR" altLang="en-US" sz="1800">
+              <a:latin typeface="맑은 고딕" charset="0"/>
+              <a:ea typeface="맑은 고딕" charset="0"/>
+            </a:endParaRPr>
+          </a:p>
+        </p:txBody>
+      </p:sp>
+      <p:pic>
+        <p:nvPicPr>
+          <p:cNvPr id="1237" name="Picture " descr="C:/Users/Admin1/AppData/Roaming/PolarisOffice/ETemp/4316_14940424/fImage105803695436.png"/>
+          <p:cNvPicPr>
+            <a:picLocks noChangeAspect="1"/>
+          </p:cNvPicPr>
+          <p:nvPr/>
+        </p:nvPicPr>
+        <p:blipFill rotWithShape="1">
+          <a:blip r:embed="rId2" cstate="print">
+            <a:extLst>
+              <a:ext uri="{28A0092B-C50C-407E-A947-70E740481C1C}">
+                <a14:useLocalDpi xmlns:a14="http://schemas.microsoft.com/office/drawing/2010/main" val="0"/>
+              </a:ext>
+            </a:extLst>
+          </a:blip>
+          <a:stretch>
+            <a:fillRect/>
+          </a:stretch>
+        </p:blipFill>
+        <p:spPr>
+          <a:xfrm rot="0">
+            <a:off x="1240790" y="1446530"/>
+            <a:ext cx="4126230" cy="3567430"/>
+          </a:xfrm>
+          <a:prstGeom prst="roundRect"/>
+          <a:solidFill>
+            <a:srgbClr val="EDEDED"/>
+          </a:solidFill>
+        </p:spPr>
+      </p:pic>
+      <p:sp>
+        <p:nvSpPr>
+          <p:cNvPr id="1238" name="텍스트 상자 73"/>
+          <p:cNvSpPr txBox="1">
+            <a:spLocks/>
+          </p:cNvSpPr>
+          <p:nvPr/>
+        </p:nvSpPr>
+        <p:spPr>
+          <a:xfrm rot="0">
+            <a:off x="6842760" y="4413250"/>
+            <a:ext cx="4123055" cy="1754505"/>
+          </a:xfrm>
+          <a:prstGeom prst="rect"/>
+          <a:noFill/>
+        </p:spPr>
+        <p:txBody>
+          <a:bodyPr wrap="square" lIns="0" tIns="0" rIns="0" bIns="0" numCol="1" vert="horz" anchor="t">
+            <a:noAutofit/>
+          </a:bodyPr>
+          <a:lstStyle/>
+          <a:p>
+            <a:pPr marL="0" indent="0" rtl="0" algn="l" defTabSz="914400" eaLnBrk="1" latinLnBrk="0" hangingPunct="1">
+              <a:buFontTx/>
+              <a:buNone/>
+            </a:pPr>
+            <a:r>
+              <a:rPr lang="ko-KR" sz="2000" b="1">
+                <a:solidFill>
+                  <a:srgbClr val="0611F2"/>
+                </a:solidFill>
+                <a:latin typeface="맑은 고딕" charset="0"/>
+                <a:ea typeface="맑은 고딕" charset="0"/>
+              </a:rPr>
+              <a:t>5</a:t>
+            </a:r>
+            <a:r>
+              <a:rPr lang="ko-KR" sz="2000" b="1">
+                <a:solidFill>
+                  <a:srgbClr val="0611F2"/>
+                </a:solidFill>
+                <a:latin typeface="맑은 고딕" charset="0"/>
+                <a:ea typeface="맑은 고딕" charset="0"/>
+              </a:rPr>
+              <a:t>0</a:t>
+            </a:r>
+            <a:r>
+              <a:rPr sz="2000" b="1">
+                <a:solidFill>
+                  <a:srgbClr val="0611F2"/>
+                </a:solidFill>
+                <a:latin typeface="맑은 고딕" charset="0"/>
+                <a:ea typeface="맑은 고딕" charset="0"/>
+              </a:rPr>
+              <a:t>.</a:t>
+            </a:r>
+            <a:r>
+              <a:rPr sz="2000" b="1">
+                <a:solidFill>
+                  <a:srgbClr val="0611F2"/>
+                </a:solidFill>
+                <a:latin typeface="맑은 고딕" charset="0"/>
+                <a:ea typeface="맑은 고딕" charset="0"/>
+              </a:rPr>
+              <a:t> </a:t>
+            </a:r>
+            <a:r>
+              <a:rPr sz="1800">
+                <a:latin typeface="맑은 고딕" charset="0"/>
+                <a:ea typeface="맑은 고딕" charset="0"/>
+              </a:rPr>
+              <a:t>그다음 애니메이션 이벤트를 </a:t>
+            </a:r>
+            <a:r>
+              <a:rPr sz="1800">
+                <a:latin typeface="맑은 고딕" charset="0"/>
+                <a:ea typeface="맑은 고딕" charset="0"/>
+              </a:rPr>
+              <a:t>특정</a:t>
+            </a:r>
+            <a:r>
+              <a:rPr sz="1800">
+                <a:latin typeface="맑은 고딕" charset="0"/>
+                <a:ea typeface="맑은 고딕" charset="0"/>
+              </a:rPr>
+              <a:t>한 </a:t>
+            </a:r>
+            <a:r>
+              <a:rPr sz="1800">
+                <a:latin typeface="맑은 고딕" charset="0"/>
+                <a:ea typeface="맑은 고딕" charset="0"/>
+              </a:rPr>
+              <a:t>영역으로</a:t>
+            </a:r>
+            <a:r>
+              <a:rPr sz="1800">
+                <a:latin typeface="맑은 고딕" charset="0"/>
+                <a:ea typeface="맑은 고딕" charset="0"/>
+              </a:rPr>
+              <a:t> </a:t>
+            </a:r>
+            <a:r>
+              <a:rPr sz="1800">
+                <a:latin typeface="맑은 고딕" charset="0"/>
+                <a:ea typeface="맑은 고딕" charset="0"/>
+              </a:rPr>
+              <a:t>옮긴</a:t>
+            </a:r>
+            <a:r>
+              <a:rPr sz="1800">
+                <a:latin typeface="맑은 고딕" charset="0"/>
+                <a:ea typeface="맑은 고딕" charset="0"/>
+              </a:rPr>
+              <a:t> </a:t>
+            </a:r>
+            <a:r>
+              <a:rPr sz="1800">
+                <a:latin typeface="맑은 고딕" charset="0"/>
+                <a:ea typeface="맑은 고딕" charset="0"/>
+              </a:rPr>
+              <a:t>다음</a:t>
+            </a:r>
+            <a:r>
+              <a:rPr sz="1800">
+                <a:latin typeface="맑은 고딕" charset="0"/>
+                <a:ea typeface="맑은 고딕" charset="0"/>
+              </a:rPr>
+              <a:t> </a:t>
+            </a:r>
+            <a:r>
+              <a:rPr sz="1800">
+                <a:latin typeface="맑은 고딕" charset="0"/>
+                <a:ea typeface="맑은 고딕" charset="0"/>
+              </a:rPr>
+              <a:t>Function의</a:t>
+            </a:r>
+            <a:r>
+              <a:rPr sz="1800">
+                <a:latin typeface="맑은 고딕" charset="0"/>
+                <a:ea typeface="맑은 고딕" charset="0"/>
+              </a:rPr>
+              <a:t> </a:t>
+            </a:r>
+            <a:r>
+              <a:rPr sz="1800">
+                <a:latin typeface="맑은 고딕" charset="0"/>
+                <a:ea typeface="맑은 고딕" charset="0"/>
+              </a:rPr>
+              <a:t>이름을</a:t>
+            </a:r>
+            <a:r>
+              <a:rPr sz="1800">
+                <a:latin typeface="맑은 고딕" charset="0"/>
+                <a:ea typeface="맑은 고딕" charset="0"/>
+              </a:rPr>
+              <a:t> </a:t>
+            </a:r>
+            <a:r>
+              <a:rPr sz="1800">
+                <a:latin typeface="맑은 고딕" charset="0"/>
+                <a:ea typeface="맑은 고딕" charset="0"/>
+              </a:rPr>
+              <a:t>Damage</a:t>
+            </a:r>
+            <a:r>
+              <a:rPr sz="1800">
+                <a:latin typeface="맑은 고딕" charset="0"/>
+                <a:ea typeface="맑은 고딕" charset="0"/>
+              </a:rPr>
+              <a:t>로</a:t>
+            </a:r>
+            <a:r>
+              <a:rPr sz="1800">
+                <a:latin typeface="맑은 고딕" charset="0"/>
+                <a:ea typeface="맑은 고딕" charset="0"/>
+              </a:rPr>
+              <a:t> </a:t>
+            </a:r>
+            <a:r>
+              <a:rPr sz="1800">
+                <a:latin typeface="맑은 고딕" charset="0"/>
+                <a:ea typeface="맑은 고딕" charset="0"/>
+              </a:rPr>
+              <a:t>설정합니다.</a:t>
+            </a:r>
+            <a:endParaRPr lang="ko-KR" altLang="en-US" sz="1800">
+              <a:latin typeface="맑은 고딕" charset="0"/>
+              <a:ea typeface="맑은 고딕" charset="0"/>
+            </a:endParaRPr>
+          </a:p>
+          <a:p>
+            <a:pPr marL="0" indent="0" rtl="0" algn="l" defTabSz="914400" eaLnBrk="1" latinLnBrk="0" hangingPunct="1">
+              <a:buFontTx/>
+              <a:buNone/>
+            </a:pPr>
+            <a:endParaRPr lang="ko-KR" altLang="en-US" sz="1800">
+              <a:latin typeface="맑은 고딕" charset="0"/>
+              <a:ea typeface="맑은 고딕" charset="0"/>
+            </a:endParaRPr>
+          </a:p>
+          <a:p>
+            <a:pPr marL="0" indent="0" rtl="0" algn="l" defTabSz="914400" eaLnBrk="1" latinLnBrk="0" hangingPunct="1">
+              <a:buFontTx/>
+              <a:buNone/>
+            </a:pPr>
+            <a:r>
+              <a:rPr lang="ko-KR" sz="1800">
+                <a:latin typeface="맑은 고딕" charset="0"/>
+                <a:ea typeface="맑은 고딕" charset="0"/>
+              </a:rPr>
+              <a:t>그러고</a:t>
+            </a:r>
+            <a:r>
+              <a:rPr lang="ko-KR" sz="1800">
+                <a:latin typeface="맑은 고딕" charset="0"/>
+                <a:ea typeface="맑은 고딕" charset="0"/>
+              </a:rPr>
+              <a:t> </a:t>
+            </a:r>
+            <a:r>
+              <a:rPr lang="ko-KR" sz="1800">
+                <a:latin typeface="맑은 고딕" charset="0"/>
+                <a:ea typeface="맑은 고딕" charset="0"/>
+              </a:rPr>
+              <a:t>나서</a:t>
+            </a:r>
+            <a:r>
+              <a:rPr lang="ko-KR" sz="1800">
+                <a:latin typeface="맑은 고딕" charset="0"/>
+                <a:ea typeface="맑은 고딕" charset="0"/>
+              </a:rPr>
+              <a:t> </a:t>
+            </a:r>
+            <a:r>
+              <a:rPr lang="ko-KR" sz="1800">
+                <a:latin typeface="맑은 고딕" charset="0"/>
+                <a:ea typeface="맑은 고딕" charset="0"/>
+              </a:rPr>
+              <a:t>Float에 0.125 </a:t>
+            </a:r>
+            <a:r>
+              <a:rPr lang="ko-KR" sz="1800">
+                <a:latin typeface="맑은 고딕" charset="0"/>
+                <a:ea typeface="맑은 고딕" charset="0"/>
+              </a:rPr>
+              <a:t>라는 값을  </a:t>
+            </a:r>
+            <a:r>
+              <a:rPr lang="ko-KR" sz="1800">
+                <a:latin typeface="맑은 고딕" charset="0"/>
+                <a:ea typeface="맑은 고딕" charset="0"/>
+              </a:rPr>
+              <a:t>설정하고</a:t>
+            </a:r>
+            <a:r>
+              <a:rPr lang="ko-KR" sz="1800">
+                <a:latin typeface="맑은 고딕" charset="0"/>
+                <a:ea typeface="맑은 고딕" charset="0"/>
+              </a:rPr>
+              <a:t> Apply를 선택합니다.</a:t>
+            </a:r>
+            <a:endParaRPr lang="ko-KR" altLang="en-US" sz="1800">
+              <a:latin typeface="맑은 고딕" charset="0"/>
+              <a:ea typeface="맑은 고딕" charset="0"/>
+            </a:endParaRPr>
+          </a:p>
+        </p:txBody>
+      </p:sp>
+      <p:pic>
+        <p:nvPicPr>
+          <p:cNvPr id="1239" name="그림 75" descr="C:/Users/Admin1/AppData/Roaming/PolarisOffice/ETemp/4316_14940424/fImage121363772391.png"/>
+          <p:cNvPicPr>
+            <a:picLocks noChangeAspect="1"/>
+          </p:cNvPicPr>
+          <p:nvPr/>
+        </p:nvPicPr>
+        <p:blipFill rotWithShape="1">
+          <a:blip r:embed="rId3" cstate="print">
+            <a:extLst>
+              <a:ext uri="{28A0092B-C50C-407E-A947-70E740481C1C}">
+                <a14:useLocalDpi xmlns:a14="http://schemas.microsoft.com/office/drawing/2010/main" val="0"/>
+              </a:ext>
+            </a:extLst>
+          </a:blip>
+          <a:stretch>
+            <a:fillRect/>
+          </a:stretch>
+        </p:blipFill>
+        <p:spPr>
+          <a:xfrm rot="0">
+            <a:off x="6830695" y="1449070"/>
+            <a:ext cx="4126865" cy="2755265"/>
+          </a:xfrm>
+          <a:prstGeom prst="roundRect"/>
+          <a:solidFill>
+            <a:srgbClr val="EDEDED"/>
+          </a:solidFill>
+        </p:spPr>
+      </p:pic>
     </p:spTree>
   </p:cSld>
   <p:clrMapOvr>

</xml_diff>